<commit_message>
Abstract model as send to advisors
</commit_message>
<xml_diff>
--- a/Model/Abstract model.pptx
+++ b/Model/Abstract model.pptx
@@ -118,12 +118,12 @@
   <pc:docChgLst>
     <pc:chgData name="Ingmar Wever" userId="1d4f24f3f093ab16" providerId="LiveId" clId="{982A7207-6ECB-4C04-B0B1-32E71348DA82}"/>
     <pc:docChg chg="undo custSel addSld delSld modSld">
-      <pc:chgData name="Ingmar Wever" userId="1d4f24f3f093ab16" providerId="LiveId" clId="{982A7207-6ECB-4C04-B0B1-32E71348DA82}" dt="2017-12-10T23:49:13.973" v="3615" actId="14100"/>
+      <pc:chgData name="Ingmar Wever" userId="1d4f24f3f093ab16" providerId="LiveId" clId="{982A7207-6ECB-4C04-B0B1-32E71348DA82}" dt="2017-12-11T13:46:14.862" v="3683" actId="2696"/>
       <pc:docMkLst>
         <pc:docMk/>
       </pc:docMkLst>
       <pc:sldChg chg="addSp delSp modSp setBg">
-        <pc:chgData name="Ingmar Wever" userId="1d4f24f3f093ab16" providerId="LiveId" clId="{982A7207-6ECB-4C04-B0B1-32E71348DA82}" dt="2017-12-10T23:49:13.973" v="3615" actId="14100"/>
+        <pc:chgData name="Ingmar Wever" userId="1d4f24f3f093ab16" providerId="LiveId" clId="{982A7207-6ECB-4C04-B0B1-32E71348DA82}" dt="2017-12-11T13:44:27.997" v="3675"/>
         <pc:sldMkLst>
           <pc:docMk/>
           <pc:sldMk cId="2475769336" sldId="256"/>
@@ -137,7 +137,7 @@
           </ac:spMkLst>
         </pc:spChg>
         <pc:spChg chg="add mod ord">
-          <ac:chgData name="Ingmar Wever" userId="1d4f24f3f093ab16" providerId="LiveId" clId="{982A7207-6ECB-4C04-B0B1-32E71348DA82}" dt="2017-12-10T15:50:54.947" v="3143" actId="1076"/>
+          <ac:chgData name="Ingmar Wever" userId="1d4f24f3f093ab16" providerId="LiveId" clId="{982A7207-6ECB-4C04-B0B1-32E71348DA82}" dt="2017-12-11T00:07:18.850" v="3653" actId="14100"/>
           <ac:spMkLst>
             <pc:docMk/>
             <pc:sldMk cId="2475769336" sldId="256"/>
@@ -377,7 +377,7 @@
           </ac:spMkLst>
         </pc:spChg>
         <pc:spChg chg="add mod">
-          <ac:chgData name="Ingmar Wever" userId="1d4f24f3f093ab16" providerId="LiveId" clId="{982A7207-6ECB-4C04-B0B1-32E71348DA82}" dt="2017-12-10T15:45:29.777" v="3063" actId="1038"/>
+          <ac:chgData name="Ingmar Wever" userId="1d4f24f3f093ab16" providerId="LiveId" clId="{982A7207-6ECB-4C04-B0B1-32E71348DA82}" dt="2017-12-11T00:08:28.541" v="3670" actId="1036"/>
           <ac:spMkLst>
             <pc:docMk/>
             <pc:sldMk cId="2475769336" sldId="256"/>
@@ -385,7 +385,7 @@
           </ac:spMkLst>
         </pc:spChg>
         <pc:spChg chg="add mod">
-          <ac:chgData name="Ingmar Wever" userId="1d4f24f3f093ab16" providerId="LiveId" clId="{982A7207-6ECB-4C04-B0B1-32E71348DA82}" dt="2017-12-10T23:46:53.655" v="3607" actId="1076"/>
+          <ac:chgData name="Ingmar Wever" userId="1d4f24f3f093ab16" providerId="LiveId" clId="{982A7207-6ECB-4C04-B0B1-32E71348DA82}" dt="2017-12-11T00:08:23.988" v="3668" actId="1036"/>
           <ac:spMkLst>
             <pc:docMk/>
             <pc:sldMk cId="2475769336" sldId="256"/>
@@ -529,7 +529,7 @@
           </ac:spMkLst>
         </pc:spChg>
         <pc:spChg chg="add mod">
-          <ac:chgData name="Ingmar Wever" userId="1d4f24f3f093ab16" providerId="LiveId" clId="{982A7207-6ECB-4C04-B0B1-32E71348DA82}" dt="2017-12-10T15:51:00.639" v="3144" actId="1076"/>
+          <ac:chgData name="Ingmar Wever" userId="1d4f24f3f093ab16" providerId="LiveId" clId="{982A7207-6ECB-4C04-B0B1-32E71348DA82}" dt="2017-12-11T00:06:33.554" v="3646" actId="14838"/>
           <ac:spMkLst>
             <pc:docMk/>
             <pc:sldMk cId="2475769336" sldId="256"/>
@@ -585,7 +585,7 @@
           </ac:spMkLst>
         </pc:spChg>
         <pc:spChg chg="add mod">
-          <ac:chgData name="Ingmar Wever" userId="1d4f24f3f093ab16" providerId="LiveId" clId="{982A7207-6ECB-4C04-B0B1-32E71348DA82}" dt="2017-12-10T15:45:29.777" v="3063" actId="1038"/>
+          <ac:chgData name="Ingmar Wever" userId="1d4f24f3f093ab16" providerId="LiveId" clId="{982A7207-6ECB-4C04-B0B1-32E71348DA82}" dt="2017-12-11T00:08:44.953" v="3672" actId="1035"/>
           <ac:spMkLst>
             <pc:docMk/>
             <pc:sldMk cId="2475769336" sldId="256"/>
@@ -737,7 +737,7 @@
           </ac:spMkLst>
         </pc:spChg>
         <pc:spChg chg="add mod ord">
-          <ac:chgData name="Ingmar Wever" userId="1d4f24f3f093ab16" providerId="LiveId" clId="{982A7207-6ECB-4C04-B0B1-32E71348DA82}" dt="2017-12-10T23:47:41.329" v="3613"/>
+          <ac:chgData name="Ingmar Wever" userId="1d4f24f3f093ab16" providerId="LiveId" clId="{982A7207-6ECB-4C04-B0B1-32E71348DA82}" dt="2017-12-10T23:47:41.329" v="3613" actId="14100"/>
           <ac:spMkLst>
             <pc:docMk/>
             <pc:sldMk cId="2475769336" sldId="256"/>
@@ -752,6 +752,14 @@
             <ac:grpSpMk id="2" creationId="{DD9C44DF-A2B6-4BD1-9467-48C958F70C2F}"/>
           </ac:grpSpMkLst>
         </pc:grpChg>
+        <pc:graphicFrameChg chg="add del mod">
+          <ac:chgData name="Ingmar Wever" userId="1d4f24f3f093ab16" providerId="LiveId" clId="{982A7207-6ECB-4C04-B0B1-32E71348DA82}" dt="2017-12-11T13:44:27.997" v="3675"/>
+          <ac:graphicFrameMkLst>
+            <pc:docMk/>
+            <pc:sldMk cId="2475769336" sldId="256"/>
+            <ac:graphicFrameMk id="6" creationId="{F3F4BE5A-6E7C-4066-9E13-35AB1BBEE9AB}"/>
+          </ac:graphicFrameMkLst>
+        </pc:graphicFrameChg>
         <pc:graphicFrameChg chg="add del mod">
           <ac:chgData name="Ingmar Wever" userId="1d4f24f3f093ab16" providerId="LiveId" clId="{982A7207-6ECB-4C04-B0B1-32E71348DA82}" dt="2017-12-09T22:44:26.424" v="1503" actId="478"/>
           <ac:graphicFrameMkLst>
@@ -1158,6 +1166,29 @@
             <ac:spMk id="9" creationId="{176E8384-E0CC-4E36-9C1A-B6973ADA0A8B}"/>
           </ac:spMkLst>
         </pc:spChg>
+      </pc:sldChg>
+      <pc:sldChg chg="addSp delSp modSp add del">
+        <pc:chgData name="Ingmar Wever" userId="1d4f24f3f093ab16" providerId="LiveId" clId="{982A7207-6ECB-4C04-B0B1-32E71348DA82}" dt="2017-12-11T13:46:14.862" v="3683" actId="2696"/>
+        <pc:sldMkLst>
+          <pc:docMk/>
+          <pc:sldMk cId="581981446" sldId="258"/>
+        </pc:sldMkLst>
+        <pc:graphicFrameChg chg="add del mod">
+          <ac:chgData name="Ingmar Wever" userId="1d4f24f3f093ab16" providerId="LiveId" clId="{982A7207-6ECB-4C04-B0B1-32E71348DA82}" dt="2017-12-11T13:44:51.589" v="3680" actId="478"/>
+          <ac:graphicFrameMkLst>
+            <pc:docMk/>
+            <pc:sldMk cId="581981446" sldId="258"/>
+            <ac:graphicFrameMk id="2" creationId="{94B86CD3-3FEC-4086-B1A2-6F06A28799F5}"/>
+          </ac:graphicFrameMkLst>
+        </pc:graphicFrameChg>
+        <pc:picChg chg="add del">
+          <ac:chgData name="Ingmar Wever" userId="1d4f24f3f093ab16" providerId="LiveId" clId="{982A7207-6ECB-4C04-B0B1-32E71348DA82}" dt="2017-12-11T13:46:11.013" v="3682" actId="478"/>
+          <ac:picMkLst>
+            <pc:docMk/>
+            <pc:sldMk cId="581981446" sldId="258"/>
+            <ac:picMk id="1026" creationId="{1FA059C7-A75F-4CB1-8668-0EC775247A87}"/>
+          </ac:picMkLst>
+        </pc:picChg>
       </pc:sldChg>
     </pc:docChg>
   </pc:docChgLst>
@@ -4048,13 +4079,13 @@
         </p:nvSpPr>
         <p:spPr>
           <a:xfrm rot="6267520">
-            <a:off x="1326951" y="4088499"/>
-            <a:ext cx="540000" cy="540000"/>
+            <a:off x="1236400" y="3983524"/>
+            <a:ext cx="724481" cy="726736"/>
           </a:xfrm>
           <a:prstGeom prst="arc">
             <a:avLst>
-              <a:gd name="adj1" fmla="val 16200000"/>
-              <a:gd name="adj2" fmla="val 12713173"/>
+              <a:gd name="adj1" fmla="val 17778571"/>
+              <a:gd name="adj2" fmla="val 16374433"/>
             </a:avLst>
           </a:prstGeom>
           <a:ln w="38100">
@@ -4972,10 +5003,9 @@
             </a:pathLst>
           </a:custGeom>
           <a:solidFill>
-            <a:schemeClr val="accent6">
-              <a:lumMod val="20000"/>
-              <a:lumOff val="80000"/>
-            </a:schemeClr>
+            <a:srgbClr val="E2F0D9">
+              <a:alpha val="85098"/>
+            </a:srgbClr>
           </a:solidFill>
         </p:spPr>
         <p:style>
@@ -7560,7 +7590,7 @@
         </p:nvSpPr>
         <p:spPr>
           <a:xfrm rot="20092962">
-            <a:off x="1169191" y="4118438"/>
+            <a:off x="1175909" y="4102050"/>
             <a:ext cx="877922" cy="553998"/>
           </a:xfrm>
           <a:prstGeom prst="rect">
@@ -7576,7 +7606,9 @@
           <a:p>
             <a:pPr algn="ctr"/>
             <a:r>
-              <a:rPr lang="nl-NL" sz="1000" dirty="0"/>
+              <a:rPr lang="nl-NL" sz="1000" dirty="0">
+                <a:effectLst/>
+              </a:rPr>
               <a:t>Iterate map for every timestep</a:t>
             </a:r>
           </a:p>
@@ -7814,7 +7846,7 @@
         </p:nvSpPr>
         <p:spPr>
           <a:xfrm>
-            <a:off x="3687954" y="2938414"/>
+            <a:off x="3687954" y="2922372"/>
             <a:ext cx="1430426" cy="246221"/>
           </a:xfrm>
           <a:prstGeom prst="rect">
@@ -8206,7 +8238,7 @@
         </p:nvSpPr>
         <p:spPr>
           <a:xfrm>
-            <a:off x="8177954" y="5137740"/>
+            <a:off x="8177954" y="5153782"/>
             <a:ext cx="719766" cy="400110"/>
           </a:xfrm>
           <a:prstGeom prst="rect">
@@ -8241,7 +8273,7 @@
         </p:nvSpPr>
         <p:spPr>
           <a:xfrm>
-            <a:off x="8982331" y="3265146"/>
+            <a:off x="9038143" y="5157645"/>
             <a:ext cx="947456" cy="400110"/>
           </a:xfrm>
           <a:prstGeom prst="rect">

</xml_diff>

<commit_message>
Wrote first and second part on industry and this research, switched to A3 for printing
</commit_message>
<xml_diff>
--- a/Model/Abstract model.pptx
+++ b/Model/Abstract model.pptx
@@ -116,1081 +116,55 @@
 <file path=ppt/changesInfos/changesInfo1.xml><?xml version="1.0" encoding="utf-8"?>
 <pc:chgInfo xmlns:a="http://schemas.openxmlformats.org/drawingml/2006/main" xmlns:r="http://schemas.openxmlformats.org/officeDocument/2006/relationships" xmlns:ac="http://schemas.microsoft.com/office/drawing/2013/main/command" xmlns:pc="http://schemas.microsoft.com/office/powerpoint/2013/main/command">
   <pc:docChgLst>
-    <pc:chgData name="Ingmar Wever" userId="1d4f24f3f093ab16" providerId="LiveId" clId="{982A7207-6ECB-4C04-B0B1-32E71348DA82}"/>
-    <pc:docChg chg="undo custSel addSld delSld modSld">
-      <pc:chgData name="Ingmar Wever" userId="1d4f24f3f093ab16" providerId="LiveId" clId="{982A7207-6ECB-4C04-B0B1-32E71348DA82}" dt="2017-12-11T13:46:14.862" v="3683" actId="2696"/>
+    <pc:chgData name="Ingmar Wever" userId="1d4f24f3f093ab16" providerId="LiveId" clId="{C4B11D4C-2B70-4127-8D62-8F44844788BA}"/>
+    <pc:docChg chg="custSel modSld">
+      <pc:chgData name="Ingmar Wever" userId="1d4f24f3f093ab16" providerId="LiveId" clId="{C4B11D4C-2B70-4127-8D62-8F44844788BA}" dt="2018-03-19T10:19:35.782" v="52" actId="20577"/>
       <pc:docMkLst>
         <pc:docMk/>
       </pc:docMkLst>
-      <pc:sldChg chg="addSp delSp modSp setBg">
-        <pc:chgData name="Ingmar Wever" userId="1d4f24f3f093ab16" providerId="LiveId" clId="{982A7207-6ECB-4C04-B0B1-32E71348DA82}" dt="2017-12-11T13:44:27.997" v="3675"/>
+      <pc:sldChg chg="delSp modSp">
+        <pc:chgData name="Ingmar Wever" userId="1d4f24f3f093ab16" providerId="LiveId" clId="{C4B11D4C-2B70-4127-8D62-8F44844788BA}" dt="2018-03-19T10:19:35.782" v="52" actId="20577"/>
         <pc:sldMkLst>
           <pc:docMk/>
           <pc:sldMk cId="2475769336" sldId="256"/>
         </pc:sldMkLst>
-        <pc:spChg chg="add mod">
-          <ac:chgData name="Ingmar Wever" userId="1d4f24f3f093ab16" providerId="LiveId" clId="{982A7207-6ECB-4C04-B0B1-32E71348DA82}" dt="2017-12-10T15:45:29.777" v="3063" actId="1038"/>
-          <ac:spMkLst>
-            <pc:docMk/>
-            <pc:sldMk cId="2475769336" sldId="256"/>
-            <ac:spMk id="2" creationId="{633DD48C-1774-4CDC-AF73-699E536C87AC}"/>
-          </ac:spMkLst>
-        </pc:spChg>
-        <pc:spChg chg="add mod ord">
-          <ac:chgData name="Ingmar Wever" userId="1d4f24f3f093ab16" providerId="LiveId" clId="{982A7207-6ECB-4C04-B0B1-32E71348DA82}" dt="2017-12-11T00:07:18.850" v="3653" actId="14100"/>
-          <ac:spMkLst>
-            <pc:docMk/>
-            <pc:sldMk cId="2475769336" sldId="256"/>
-            <ac:spMk id="3" creationId="{1093ED2D-C9EB-4196-9AFD-EFE438621D53}"/>
-          </ac:spMkLst>
-        </pc:spChg>
-        <pc:spChg chg="mod topLvl">
-          <ac:chgData name="Ingmar Wever" userId="1d4f24f3f093ab16" providerId="LiveId" clId="{982A7207-6ECB-4C04-B0B1-32E71348DA82}" dt="2017-12-10T15:45:29.777" v="3063" actId="1038"/>
-          <ac:spMkLst>
-            <pc:docMk/>
-            <pc:sldMk cId="2475769336" sldId="256"/>
-            <ac:spMk id="4" creationId="{E58B911F-1D71-4D2C-907D-9B7E9E6E163A}"/>
-          </ac:spMkLst>
-        </pc:spChg>
-        <pc:spChg chg="mod topLvl">
-          <ac:chgData name="Ingmar Wever" userId="1d4f24f3f093ab16" providerId="LiveId" clId="{982A7207-6ECB-4C04-B0B1-32E71348DA82}" dt="2017-12-10T15:45:29.777" v="3063" actId="1038"/>
-          <ac:spMkLst>
-            <pc:docMk/>
-            <pc:sldMk cId="2475769336" sldId="256"/>
-            <ac:spMk id="5" creationId="{B78F9FDB-7B89-4F2D-B895-7438C9BDE4A5}"/>
-          </ac:spMkLst>
-        </pc:spChg>
-        <pc:spChg chg="mod topLvl">
-          <ac:chgData name="Ingmar Wever" userId="1d4f24f3f093ab16" providerId="LiveId" clId="{982A7207-6ECB-4C04-B0B1-32E71348DA82}" dt="2017-12-10T15:45:29.777" v="3063" actId="1038"/>
-          <ac:spMkLst>
-            <pc:docMk/>
-            <pc:sldMk cId="2475769336" sldId="256"/>
-            <ac:spMk id="8" creationId="{D58D5C05-4461-4DB6-A2EE-3444DCDB364C}"/>
-          </ac:spMkLst>
-        </pc:spChg>
-        <pc:spChg chg="mod topLvl">
-          <ac:chgData name="Ingmar Wever" userId="1d4f24f3f093ab16" providerId="LiveId" clId="{982A7207-6ECB-4C04-B0B1-32E71348DA82}" dt="2017-12-10T15:45:29.777" v="3063" actId="1038"/>
-          <ac:spMkLst>
-            <pc:docMk/>
-            <pc:sldMk cId="2475769336" sldId="256"/>
-            <ac:spMk id="9" creationId="{0415397E-9C8F-4B0D-8CC2-70C5A963FEF8}"/>
-          </ac:spMkLst>
-        </pc:spChg>
-        <pc:spChg chg="mod topLvl">
-          <ac:chgData name="Ingmar Wever" userId="1d4f24f3f093ab16" providerId="LiveId" clId="{982A7207-6ECB-4C04-B0B1-32E71348DA82}" dt="2017-12-10T15:45:29.777" v="3063" actId="1038"/>
-          <ac:spMkLst>
-            <pc:docMk/>
-            <pc:sldMk cId="2475769336" sldId="256"/>
-            <ac:spMk id="10" creationId="{057D8672-2DD9-481A-AE81-E74B5CBEC73F}"/>
-          </ac:spMkLst>
-        </pc:spChg>
-        <pc:spChg chg="mod topLvl">
-          <ac:chgData name="Ingmar Wever" userId="1d4f24f3f093ab16" providerId="LiveId" clId="{982A7207-6ECB-4C04-B0B1-32E71348DA82}" dt="2017-12-10T15:45:29.777" v="3063" actId="1038"/>
-          <ac:spMkLst>
-            <pc:docMk/>
-            <pc:sldMk cId="2475769336" sldId="256"/>
-            <ac:spMk id="11" creationId="{C8F28E2D-9F9B-4D0F-8BC6-2160002E87AF}"/>
-          </ac:spMkLst>
-        </pc:spChg>
-        <pc:spChg chg="mod topLvl">
-          <ac:chgData name="Ingmar Wever" userId="1d4f24f3f093ab16" providerId="LiveId" clId="{982A7207-6ECB-4C04-B0B1-32E71348DA82}" dt="2017-12-10T15:45:29.777" v="3063" actId="1038"/>
-          <ac:spMkLst>
-            <pc:docMk/>
-            <pc:sldMk cId="2475769336" sldId="256"/>
-            <ac:spMk id="12" creationId="{F58ECEF7-4D07-4CBC-A9A8-B044D5BE54BE}"/>
-          </ac:spMkLst>
-        </pc:spChg>
-        <pc:spChg chg="del mod ord">
-          <ac:chgData name="Ingmar Wever" userId="1d4f24f3f093ab16" providerId="LiveId" clId="{982A7207-6ECB-4C04-B0B1-32E71348DA82}" dt="2017-12-09T22:27:10.846" v="866" actId="478"/>
-          <ac:spMkLst>
-            <pc:docMk/>
-            <pc:sldMk cId="2475769336" sldId="256"/>
-            <ac:spMk id="14" creationId="{712588B6-DF90-47FA-8FA7-65D7A0940F90}"/>
-          </ac:spMkLst>
-        </pc:spChg>
-        <pc:spChg chg="del mod ord">
-          <ac:chgData name="Ingmar Wever" userId="1d4f24f3f093ab16" providerId="LiveId" clId="{982A7207-6ECB-4C04-B0B1-32E71348DA82}" dt="2017-12-09T22:27:08.299" v="865" actId="478"/>
-          <ac:spMkLst>
-            <pc:docMk/>
-            <pc:sldMk cId="2475769336" sldId="256"/>
-            <ac:spMk id="15" creationId="{D4A84D7D-33FA-4315-81C4-0EEF4CB5ECA8}"/>
-          </ac:spMkLst>
-        </pc:spChg>
-        <pc:spChg chg="mod topLvl">
-          <ac:chgData name="Ingmar Wever" userId="1d4f24f3f093ab16" providerId="LiveId" clId="{982A7207-6ECB-4C04-B0B1-32E71348DA82}" dt="2017-12-10T15:45:29.777" v="3063" actId="1038"/>
-          <ac:spMkLst>
-            <pc:docMk/>
-            <pc:sldMk cId="2475769336" sldId="256"/>
-            <ac:spMk id="16" creationId="{4D2D9CFD-3ABC-4F56-B6C8-DE10A6DF2D7A}"/>
-          </ac:spMkLst>
-        </pc:spChg>
-        <pc:spChg chg="mod topLvl">
-          <ac:chgData name="Ingmar Wever" userId="1d4f24f3f093ab16" providerId="LiveId" clId="{982A7207-6ECB-4C04-B0B1-32E71348DA82}" dt="2017-12-10T15:45:29.777" v="3063" actId="1038"/>
-          <ac:spMkLst>
-            <pc:docMk/>
-            <pc:sldMk cId="2475769336" sldId="256"/>
-            <ac:spMk id="17" creationId="{B56168E2-C912-4DCD-BFAE-D1656219CB47}"/>
-          </ac:spMkLst>
-        </pc:spChg>
-        <pc:spChg chg="mod topLvl">
-          <ac:chgData name="Ingmar Wever" userId="1d4f24f3f093ab16" providerId="LiveId" clId="{982A7207-6ECB-4C04-B0B1-32E71348DA82}" dt="2017-12-10T15:45:29.777" v="3063" actId="1038"/>
-          <ac:spMkLst>
-            <pc:docMk/>
-            <pc:sldMk cId="2475769336" sldId="256"/>
-            <ac:spMk id="18" creationId="{FAEC7126-360F-48F6-B800-9FD3C78E0C92}"/>
-          </ac:spMkLst>
-        </pc:spChg>
-        <pc:spChg chg="add del mod">
-          <ac:chgData name="Ingmar Wever" userId="1d4f24f3f093ab16" providerId="LiveId" clId="{982A7207-6ECB-4C04-B0B1-32E71348DA82}" dt="2017-12-09T22:10:50.259" v="533" actId="478"/>
-          <ac:spMkLst>
-            <pc:docMk/>
-            <pc:sldMk cId="2475769336" sldId="256"/>
-            <ac:spMk id="26" creationId="{946CF240-A5F1-4361-90C9-84E5EDEC4C10}"/>
-          </ac:spMkLst>
-        </pc:spChg>
-        <pc:spChg chg="add mod">
-          <ac:chgData name="Ingmar Wever" userId="1d4f24f3f093ab16" providerId="LiveId" clId="{982A7207-6ECB-4C04-B0B1-32E71348DA82}" dt="2017-12-10T15:45:29.777" v="3063" actId="1038"/>
-          <ac:spMkLst>
-            <pc:docMk/>
-            <pc:sldMk cId="2475769336" sldId="256"/>
-            <ac:spMk id="36" creationId="{47765D71-534C-4EAC-9399-045ECCA3E653}"/>
-          </ac:spMkLst>
-        </pc:spChg>
-        <pc:spChg chg="add mod">
-          <ac:chgData name="Ingmar Wever" userId="1d4f24f3f093ab16" providerId="LiveId" clId="{982A7207-6ECB-4C04-B0B1-32E71348DA82}" dt="2017-12-10T15:45:29.777" v="3063" actId="1038"/>
-          <ac:spMkLst>
-            <pc:docMk/>
-            <pc:sldMk cId="2475769336" sldId="256"/>
-            <ac:spMk id="37" creationId="{DA453CCB-3CD2-49B2-9E61-64146D9F192E}"/>
-          </ac:spMkLst>
-        </pc:spChg>
-        <pc:spChg chg="add mod ord">
-          <ac:chgData name="Ingmar Wever" userId="1d4f24f3f093ab16" providerId="LiveId" clId="{982A7207-6ECB-4C04-B0B1-32E71348DA82}" dt="2017-12-10T15:45:29.777" v="3063" actId="1038"/>
-          <ac:spMkLst>
-            <pc:docMk/>
-            <pc:sldMk cId="2475769336" sldId="256"/>
-            <ac:spMk id="38" creationId="{5DDAB8EA-1463-4D80-BEA3-190A678C7690}"/>
-          </ac:spMkLst>
-        </pc:spChg>
-        <pc:spChg chg="mod topLvl">
-          <ac:chgData name="Ingmar Wever" userId="1d4f24f3f093ab16" providerId="LiveId" clId="{982A7207-6ECB-4C04-B0B1-32E71348DA82}" dt="2017-12-10T15:45:29.777" v="3063" actId="1038"/>
-          <ac:spMkLst>
-            <pc:docMk/>
-            <pc:sldMk cId="2475769336" sldId="256"/>
-            <ac:spMk id="39" creationId="{E33725BF-4E07-402F-A92C-2E5BE7BED26B}"/>
-          </ac:spMkLst>
-        </pc:spChg>
-        <pc:spChg chg="add mod ord">
-          <ac:chgData name="Ingmar Wever" userId="1d4f24f3f093ab16" providerId="LiveId" clId="{982A7207-6ECB-4C04-B0B1-32E71348DA82}" dt="2017-12-10T15:45:29.777" v="3063" actId="1038"/>
-          <ac:spMkLst>
-            <pc:docMk/>
-            <pc:sldMk cId="2475769336" sldId="256"/>
-            <ac:spMk id="40" creationId="{56CD661E-9F77-42B2-A188-4A99FB69A031}"/>
-          </ac:spMkLst>
-        </pc:spChg>
-        <pc:spChg chg="add mod">
-          <ac:chgData name="Ingmar Wever" userId="1d4f24f3f093ab16" providerId="LiveId" clId="{982A7207-6ECB-4C04-B0B1-32E71348DA82}" dt="2017-12-10T15:45:29.777" v="3063" actId="1038"/>
-          <ac:spMkLst>
-            <pc:docMk/>
-            <pc:sldMk cId="2475769336" sldId="256"/>
-            <ac:spMk id="41" creationId="{C160E7D4-6CF5-4A24-A863-B501C344B67D}"/>
-          </ac:spMkLst>
-        </pc:spChg>
-        <pc:spChg chg="add mod">
-          <ac:chgData name="Ingmar Wever" userId="1d4f24f3f093ab16" providerId="LiveId" clId="{982A7207-6ECB-4C04-B0B1-32E71348DA82}" dt="2017-12-10T15:45:29.777" v="3063" actId="1038"/>
-          <ac:spMkLst>
-            <pc:docMk/>
-            <pc:sldMk cId="2475769336" sldId="256"/>
-            <ac:spMk id="42" creationId="{0D14D31E-A1BF-4F38-813D-52942A3CA90C}"/>
-          </ac:spMkLst>
-        </pc:spChg>
-        <pc:spChg chg="add mod">
-          <ac:chgData name="Ingmar Wever" userId="1d4f24f3f093ab16" providerId="LiveId" clId="{982A7207-6ECB-4C04-B0B1-32E71348DA82}" dt="2017-12-10T15:45:29.777" v="3063" actId="1038"/>
+        <pc:spChg chg="mod">
+          <ac:chgData name="Ingmar Wever" userId="1d4f24f3f093ab16" providerId="LiveId" clId="{C4B11D4C-2B70-4127-8D62-8F44844788BA}" dt="2018-03-19T10:07:42.063" v="1" actId="20577"/>
           <ac:spMkLst>
             <pc:docMk/>
             <pc:sldMk cId="2475769336" sldId="256"/>
             <ac:spMk id="57" creationId="{B45FE528-F529-4D59-9D43-71FDBC206BEA}"/>
           </ac:spMkLst>
         </pc:spChg>
-        <pc:spChg chg="add mod">
-          <ac:chgData name="Ingmar Wever" userId="1d4f24f3f093ab16" providerId="LiveId" clId="{982A7207-6ECB-4C04-B0B1-32E71348DA82}" dt="2017-12-10T15:45:29.777" v="3063" actId="1038"/>
+        <pc:spChg chg="mod">
+          <ac:chgData name="Ingmar Wever" userId="1d4f24f3f093ab16" providerId="LiveId" clId="{C4B11D4C-2B70-4127-8D62-8F44844788BA}" dt="2018-03-19T10:19:14.568" v="20" actId="20577"/>
           <ac:spMkLst>
             <pc:docMk/>
             <pc:sldMk cId="2475769336" sldId="256"/>
             <ac:spMk id="58" creationId="{C1D653E8-BF65-4F46-AAD6-BBBBA201B56A}"/>
           </ac:spMkLst>
         </pc:spChg>
-        <pc:spChg chg="add mod">
-          <ac:chgData name="Ingmar Wever" userId="1d4f24f3f093ab16" providerId="LiveId" clId="{982A7207-6ECB-4C04-B0B1-32E71348DA82}" dt="2017-12-10T15:45:29.777" v="3063" actId="1038"/>
+        <pc:spChg chg="mod">
+          <ac:chgData name="Ingmar Wever" userId="1d4f24f3f093ab16" providerId="LiveId" clId="{C4B11D4C-2B70-4127-8D62-8F44844788BA}" dt="2018-03-19T10:19:35.782" v="52" actId="20577"/>
           <ac:spMkLst>
             <pc:docMk/>
             <pc:sldMk cId="2475769336" sldId="256"/>
             <ac:spMk id="59" creationId="{89D7863A-4A22-408A-A609-C452B892B8A7}"/>
           </ac:spMkLst>
         </pc:spChg>
-        <pc:spChg chg="add mod">
-          <ac:chgData name="Ingmar Wever" userId="1d4f24f3f093ab16" providerId="LiveId" clId="{982A7207-6ECB-4C04-B0B1-32E71348DA82}" dt="2017-12-10T15:45:29.777" v="3063" actId="1038"/>
-          <ac:spMkLst>
-            <pc:docMk/>
-            <pc:sldMk cId="2475769336" sldId="256"/>
-            <ac:spMk id="61" creationId="{75CBD1DC-D7A9-401F-9FA7-2E8B21D6B805}"/>
-          </ac:spMkLst>
-        </pc:spChg>
-        <pc:spChg chg="mod topLvl">
-          <ac:chgData name="Ingmar Wever" userId="1d4f24f3f093ab16" providerId="LiveId" clId="{982A7207-6ECB-4C04-B0B1-32E71348DA82}" dt="2017-12-10T15:45:29.777" v="3063" actId="1038"/>
-          <ac:spMkLst>
-            <pc:docMk/>
-            <pc:sldMk cId="2475769336" sldId="256"/>
-            <ac:spMk id="64" creationId="{0B597E08-C3FD-43A2-A162-36F93F57EC85}"/>
-          </ac:spMkLst>
-        </pc:spChg>
-        <pc:spChg chg="add mod">
-          <ac:chgData name="Ingmar Wever" userId="1d4f24f3f093ab16" providerId="LiveId" clId="{982A7207-6ECB-4C04-B0B1-32E71348DA82}" dt="2017-12-10T15:45:29.777" v="3063" actId="1038"/>
-          <ac:spMkLst>
-            <pc:docMk/>
-            <pc:sldMk cId="2475769336" sldId="256"/>
-            <ac:spMk id="65" creationId="{72172549-97A0-4990-89A9-075756DEE991}"/>
-          </ac:spMkLst>
-        </pc:spChg>
-        <pc:spChg chg="add mod">
-          <ac:chgData name="Ingmar Wever" userId="1d4f24f3f093ab16" providerId="LiveId" clId="{982A7207-6ECB-4C04-B0B1-32E71348DA82}" dt="2017-12-10T16:20:16.530" v="3587" actId="1036"/>
-          <ac:spMkLst>
-            <pc:docMk/>
-            <pc:sldMk cId="2475769336" sldId="256"/>
-            <ac:spMk id="67" creationId="{15E47AE0-5759-41FC-87DC-51045ED1ACC2}"/>
-          </ac:spMkLst>
-        </pc:spChg>
-        <pc:spChg chg="add mod">
-          <ac:chgData name="Ingmar Wever" userId="1d4f24f3f093ab16" providerId="LiveId" clId="{982A7207-6ECB-4C04-B0B1-32E71348DA82}" dt="2017-12-10T15:45:29.777" v="3063" actId="1038"/>
-          <ac:spMkLst>
-            <pc:docMk/>
-            <pc:sldMk cId="2475769336" sldId="256"/>
-            <ac:spMk id="68" creationId="{63A2A0CE-4A01-485B-925E-6CF63262C906}"/>
-          </ac:spMkLst>
-        </pc:spChg>
-        <pc:spChg chg="add mod">
-          <ac:chgData name="Ingmar Wever" userId="1d4f24f3f093ab16" providerId="LiveId" clId="{982A7207-6ECB-4C04-B0B1-32E71348DA82}" dt="2017-12-10T15:45:29.777" v="3063" actId="1038"/>
-          <ac:spMkLst>
-            <pc:docMk/>
-            <pc:sldMk cId="2475769336" sldId="256"/>
-            <ac:spMk id="69" creationId="{F0618B27-D2BB-49A0-A09E-6574545E006C}"/>
-          </ac:spMkLst>
-        </pc:spChg>
-        <pc:spChg chg="add mod">
-          <ac:chgData name="Ingmar Wever" userId="1d4f24f3f093ab16" providerId="LiveId" clId="{982A7207-6ECB-4C04-B0B1-32E71348DA82}" dt="2017-12-11T00:08:28.541" v="3670" actId="1036"/>
-          <ac:spMkLst>
-            <pc:docMk/>
-            <pc:sldMk cId="2475769336" sldId="256"/>
-            <ac:spMk id="70" creationId="{A2D99CA9-48B4-4D9F-802A-9FECDD261DE1}"/>
-          </ac:spMkLst>
-        </pc:spChg>
-        <pc:spChg chg="add mod">
-          <ac:chgData name="Ingmar Wever" userId="1d4f24f3f093ab16" providerId="LiveId" clId="{982A7207-6ECB-4C04-B0B1-32E71348DA82}" dt="2017-12-11T00:08:23.988" v="3668" actId="1036"/>
-          <ac:spMkLst>
-            <pc:docMk/>
-            <pc:sldMk cId="2475769336" sldId="256"/>
-            <ac:spMk id="71" creationId="{F81D5DBD-0704-4B96-A2FF-C1241239BD00}"/>
-          </ac:spMkLst>
-        </pc:spChg>
-        <pc:spChg chg="add mod">
-          <ac:chgData name="Ingmar Wever" userId="1d4f24f3f093ab16" providerId="LiveId" clId="{982A7207-6ECB-4C04-B0B1-32E71348DA82}" dt="2017-12-10T15:45:29.777" v="3063" actId="1038"/>
-          <ac:spMkLst>
-            <pc:docMk/>
-            <pc:sldMk cId="2475769336" sldId="256"/>
-            <ac:spMk id="72" creationId="{AC849FF6-C192-4C7B-B560-B368DC1A5153}"/>
-          </ac:spMkLst>
-        </pc:spChg>
-        <pc:spChg chg="mod topLvl">
-          <ac:chgData name="Ingmar Wever" userId="1d4f24f3f093ab16" providerId="LiveId" clId="{982A7207-6ECB-4C04-B0B1-32E71348DA82}" dt="2017-12-10T15:45:29.777" v="3063" actId="1038"/>
-          <ac:spMkLst>
-            <pc:docMk/>
-            <pc:sldMk cId="2475769336" sldId="256"/>
-            <ac:spMk id="73" creationId="{591FEC4E-9332-4A10-A1F9-05BFD021FDA1}"/>
-          </ac:spMkLst>
-        </pc:spChg>
-        <pc:spChg chg="add mod">
-          <ac:chgData name="Ingmar Wever" userId="1d4f24f3f093ab16" providerId="LiveId" clId="{982A7207-6ECB-4C04-B0B1-32E71348DA82}" dt="2017-12-10T15:51:50.667" v="3153" actId="1035"/>
-          <ac:spMkLst>
-            <pc:docMk/>
-            <pc:sldMk cId="2475769336" sldId="256"/>
-            <ac:spMk id="75" creationId="{EFCA47AC-B2EC-4CEE-9E37-D2FF9F39CFAE}"/>
-          </ac:spMkLst>
-        </pc:spChg>
-        <pc:spChg chg="add mod">
-          <ac:chgData name="Ingmar Wever" userId="1d4f24f3f093ab16" providerId="LiveId" clId="{982A7207-6ECB-4C04-B0B1-32E71348DA82}" dt="2017-12-10T15:45:29.777" v="3063" actId="1038"/>
-          <ac:spMkLst>
-            <pc:docMk/>
-            <pc:sldMk cId="2475769336" sldId="256"/>
-            <ac:spMk id="76" creationId="{5132490D-E5ED-445A-A551-0F12E0F57D6A}"/>
-          </ac:spMkLst>
-        </pc:spChg>
-        <pc:spChg chg="add mod">
-          <ac:chgData name="Ingmar Wever" userId="1d4f24f3f093ab16" providerId="LiveId" clId="{982A7207-6ECB-4C04-B0B1-32E71348DA82}" dt="2017-12-10T15:45:29.777" v="3063" actId="1038"/>
-          <ac:spMkLst>
-            <pc:docMk/>
-            <pc:sldMk cId="2475769336" sldId="256"/>
-            <ac:spMk id="77" creationId="{1B256745-3117-4AF4-B846-C012213304B0}"/>
-          </ac:spMkLst>
-        </pc:spChg>
-        <pc:spChg chg="add mod">
-          <ac:chgData name="Ingmar Wever" userId="1d4f24f3f093ab16" providerId="LiveId" clId="{982A7207-6ECB-4C04-B0B1-32E71348DA82}" dt="2017-12-10T15:45:29.777" v="3063" actId="1038"/>
-          <ac:spMkLst>
-            <pc:docMk/>
-            <pc:sldMk cId="2475769336" sldId="256"/>
-            <ac:spMk id="79" creationId="{BC48C863-E428-464D-AC1D-2A7F67C29EBE}"/>
-          </ac:spMkLst>
-        </pc:spChg>
-        <pc:spChg chg="add mod">
-          <ac:chgData name="Ingmar Wever" userId="1d4f24f3f093ab16" providerId="LiveId" clId="{982A7207-6ECB-4C04-B0B1-32E71348DA82}" dt="2017-12-10T15:45:29.777" v="3063" actId="1038"/>
-          <ac:spMkLst>
-            <pc:docMk/>
-            <pc:sldMk cId="2475769336" sldId="256"/>
-            <ac:spMk id="81" creationId="{51959774-4ACF-4DE2-9320-661F560155E8}"/>
-          </ac:spMkLst>
-        </pc:spChg>
-        <pc:spChg chg="add mod">
-          <ac:chgData name="Ingmar Wever" userId="1d4f24f3f093ab16" providerId="LiveId" clId="{982A7207-6ECB-4C04-B0B1-32E71348DA82}" dt="2017-12-10T15:45:29.777" v="3063" actId="1038"/>
-          <ac:spMkLst>
-            <pc:docMk/>
-            <pc:sldMk cId="2475769336" sldId="256"/>
-            <ac:spMk id="84" creationId="{287924B5-C470-4418-96A6-71C3C1F7237E}"/>
-          </ac:spMkLst>
-        </pc:spChg>
-        <pc:spChg chg="add mod">
-          <ac:chgData name="Ingmar Wever" userId="1d4f24f3f093ab16" providerId="LiveId" clId="{982A7207-6ECB-4C04-B0B1-32E71348DA82}" dt="2017-12-10T15:45:29.777" v="3063" actId="1038"/>
-          <ac:spMkLst>
-            <pc:docMk/>
-            <pc:sldMk cId="2475769336" sldId="256"/>
-            <ac:spMk id="85" creationId="{4060F96A-3B74-4606-A496-4EEB9138C2F2}"/>
-          </ac:spMkLst>
-        </pc:spChg>
-        <pc:spChg chg="add mod">
-          <ac:chgData name="Ingmar Wever" userId="1d4f24f3f093ab16" providerId="LiveId" clId="{982A7207-6ECB-4C04-B0B1-32E71348DA82}" dt="2017-12-10T15:45:29.777" v="3063" actId="1038"/>
-          <ac:spMkLst>
-            <pc:docMk/>
-            <pc:sldMk cId="2475769336" sldId="256"/>
-            <ac:spMk id="86" creationId="{D53E4B48-A197-4B67-8886-EF3C6260AFFC}"/>
-          </ac:spMkLst>
-        </pc:spChg>
-        <pc:spChg chg="add mod">
-          <ac:chgData name="Ingmar Wever" userId="1d4f24f3f093ab16" providerId="LiveId" clId="{982A7207-6ECB-4C04-B0B1-32E71348DA82}" dt="2017-12-10T15:45:29.777" v="3063" actId="1038"/>
-          <ac:spMkLst>
-            <pc:docMk/>
-            <pc:sldMk cId="2475769336" sldId="256"/>
-            <ac:spMk id="87" creationId="{8BF311EB-5D11-4090-9141-083A8C65AC1F}"/>
-          </ac:spMkLst>
-        </pc:spChg>
-        <pc:spChg chg="add mod">
-          <ac:chgData name="Ingmar Wever" userId="1d4f24f3f093ab16" providerId="LiveId" clId="{982A7207-6ECB-4C04-B0B1-32E71348DA82}" dt="2017-12-10T15:53:50.268" v="3198" actId="14100"/>
-          <ac:spMkLst>
-            <pc:docMk/>
-            <pc:sldMk cId="2475769336" sldId="256"/>
-            <ac:spMk id="89" creationId="{85A9A45F-6A0D-4294-8F95-879AC31075AC}"/>
-          </ac:spMkLst>
-        </pc:spChg>
-        <pc:spChg chg="add mod">
-          <ac:chgData name="Ingmar Wever" userId="1d4f24f3f093ab16" providerId="LiveId" clId="{982A7207-6ECB-4C04-B0B1-32E71348DA82}" dt="2017-12-10T15:52:58.698" v="3197" actId="1076"/>
-          <ac:spMkLst>
-            <pc:docMk/>
-            <pc:sldMk cId="2475769336" sldId="256"/>
-            <ac:spMk id="90" creationId="{55281B45-9056-43A2-B9E5-843646369A57}"/>
-          </ac:spMkLst>
-        </pc:spChg>
-        <pc:spChg chg="add mod">
-          <ac:chgData name="Ingmar Wever" userId="1d4f24f3f093ab16" providerId="LiveId" clId="{982A7207-6ECB-4C04-B0B1-32E71348DA82}" dt="2017-12-10T15:45:40.612" v="3089" actId="1038"/>
-          <ac:spMkLst>
-            <pc:docMk/>
-            <pc:sldMk cId="2475769336" sldId="256"/>
-            <ac:spMk id="92" creationId="{A94C0E11-6B4A-43E7-837D-72BF849D5D7D}"/>
-          </ac:spMkLst>
-        </pc:spChg>
-        <pc:spChg chg="add mod">
-          <ac:chgData name="Ingmar Wever" userId="1d4f24f3f093ab16" providerId="LiveId" clId="{982A7207-6ECB-4C04-B0B1-32E71348DA82}" dt="2017-12-10T15:45:29.777" v="3063" actId="1038"/>
-          <ac:spMkLst>
-            <pc:docMk/>
-            <pc:sldMk cId="2475769336" sldId="256"/>
-            <ac:spMk id="93" creationId="{81C77448-ED85-4448-B431-8EB14E6BE84F}"/>
-          </ac:spMkLst>
-        </pc:spChg>
-        <pc:spChg chg="add mod">
-          <ac:chgData name="Ingmar Wever" userId="1d4f24f3f093ab16" providerId="LiveId" clId="{982A7207-6ECB-4C04-B0B1-32E71348DA82}" dt="2017-12-10T15:45:29.777" v="3063" actId="1038"/>
-          <ac:spMkLst>
-            <pc:docMk/>
-            <pc:sldMk cId="2475769336" sldId="256"/>
-            <ac:spMk id="94" creationId="{52C027A6-0539-4D94-B0B9-B5A5069B60CD}"/>
-          </ac:spMkLst>
-        </pc:spChg>
-        <pc:spChg chg="add mod">
-          <ac:chgData name="Ingmar Wever" userId="1d4f24f3f093ab16" providerId="LiveId" clId="{982A7207-6ECB-4C04-B0B1-32E71348DA82}" dt="2017-12-10T15:45:29.777" v="3063" actId="1038"/>
-          <ac:spMkLst>
-            <pc:docMk/>
-            <pc:sldMk cId="2475769336" sldId="256"/>
-            <ac:spMk id="95" creationId="{FE908ED3-077F-4E13-8824-853C74FA7668}"/>
-          </ac:spMkLst>
-        </pc:spChg>
-        <pc:spChg chg="add mod">
-          <ac:chgData name="Ingmar Wever" userId="1d4f24f3f093ab16" providerId="LiveId" clId="{982A7207-6ECB-4C04-B0B1-32E71348DA82}" dt="2017-12-11T00:06:33.554" v="3646" actId="14838"/>
-          <ac:spMkLst>
-            <pc:docMk/>
-            <pc:sldMk cId="2475769336" sldId="256"/>
-            <ac:spMk id="96" creationId="{12898C34-C36B-4DF5-AAB7-0DED41CF8380}"/>
-          </ac:spMkLst>
-        </pc:spChg>
-        <pc:spChg chg="add mod">
-          <ac:chgData name="Ingmar Wever" userId="1d4f24f3f093ab16" providerId="LiveId" clId="{982A7207-6ECB-4C04-B0B1-32E71348DA82}" dt="2017-12-10T15:45:29.777" v="3063" actId="1038"/>
-          <ac:spMkLst>
-            <pc:docMk/>
-            <pc:sldMk cId="2475769336" sldId="256"/>
-            <ac:spMk id="97" creationId="{199757A3-247A-4663-83B3-735AE5794726}"/>
-          </ac:spMkLst>
-        </pc:spChg>
-        <pc:spChg chg="add mod">
-          <ac:chgData name="Ingmar Wever" userId="1d4f24f3f093ab16" providerId="LiveId" clId="{982A7207-6ECB-4C04-B0B1-32E71348DA82}" dt="2017-12-10T15:45:29.777" v="3063" actId="1038"/>
-          <ac:spMkLst>
-            <pc:docMk/>
-            <pc:sldMk cId="2475769336" sldId="256"/>
-            <ac:spMk id="98" creationId="{AA58A74C-6142-4B92-8890-17CD6CED6A11}"/>
-          </ac:spMkLst>
-        </pc:spChg>
-        <pc:spChg chg="add mod">
-          <ac:chgData name="Ingmar Wever" userId="1d4f24f3f093ab16" providerId="LiveId" clId="{982A7207-6ECB-4C04-B0B1-32E71348DA82}" dt="2017-12-10T15:45:29.777" v="3063" actId="1038"/>
-          <ac:spMkLst>
-            <pc:docMk/>
-            <pc:sldMk cId="2475769336" sldId="256"/>
-            <ac:spMk id="99" creationId="{03E72F53-07EC-4017-9C7D-EB32B6CD3065}"/>
-          </ac:spMkLst>
-        </pc:spChg>
-        <pc:spChg chg="add mod">
-          <ac:chgData name="Ingmar Wever" userId="1d4f24f3f093ab16" providerId="LiveId" clId="{982A7207-6ECB-4C04-B0B1-32E71348DA82}" dt="2017-12-10T15:45:29.777" v="3063" actId="1038"/>
-          <ac:spMkLst>
-            <pc:docMk/>
-            <pc:sldMk cId="2475769336" sldId="256"/>
-            <ac:spMk id="100" creationId="{C6292B42-EAC4-4094-A6AF-6E816063B587}"/>
-          </ac:spMkLst>
-        </pc:spChg>
-        <pc:spChg chg="add mod">
-          <ac:chgData name="Ingmar Wever" userId="1d4f24f3f093ab16" providerId="LiveId" clId="{982A7207-6ECB-4C04-B0B1-32E71348DA82}" dt="2017-12-10T15:45:29.777" v="3063" actId="1038"/>
-          <ac:spMkLst>
-            <pc:docMk/>
-            <pc:sldMk cId="2475769336" sldId="256"/>
-            <ac:spMk id="101" creationId="{65EC83EA-2F84-41EF-88F5-DBBC8E633BD0}"/>
-          </ac:spMkLst>
-        </pc:spChg>
-        <pc:spChg chg="add mod">
-          <ac:chgData name="Ingmar Wever" userId="1d4f24f3f093ab16" providerId="LiveId" clId="{982A7207-6ECB-4C04-B0B1-32E71348DA82}" dt="2017-12-10T15:45:29.777" v="3063" actId="1038"/>
-          <ac:spMkLst>
-            <pc:docMk/>
-            <pc:sldMk cId="2475769336" sldId="256"/>
-            <ac:spMk id="102" creationId="{96E9DBEB-4715-479E-B707-9C3632FE186E}"/>
-          </ac:spMkLst>
-        </pc:spChg>
-        <pc:spChg chg="add mod">
-          <ac:chgData name="Ingmar Wever" userId="1d4f24f3f093ab16" providerId="LiveId" clId="{982A7207-6ECB-4C04-B0B1-32E71348DA82}" dt="2017-12-11T00:08:44.953" v="3672" actId="1035"/>
-          <ac:spMkLst>
-            <pc:docMk/>
-            <pc:sldMk cId="2475769336" sldId="256"/>
-            <ac:spMk id="107" creationId="{0B962A83-E7CC-4E03-B37C-DB1B887507C3}"/>
-          </ac:spMkLst>
-        </pc:spChg>
-        <pc:spChg chg="add del mod">
-          <ac:chgData name="Ingmar Wever" userId="1d4f24f3f093ab16" providerId="LiveId" clId="{982A7207-6ECB-4C04-B0B1-32E71348DA82}" dt="2017-12-09T22:58:11.941" v="1909" actId="478"/>
-          <ac:spMkLst>
-            <pc:docMk/>
-            <pc:sldMk cId="2475769336" sldId="256"/>
-            <ac:spMk id="108" creationId="{A3A778F4-D653-4B7D-9BCD-07E2057BAA85}"/>
-          </ac:spMkLst>
-        </pc:spChg>
-        <pc:spChg chg="add mod">
-          <ac:chgData name="Ingmar Wever" userId="1d4f24f3f093ab16" providerId="LiveId" clId="{982A7207-6ECB-4C04-B0B1-32E71348DA82}" dt="2017-12-10T15:45:29.777" v="3063" actId="1038"/>
+        <pc:spChg chg="del">
+          <ac:chgData name="Ingmar Wever" userId="1d4f24f3f093ab16" providerId="LiveId" clId="{C4B11D4C-2B70-4127-8D62-8F44844788BA}" dt="2018-03-19T09:44:40.261" v="0" actId="478"/>
           <ac:spMkLst>
             <pc:docMk/>
             <pc:sldMk cId="2475769336" sldId="256"/>
             <ac:spMk id="112" creationId="{56AA9E43-ABC6-41D5-8224-286F29C208C8}"/>
           </ac:spMkLst>
         </pc:spChg>
-        <pc:spChg chg="add mod">
-          <ac:chgData name="Ingmar Wever" userId="1d4f24f3f093ab16" providerId="LiveId" clId="{982A7207-6ECB-4C04-B0B1-32E71348DA82}" dt="2017-12-10T15:45:29.777" v="3063" actId="1038"/>
-          <ac:spMkLst>
-            <pc:docMk/>
-            <pc:sldMk cId="2475769336" sldId="256"/>
-            <ac:spMk id="113" creationId="{D6188D86-9F45-4678-9D9D-376BD7FBED32}"/>
-          </ac:spMkLst>
-        </pc:spChg>
-        <pc:spChg chg="add mod">
-          <ac:chgData name="Ingmar Wever" userId="1d4f24f3f093ab16" providerId="LiveId" clId="{982A7207-6ECB-4C04-B0B1-32E71348DA82}" dt="2017-12-10T15:45:29.777" v="3063" actId="1038"/>
-          <ac:spMkLst>
-            <pc:docMk/>
-            <pc:sldMk cId="2475769336" sldId="256"/>
-            <ac:spMk id="114" creationId="{3584DDE0-0C05-4F62-8AAD-F3B60E5A31CA}"/>
-          </ac:spMkLst>
-        </pc:spChg>
-        <pc:spChg chg="add mod">
-          <ac:chgData name="Ingmar Wever" userId="1d4f24f3f093ab16" providerId="LiveId" clId="{982A7207-6ECB-4C04-B0B1-32E71348DA82}" dt="2017-12-10T15:52:50.500" v="3194" actId="1076"/>
-          <ac:spMkLst>
-            <pc:docMk/>
-            <pc:sldMk cId="2475769336" sldId="256"/>
-            <ac:spMk id="115" creationId="{BCF3B301-9034-4703-9D61-011BCD97D03C}"/>
-          </ac:spMkLst>
-        </pc:spChg>
-        <pc:spChg chg="add mod">
-          <ac:chgData name="Ingmar Wever" userId="1d4f24f3f093ab16" providerId="LiveId" clId="{982A7207-6ECB-4C04-B0B1-32E71348DA82}" dt="2017-12-10T15:45:29.777" v="3063" actId="1038"/>
-          <ac:spMkLst>
-            <pc:docMk/>
-            <pc:sldMk cId="2475769336" sldId="256"/>
-            <ac:spMk id="116" creationId="{7995834C-8B28-4425-9418-726D5446A8EE}"/>
-          </ac:spMkLst>
-        </pc:spChg>
-        <pc:spChg chg="add del mod">
-          <ac:chgData name="Ingmar Wever" userId="1d4f24f3f093ab16" providerId="LiveId" clId="{982A7207-6ECB-4C04-B0B1-32E71348DA82}" dt="2017-12-09T23:13:58.348" v="2401" actId="1036"/>
-          <ac:spMkLst>
-            <pc:docMk/>
-            <pc:sldMk cId="2475769336" sldId="256"/>
-            <ac:spMk id="132" creationId="{540A186F-9FBA-4F37-910A-A40A3BB464FF}"/>
-          </ac:spMkLst>
-        </pc:spChg>
-        <pc:spChg chg="add del mod ord">
-          <ac:chgData name="Ingmar Wever" userId="1d4f24f3f093ab16" providerId="LiveId" clId="{982A7207-6ECB-4C04-B0B1-32E71348DA82}" dt="2017-12-09T23:13:58.348" v="2401" actId="1036"/>
-          <ac:spMkLst>
-            <pc:docMk/>
-            <pc:sldMk cId="2475769336" sldId="256"/>
-            <ac:spMk id="133" creationId="{C4C6170E-92BF-4252-836E-927A3FD1B4F1}"/>
-          </ac:spMkLst>
-        </pc:spChg>
-        <pc:spChg chg="add del mod">
-          <ac:chgData name="Ingmar Wever" userId="1d4f24f3f093ab16" providerId="LiveId" clId="{982A7207-6ECB-4C04-B0B1-32E71348DA82}" dt="2017-12-09T23:13:58.348" v="2401" actId="1036"/>
-          <ac:spMkLst>
-            <pc:docMk/>
-            <pc:sldMk cId="2475769336" sldId="256"/>
-            <ac:spMk id="134" creationId="{94C557AA-E447-4DB7-B639-03CC28876A43}"/>
-          </ac:spMkLst>
-        </pc:spChg>
-        <pc:spChg chg="add del mod">
-          <ac:chgData name="Ingmar Wever" userId="1d4f24f3f093ab16" providerId="LiveId" clId="{982A7207-6ECB-4C04-B0B1-32E71348DA82}" dt="2017-12-09T23:13:58.348" v="2401" actId="1036"/>
-          <ac:spMkLst>
-            <pc:docMk/>
-            <pc:sldMk cId="2475769336" sldId="256"/>
-            <ac:spMk id="135" creationId="{C5D4DBF7-BE8E-47E4-906B-28E8539B35F9}"/>
-          </ac:spMkLst>
-        </pc:spChg>
-        <pc:spChg chg="add del ord">
-          <ac:chgData name="Ingmar Wever" userId="1d4f24f3f093ab16" providerId="LiveId" clId="{982A7207-6ECB-4C04-B0B1-32E71348DA82}" dt="2017-12-09T23:13:58.348" v="2401" actId="1036"/>
-          <ac:spMkLst>
-            <pc:docMk/>
-            <pc:sldMk cId="2475769336" sldId="256"/>
-            <ac:spMk id="136" creationId="{6A505175-CB3F-4F29-B26F-0DBB092FABA3}"/>
-          </ac:spMkLst>
-        </pc:spChg>
-        <pc:spChg chg="add del ord">
-          <ac:chgData name="Ingmar Wever" userId="1d4f24f3f093ab16" providerId="LiveId" clId="{982A7207-6ECB-4C04-B0B1-32E71348DA82}" dt="2017-12-09T23:13:58.348" v="2401" actId="1036"/>
-          <ac:spMkLst>
-            <pc:docMk/>
-            <pc:sldMk cId="2475769336" sldId="256"/>
-            <ac:spMk id="137" creationId="{96B0DF8A-8C85-4050-A2A9-900B65A0E852}"/>
-          </ac:spMkLst>
-        </pc:spChg>
-        <pc:spChg chg="add del mod ord">
-          <ac:chgData name="Ingmar Wever" userId="1d4f24f3f093ab16" providerId="LiveId" clId="{982A7207-6ECB-4C04-B0B1-32E71348DA82}" dt="2017-12-09T23:13:58.348" v="2401" actId="1036"/>
-          <ac:spMkLst>
-            <pc:docMk/>
-            <pc:sldMk cId="2475769336" sldId="256"/>
-            <ac:spMk id="138" creationId="{98E44A6F-8BEF-4442-AD1D-0CFF6259B7DC}"/>
-          </ac:spMkLst>
-        </pc:spChg>
-        <pc:spChg chg="add del mod ord">
-          <ac:chgData name="Ingmar Wever" userId="1d4f24f3f093ab16" providerId="LiveId" clId="{982A7207-6ECB-4C04-B0B1-32E71348DA82}" dt="2017-12-09T23:13:58.348" v="2401" actId="1036"/>
-          <ac:spMkLst>
-            <pc:docMk/>
-            <pc:sldMk cId="2475769336" sldId="256"/>
-            <ac:spMk id="139" creationId="{0066549F-B41A-489A-A804-5FB3246331E7}"/>
-          </ac:spMkLst>
-        </pc:spChg>
-        <pc:spChg chg="add del mod">
-          <ac:chgData name="Ingmar Wever" userId="1d4f24f3f093ab16" providerId="LiveId" clId="{982A7207-6ECB-4C04-B0B1-32E71348DA82}" dt="2017-12-09T23:13:58.348" v="2401" actId="1036"/>
-          <ac:spMkLst>
-            <pc:docMk/>
-            <pc:sldMk cId="2475769336" sldId="256"/>
-            <ac:spMk id="140" creationId="{F9F57120-8758-4A02-9622-3B3AB0AFF01A}"/>
-          </ac:spMkLst>
-        </pc:spChg>
-        <pc:spChg chg="add del mod">
-          <ac:chgData name="Ingmar Wever" userId="1d4f24f3f093ab16" providerId="LiveId" clId="{982A7207-6ECB-4C04-B0B1-32E71348DA82}" dt="2017-12-09T23:13:58.348" v="2401" actId="1036"/>
-          <ac:spMkLst>
-            <pc:docMk/>
-            <pc:sldMk cId="2475769336" sldId="256"/>
-            <ac:spMk id="141" creationId="{5D6E0080-4847-4D2F-AB84-FA6AFB868A92}"/>
-          </ac:spMkLst>
-        </pc:spChg>
-        <pc:spChg chg="add del mod">
-          <ac:chgData name="Ingmar Wever" userId="1d4f24f3f093ab16" providerId="LiveId" clId="{982A7207-6ECB-4C04-B0B1-32E71348DA82}" dt="2017-12-09T23:13:58.348" v="2401" actId="1036"/>
-          <ac:spMkLst>
-            <pc:docMk/>
-            <pc:sldMk cId="2475769336" sldId="256"/>
-            <ac:spMk id="142" creationId="{BA1B36A7-1979-4813-926E-0151D0B7D6DD}"/>
-          </ac:spMkLst>
-        </pc:spChg>
-        <pc:spChg chg="add mod">
-          <ac:chgData name="Ingmar Wever" userId="1d4f24f3f093ab16" providerId="LiveId" clId="{982A7207-6ECB-4C04-B0B1-32E71348DA82}" dt="2017-12-10T15:45:55.295" v="3090" actId="1076"/>
-          <ac:spMkLst>
-            <pc:docMk/>
-            <pc:sldMk cId="2475769336" sldId="256"/>
-            <ac:spMk id="143" creationId="{7ED6FB75-B047-4730-93AD-632C91EB02B4}"/>
-          </ac:spMkLst>
-        </pc:spChg>
-        <pc:spChg chg="add mod ord">
-          <ac:chgData name="Ingmar Wever" userId="1d4f24f3f093ab16" providerId="LiveId" clId="{982A7207-6ECB-4C04-B0B1-32E71348DA82}" dt="2017-12-10T23:47:41.329" v="3613" actId="14100"/>
-          <ac:spMkLst>
-            <pc:docMk/>
-            <pc:sldMk cId="2475769336" sldId="256"/>
-            <ac:spMk id="144" creationId="{FCA17FDA-E58A-49A0-AAF8-AED1E8CC8233}"/>
-          </ac:spMkLst>
-        </pc:spChg>
-        <pc:grpChg chg="add del mod">
-          <ac:chgData name="Ingmar Wever" userId="1d4f24f3f093ab16" providerId="LiveId" clId="{982A7207-6ECB-4C04-B0B1-32E71348DA82}" dt="2017-12-09T21:52:41.278" v="22" actId="165"/>
-          <ac:grpSpMkLst>
-            <pc:docMk/>
-            <pc:sldMk cId="2475769336" sldId="256"/>
-            <ac:grpSpMk id="2" creationId="{DD9C44DF-A2B6-4BD1-9467-48C958F70C2F}"/>
-          </ac:grpSpMkLst>
-        </pc:grpChg>
-        <pc:graphicFrameChg chg="add del mod">
-          <ac:chgData name="Ingmar Wever" userId="1d4f24f3f093ab16" providerId="LiveId" clId="{982A7207-6ECB-4C04-B0B1-32E71348DA82}" dt="2017-12-11T13:44:27.997" v="3675"/>
-          <ac:graphicFrameMkLst>
-            <pc:docMk/>
-            <pc:sldMk cId="2475769336" sldId="256"/>
-            <ac:graphicFrameMk id="6" creationId="{F3F4BE5A-6E7C-4066-9E13-35AB1BBEE9AB}"/>
-          </ac:graphicFrameMkLst>
-        </pc:graphicFrameChg>
-        <pc:graphicFrameChg chg="add del mod">
-          <ac:chgData name="Ingmar Wever" userId="1d4f24f3f093ab16" providerId="LiveId" clId="{982A7207-6ECB-4C04-B0B1-32E71348DA82}" dt="2017-12-09T22:44:26.424" v="1503" actId="478"/>
-          <ac:graphicFrameMkLst>
-            <pc:docMk/>
-            <pc:sldMk cId="2475769336" sldId="256"/>
-            <ac:graphicFrameMk id="7" creationId="{7ED2C0DC-353B-4D71-85BB-B3C888FBF237}"/>
-          </ac:graphicFrameMkLst>
-        </pc:graphicFrameChg>
-        <pc:cxnChg chg="mod topLvl">
-          <ac:chgData name="Ingmar Wever" userId="1d4f24f3f093ab16" providerId="LiveId" clId="{982A7207-6ECB-4C04-B0B1-32E71348DA82}" dt="2017-12-10T15:45:29.777" v="3063" actId="1038"/>
-          <ac:cxnSpMkLst>
-            <pc:docMk/>
-            <pc:sldMk cId="2475769336" sldId="256"/>
-            <ac:cxnSpMk id="30" creationId="{531C2060-D587-4E3E-A2B2-8B9931CD51B9}"/>
-          </ac:cxnSpMkLst>
-        </pc:cxnChg>
-        <pc:cxnChg chg="add mod">
-          <ac:chgData name="Ingmar Wever" userId="1d4f24f3f093ab16" providerId="LiveId" clId="{982A7207-6ECB-4C04-B0B1-32E71348DA82}" dt="2017-12-10T15:45:29.777" v="3063" actId="1038"/>
-          <ac:cxnSpMkLst>
-            <pc:docMk/>
-            <pc:sldMk cId="2475769336" sldId="256"/>
-            <ac:cxnSpMk id="43" creationId="{739D7000-098C-4B1C-84E6-44E3B4023B89}"/>
-          </ac:cxnSpMkLst>
-        </pc:cxnChg>
-        <pc:cxnChg chg="add mod">
-          <ac:chgData name="Ingmar Wever" userId="1d4f24f3f093ab16" providerId="LiveId" clId="{982A7207-6ECB-4C04-B0B1-32E71348DA82}" dt="2017-12-10T15:45:29.777" v="3063" actId="1038"/>
-          <ac:cxnSpMkLst>
-            <pc:docMk/>
-            <pc:sldMk cId="2475769336" sldId="256"/>
-            <ac:cxnSpMk id="46" creationId="{7FEDA07D-D507-4DA1-98AC-90BF4FDA3DB7}"/>
-          </ac:cxnSpMkLst>
-        </pc:cxnChg>
-        <pc:cxnChg chg="add mod">
-          <ac:chgData name="Ingmar Wever" userId="1d4f24f3f093ab16" providerId="LiveId" clId="{982A7207-6ECB-4C04-B0B1-32E71348DA82}" dt="2017-12-10T15:45:29.777" v="3063" actId="1038"/>
-          <ac:cxnSpMkLst>
-            <pc:docMk/>
-            <pc:sldMk cId="2475769336" sldId="256"/>
-            <ac:cxnSpMk id="49" creationId="{1498330E-B109-4BD5-9E14-64D5C30623FB}"/>
-          </ac:cxnSpMkLst>
-        </pc:cxnChg>
-        <pc:cxnChg chg="add mod">
-          <ac:chgData name="Ingmar Wever" userId="1d4f24f3f093ab16" providerId="LiveId" clId="{982A7207-6ECB-4C04-B0B1-32E71348DA82}" dt="2017-12-10T15:45:29.777" v="3063" actId="1038"/>
-          <ac:cxnSpMkLst>
-            <pc:docMk/>
-            <pc:sldMk cId="2475769336" sldId="256"/>
-            <ac:cxnSpMk id="54" creationId="{29F7D253-857D-45F1-A67D-9777279BD6AC}"/>
-          </ac:cxnSpMkLst>
-        </pc:cxnChg>
-        <pc:cxnChg chg="mod topLvl">
-          <ac:chgData name="Ingmar Wever" userId="1d4f24f3f093ab16" providerId="LiveId" clId="{982A7207-6ECB-4C04-B0B1-32E71348DA82}" dt="2017-12-10T23:49:13.973" v="3615" actId="14100"/>
-          <ac:cxnSpMkLst>
-            <pc:docMk/>
-            <pc:sldMk cId="2475769336" sldId="256"/>
-            <ac:cxnSpMk id="60" creationId="{BCC96B6A-867F-46F4-B306-98D3A1EEF2CC}"/>
-          </ac:cxnSpMkLst>
-        </pc:cxnChg>
-        <pc:cxnChg chg="add mod">
-          <ac:chgData name="Ingmar Wever" userId="1d4f24f3f093ab16" providerId="LiveId" clId="{982A7207-6ECB-4C04-B0B1-32E71348DA82}" dt="2017-12-10T15:45:29.777" v="3063" actId="1038"/>
-          <ac:cxnSpMkLst>
-            <pc:docMk/>
-            <pc:sldMk cId="2475769336" sldId="256"/>
-            <ac:cxnSpMk id="62" creationId="{A671F835-0FAA-42F1-8704-9D13E740CE78}"/>
-          </ac:cxnSpMkLst>
-        </pc:cxnChg>
-        <pc:cxnChg chg="add mod">
-          <ac:chgData name="Ingmar Wever" userId="1d4f24f3f093ab16" providerId="LiveId" clId="{982A7207-6ECB-4C04-B0B1-32E71348DA82}" dt="2017-12-10T15:45:29.777" v="3063" actId="1038"/>
-          <ac:cxnSpMkLst>
-            <pc:docMk/>
-            <pc:sldMk cId="2475769336" sldId="256"/>
-            <ac:cxnSpMk id="66" creationId="{0A558B8B-864B-43C4-99A5-845A67421D35}"/>
-          </ac:cxnSpMkLst>
-        </pc:cxnChg>
-        <pc:cxnChg chg="mod topLvl">
-          <ac:chgData name="Ingmar Wever" userId="1d4f24f3f093ab16" providerId="LiveId" clId="{982A7207-6ECB-4C04-B0B1-32E71348DA82}" dt="2017-12-10T15:45:29.777" v="3063" actId="1038"/>
-          <ac:cxnSpMkLst>
-            <pc:docMk/>
-            <pc:sldMk cId="2475769336" sldId="256"/>
-            <ac:cxnSpMk id="74" creationId="{D195A4F5-89D4-4B1D-9ECC-7EB321576375}"/>
-          </ac:cxnSpMkLst>
-        </pc:cxnChg>
-        <pc:cxnChg chg="add mod">
-          <ac:chgData name="Ingmar Wever" userId="1d4f24f3f093ab16" providerId="LiveId" clId="{982A7207-6ECB-4C04-B0B1-32E71348DA82}" dt="2017-12-10T15:45:29.777" v="3063" actId="1038"/>
-          <ac:cxnSpMkLst>
-            <pc:docMk/>
-            <pc:sldMk cId="2475769336" sldId="256"/>
-            <ac:cxnSpMk id="78" creationId="{250B4517-1DB6-4A2C-9E9F-98C20879286B}"/>
-          </ac:cxnSpMkLst>
-        </pc:cxnChg>
-        <pc:cxnChg chg="mod topLvl">
-          <ac:chgData name="Ingmar Wever" userId="1d4f24f3f093ab16" providerId="LiveId" clId="{982A7207-6ECB-4C04-B0B1-32E71348DA82}" dt="2017-12-10T15:45:29.777" v="3063" actId="1038"/>
-          <ac:cxnSpMkLst>
-            <pc:docMk/>
-            <pc:sldMk cId="2475769336" sldId="256"/>
-            <ac:cxnSpMk id="80" creationId="{C608EF8E-EAB3-4576-AD72-82A94FF308F3}"/>
-          </ac:cxnSpMkLst>
-        </pc:cxnChg>
-        <pc:cxnChg chg="mod topLvl">
-          <ac:chgData name="Ingmar Wever" userId="1d4f24f3f093ab16" providerId="LiveId" clId="{982A7207-6ECB-4C04-B0B1-32E71348DA82}" dt="2017-12-10T15:45:29.777" v="3063" actId="1038"/>
-          <ac:cxnSpMkLst>
-            <pc:docMk/>
-            <pc:sldMk cId="2475769336" sldId="256"/>
-            <ac:cxnSpMk id="82" creationId="{F7E6CDF7-7088-4E1B-996B-D1D5A79B4B88}"/>
-          </ac:cxnSpMkLst>
-        </pc:cxnChg>
-        <pc:cxnChg chg="add mod">
-          <ac:chgData name="Ingmar Wever" userId="1d4f24f3f093ab16" providerId="LiveId" clId="{982A7207-6ECB-4C04-B0B1-32E71348DA82}" dt="2017-12-10T15:51:50.667" v="3153" actId="1035"/>
-          <ac:cxnSpMkLst>
-            <pc:docMk/>
-            <pc:sldMk cId="2475769336" sldId="256"/>
-            <ac:cxnSpMk id="83" creationId="{64A25328-D857-4943-8FCE-9840F0D1F389}"/>
-          </ac:cxnSpMkLst>
-        </pc:cxnChg>
-        <pc:cxnChg chg="mod topLvl">
-          <ac:chgData name="Ingmar Wever" userId="1d4f24f3f093ab16" providerId="LiveId" clId="{982A7207-6ECB-4C04-B0B1-32E71348DA82}" dt="2017-12-10T15:45:29.777" v="3063" actId="1038"/>
-          <ac:cxnSpMkLst>
-            <pc:docMk/>
-            <pc:sldMk cId="2475769336" sldId="256"/>
-            <ac:cxnSpMk id="88" creationId="{4DB69676-49C8-4153-980A-0AD495D4997B}"/>
-          </ac:cxnSpMkLst>
-        </pc:cxnChg>
-        <pc:cxnChg chg="add mod">
-          <ac:chgData name="Ingmar Wever" userId="1d4f24f3f093ab16" providerId="LiveId" clId="{982A7207-6ECB-4C04-B0B1-32E71348DA82}" dt="2017-12-10T15:45:29.777" v="3063" actId="1038"/>
-          <ac:cxnSpMkLst>
-            <pc:docMk/>
-            <pc:sldMk cId="2475769336" sldId="256"/>
-            <ac:cxnSpMk id="109" creationId="{B74151AB-45DB-40AB-9124-E331F073A440}"/>
-          </ac:cxnSpMkLst>
-        </pc:cxnChg>
-        <pc:cxnChg chg="add del mod">
-          <ac:chgData name="Ingmar Wever" userId="1d4f24f3f093ab16" providerId="LiveId" clId="{982A7207-6ECB-4C04-B0B1-32E71348DA82}" dt="2017-12-09T23:05:43.025" v="2183" actId="478"/>
-          <ac:cxnSpMkLst>
-            <pc:docMk/>
-            <pc:sldMk cId="2475769336" sldId="256"/>
-            <ac:cxnSpMk id="117" creationId="{584B1394-27CC-439F-970C-4C2AB92FD310}"/>
-          </ac:cxnSpMkLst>
-        </pc:cxnChg>
-      </pc:sldChg>
-      <pc:sldChg chg="addSp delSp modSp add">
-        <pc:chgData name="Ingmar Wever" userId="1d4f24f3f093ab16" providerId="LiveId" clId="{982A7207-6ECB-4C04-B0B1-32E71348DA82}" dt="2017-12-10T16:18:03.219" v="3571" actId="1076"/>
-        <pc:sldMkLst>
-          <pc:docMk/>
-          <pc:sldMk cId="2082646863" sldId="257"/>
-        </pc:sldMkLst>
-        <pc:spChg chg="del">
-          <ac:chgData name="Ingmar Wever" userId="1d4f24f3f093ab16" providerId="LiveId" clId="{982A7207-6ECB-4C04-B0B1-32E71348DA82}" dt="2017-12-09T23:14:04.444" v="2403" actId="1076"/>
-          <ac:spMkLst>
-            <pc:docMk/>
-            <pc:sldMk cId="2082646863" sldId="257"/>
-            <ac:spMk id="2" creationId="{0E17D15A-2DAA-420B-90DA-B68DCBB4C1E2}"/>
-          </ac:spMkLst>
-        </pc:spChg>
-        <pc:spChg chg="del">
-          <ac:chgData name="Ingmar Wever" userId="1d4f24f3f093ab16" providerId="LiveId" clId="{982A7207-6ECB-4C04-B0B1-32E71348DA82}" dt="2017-12-09T23:14:04.444" v="2403" actId="1076"/>
-          <ac:spMkLst>
-            <pc:docMk/>
-            <pc:sldMk cId="2082646863" sldId="257"/>
-            <ac:spMk id="3" creationId="{A85DEEF0-B48D-4536-85DD-0A75280441AF}"/>
-          </ac:spMkLst>
-        </pc:spChg>
-        <pc:spChg chg="add mod">
-          <ac:chgData name="Ingmar Wever" userId="1d4f24f3f093ab16" providerId="LiveId" clId="{982A7207-6ECB-4C04-B0B1-32E71348DA82}" dt="2017-12-10T15:57:15.189" v="3216" actId="1076"/>
-          <ac:spMkLst>
-            <pc:docMk/>
-            <pc:sldMk cId="2082646863" sldId="257"/>
-            <ac:spMk id="4" creationId="{9FF270A7-872F-44DF-B5D1-7058B13DEC69}"/>
-          </ac:spMkLst>
-        </pc:spChg>
-        <pc:spChg chg="add mod">
-          <ac:chgData name="Ingmar Wever" userId="1d4f24f3f093ab16" providerId="LiveId" clId="{982A7207-6ECB-4C04-B0B1-32E71348DA82}" dt="2017-12-10T15:56:29.214" v="3212" actId="1076"/>
-          <ac:spMkLst>
-            <pc:docMk/>
-            <pc:sldMk cId="2082646863" sldId="257"/>
-            <ac:spMk id="5" creationId="{CCC822C4-1C00-42D9-A879-92EAA9335643}"/>
-          </ac:spMkLst>
-        </pc:spChg>
-        <pc:spChg chg="add mod">
-          <ac:chgData name="Ingmar Wever" userId="1d4f24f3f093ab16" providerId="LiveId" clId="{982A7207-6ECB-4C04-B0B1-32E71348DA82}" dt="2017-12-10T15:57:15.189" v="3216" actId="1076"/>
-          <ac:spMkLst>
-            <pc:docMk/>
-            <pc:sldMk cId="2082646863" sldId="257"/>
-            <ac:spMk id="6" creationId="{02766D36-E49A-490D-AF85-54D3FEDC9976}"/>
-          </ac:spMkLst>
-        </pc:spChg>
-        <pc:spChg chg="add mod">
-          <ac:chgData name="Ingmar Wever" userId="1d4f24f3f093ab16" providerId="LiveId" clId="{982A7207-6ECB-4C04-B0B1-32E71348DA82}" dt="2017-12-10T15:56:29.214" v="3212" actId="1076"/>
-          <ac:spMkLst>
-            <pc:docMk/>
-            <pc:sldMk cId="2082646863" sldId="257"/>
-            <ac:spMk id="7" creationId="{6683BB79-25BE-4246-BD14-FC30C336549A}"/>
-          </ac:spMkLst>
-        </pc:spChg>
-        <pc:spChg chg="add mod">
-          <ac:chgData name="Ingmar Wever" userId="1d4f24f3f093ab16" providerId="LiveId" clId="{982A7207-6ECB-4C04-B0B1-32E71348DA82}" dt="2017-12-10T15:57:15.189" v="3216" actId="1076"/>
-          <ac:spMkLst>
-            <pc:docMk/>
-            <pc:sldMk cId="2082646863" sldId="257"/>
-            <ac:spMk id="8" creationId="{5657BEDC-C42D-4133-9BF1-8EB662AFDC97}"/>
-          </ac:spMkLst>
-        </pc:spChg>
-        <pc:spChg chg="add mod">
-          <ac:chgData name="Ingmar Wever" userId="1d4f24f3f093ab16" providerId="LiveId" clId="{982A7207-6ECB-4C04-B0B1-32E71348DA82}" dt="2017-12-10T16:15:24.577" v="3528" actId="1076"/>
-          <ac:spMkLst>
-            <pc:docMk/>
-            <pc:sldMk cId="2082646863" sldId="257"/>
-            <ac:spMk id="9" creationId="{C45A6513-911D-4301-84E1-86662756C52A}"/>
-          </ac:spMkLst>
-        </pc:spChg>
-        <pc:spChg chg="add mod">
-          <ac:chgData name="Ingmar Wever" userId="1d4f24f3f093ab16" providerId="LiveId" clId="{982A7207-6ECB-4C04-B0B1-32E71348DA82}" dt="2017-12-10T16:15:27.693" v="3529" actId="1076"/>
-          <ac:spMkLst>
-            <pc:docMk/>
-            <pc:sldMk cId="2082646863" sldId="257"/>
-            <ac:spMk id="10" creationId="{46589B6D-D2A3-478A-82DF-74AA590D07BC}"/>
-          </ac:spMkLst>
-        </pc:spChg>
-        <pc:spChg chg="add mod">
-          <ac:chgData name="Ingmar Wever" userId="1d4f24f3f093ab16" providerId="LiveId" clId="{982A7207-6ECB-4C04-B0B1-32E71348DA82}" dt="2017-12-10T15:56:29.214" v="3212" actId="1076"/>
-          <ac:spMkLst>
-            <pc:docMk/>
-            <pc:sldMk cId="2082646863" sldId="257"/>
-            <ac:spMk id="11" creationId="{550584BC-0E1F-4D2D-8B80-2FB6D3739107}"/>
-          </ac:spMkLst>
-        </pc:spChg>
-        <pc:spChg chg="add mod">
-          <ac:chgData name="Ingmar Wever" userId="1d4f24f3f093ab16" providerId="LiveId" clId="{982A7207-6ECB-4C04-B0B1-32E71348DA82}" dt="2017-12-09T23:14:08.219" v="2405" actId="1076"/>
-          <ac:spMkLst>
-            <pc:docMk/>
-            <pc:sldMk cId="2082646863" sldId="257"/>
-            <ac:spMk id="12" creationId="{C64B486F-E657-45D2-B613-CC5A4FAAF1F6}"/>
-          </ac:spMkLst>
-        </pc:spChg>
-        <pc:spChg chg="add mod">
-          <ac:chgData name="Ingmar Wever" userId="1d4f24f3f093ab16" providerId="LiveId" clId="{982A7207-6ECB-4C04-B0B1-32E71348DA82}" dt="2017-12-09T23:14:08.219" v="2405" actId="1076"/>
-          <ac:spMkLst>
-            <pc:docMk/>
-            <pc:sldMk cId="2082646863" sldId="257"/>
-            <ac:spMk id="13" creationId="{ECDF36F1-80A7-4982-89F8-F4D39F2D99D4}"/>
-          </ac:spMkLst>
-        </pc:spChg>
-        <pc:spChg chg="add mod">
-          <ac:chgData name="Ingmar Wever" userId="1d4f24f3f093ab16" providerId="LiveId" clId="{982A7207-6ECB-4C04-B0B1-32E71348DA82}" dt="2017-12-09T23:14:08.219" v="2405" actId="1076"/>
-          <ac:spMkLst>
-            <pc:docMk/>
-            <pc:sldMk cId="2082646863" sldId="257"/>
-            <ac:spMk id="14" creationId="{2BE99D12-6F6A-4C73-B214-40DF354F51CC}"/>
-          </ac:spMkLst>
-        </pc:spChg>
-        <pc:spChg chg="add mod">
-          <ac:chgData name="Ingmar Wever" userId="1d4f24f3f093ab16" providerId="LiveId" clId="{982A7207-6ECB-4C04-B0B1-32E71348DA82}" dt="2017-12-09T23:14:27.996" v="2415" actId="1076"/>
-          <ac:spMkLst>
-            <pc:docMk/>
-            <pc:sldMk cId="2082646863" sldId="257"/>
-            <ac:spMk id="15" creationId="{D58FE64D-5269-4977-B894-A93309859A19}"/>
-          </ac:spMkLst>
-        </pc:spChg>
-        <pc:spChg chg="add mod">
-          <ac:chgData name="Ingmar Wever" userId="1d4f24f3f093ab16" providerId="LiveId" clId="{982A7207-6ECB-4C04-B0B1-32E71348DA82}" dt="2017-12-10T16:00:50.087" v="3354" actId="1076"/>
-          <ac:spMkLst>
-            <pc:docMk/>
-            <pc:sldMk cId="2082646863" sldId="257"/>
-            <ac:spMk id="16" creationId="{C341A7FD-F03A-4AF7-B213-5BEA37D15D07}"/>
-          </ac:spMkLst>
-        </pc:spChg>
-        <pc:spChg chg="add mod">
-          <ac:chgData name="Ingmar Wever" userId="1d4f24f3f093ab16" providerId="LiveId" clId="{982A7207-6ECB-4C04-B0B1-32E71348DA82}" dt="2017-12-10T16:00:50.087" v="3354" actId="1076"/>
-          <ac:spMkLst>
-            <pc:docMk/>
-            <pc:sldMk cId="2082646863" sldId="257"/>
-            <ac:spMk id="17" creationId="{4568B31E-564E-40DD-B6FF-34B0FB056784}"/>
-          </ac:spMkLst>
-        </pc:spChg>
-        <pc:spChg chg="add mod">
-          <ac:chgData name="Ingmar Wever" userId="1d4f24f3f093ab16" providerId="LiveId" clId="{982A7207-6ECB-4C04-B0B1-32E71348DA82}" dt="2017-12-10T16:08:16.780" v="3435" actId="14100"/>
-          <ac:spMkLst>
-            <pc:docMk/>
-            <pc:sldMk cId="2082646863" sldId="257"/>
-            <ac:spMk id="18" creationId="{F49E5A26-B102-46B4-905F-481C449BB836}"/>
-          </ac:spMkLst>
-        </pc:spChg>
-        <pc:spChg chg="add mod">
-          <ac:chgData name="Ingmar Wever" userId="1d4f24f3f093ab16" providerId="LiveId" clId="{982A7207-6ECB-4C04-B0B1-32E71348DA82}" dt="2017-12-10T16:08:13.839" v="3434" actId="1076"/>
-          <ac:spMkLst>
-            <pc:docMk/>
-            <pc:sldMk cId="2082646863" sldId="257"/>
-            <ac:spMk id="19" creationId="{A81DBF7F-AA1E-4470-A422-D7F1B0CC8712}"/>
-          </ac:spMkLst>
-        </pc:spChg>
-        <pc:spChg chg="add mod">
-          <ac:chgData name="Ingmar Wever" userId="1d4f24f3f093ab16" providerId="LiveId" clId="{982A7207-6ECB-4C04-B0B1-32E71348DA82}" dt="2017-12-10T16:09:39.019" v="3444" actId="1076"/>
-          <ac:spMkLst>
-            <pc:docMk/>
-            <pc:sldMk cId="2082646863" sldId="257"/>
-            <ac:spMk id="21" creationId="{50168010-BB3B-4258-9558-57425985D0F0}"/>
-          </ac:spMkLst>
-        </pc:spChg>
-        <pc:spChg chg="add mod">
-          <ac:chgData name="Ingmar Wever" userId="1d4f24f3f093ab16" providerId="LiveId" clId="{982A7207-6ECB-4C04-B0B1-32E71348DA82}" dt="2017-12-10T16:17:50.978" v="3566" actId="1076"/>
-          <ac:spMkLst>
-            <pc:docMk/>
-            <pc:sldMk cId="2082646863" sldId="257"/>
-            <ac:spMk id="23" creationId="{0D2D69F3-B26C-4A5E-9796-16C6AC5F9B63}"/>
-          </ac:spMkLst>
-        </pc:spChg>
-        <pc:picChg chg="add mod">
-          <ac:chgData name="Ingmar Wever" userId="1d4f24f3f093ab16" providerId="LiveId" clId="{982A7207-6ECB-4C04-B0B1-32E71348DA82}" dt="2017-12-10T16:15:37.245" v="3530" actId="1076"/>
-          <ac:picMkLst>
-            <pc:docMk/>
-            <pc:sldMk cId="2082646863" sldId="257"/>
-            <ac:picMk id="2" creationId="{B94CA49F-F29A-47F6-AA66-C470725E8EA3}"/>
-          </ac:picMkLst>
-        </pc:picChg>
-        <pc:picChg chg="add mod ord">
-          <ac:chgData name="Ingmar Wever" userId="1d4f24f3f093ab16" providerId="LiveId" clId="{982A7207-6ECB-4C04-B0B1-32E71348DA82}" dt="2017-12-10T16:08:45.209" v="3441" actId="1076"/>
-          <ac:picMkLst>
-            <pc:docMk/>
-            <pc:sldMk cId="2082646863" sldId="257"/>
-            <ac:picMk id="3" creationId="{06756FD9-4180-4BF7-8A4B-280475AADF7C}"/>
-          </ac:picMkLst>
-        </pc:picChg>
-        <pc:picChg chg="add mod">
-          <ac:chgData name="Ingmar Wever" userId="1d4f24f3f093ab16" providerId="LiveId" clId="{982A7207-6ECB-4C04-B0B1-32E71348DA82}" dt="2017-12-10T16:08:48.791" v="3442" actId="1076"/>
-          <ac:picMkLst>
-            <pc:docMk/>
-            <pc:sldMk cId="2082646863" sldId="257"/>
-            <ac:picMk id="20" creationId="{CD82F725-80B2-4EDE-B1CF-4DDA376DFA57}"/>
-          </ac:picMkLst>
-        </pc:picChg>
-        <pc:picChg chg="add mod">
-          <ac:chgData name="Ingmar Wever" userId="1d4f24f3f093ab16" providerId="LiveId" clId="{982A7207-6ECB-4C04-B0B1-32E71348DA82}" dt="2017-12-10T16:18:03.219" v="3571" actId="1076"/>
-          <ac:picMkLst>
-            <pc:docMk/>
-            <pc:sldMk cId="2082646863" sldId="257"/>
-            <ac:picMk id="1026" creationId="{9220F3BE-0ED2-44F5-82EF-4582BDB00FE1}"/>
-          </ac:picMkLst>
-        </pc:picChg>
-      </pc:sldChg>
-      <pc:sldChg chg="addSp delSp modSp add del">
-        <pc:chgData name="Ingmar Wever" userId="1d4f24f3f093ab16" providerId="LiveId" clId="{982A7207-6ECB-4C04-B0B1-32E71348DA82}" dt="2017-12-09T22:52:08.997" v="1766" actId="2696"/>
-        <pc:sldMkLst>
-          <pc:docMk/>
-          <pc:sldMk cId="2614803726" sldId="257"/>
-        </pc:sldMkLst>
-        <pc:spChg chg="del">
-          <ac:chgData name="Ingmar Wever" userId="1d4f24f3f093ab16" providerId="LiveId" clId="{982A7207-6ECB-4C04-B0B1-32E71348DA82}" dt="2017-12-09T21:19:20.400" v="1" actId="2696"/>
-          <ac:spMkLst>
-            <pc:docMk/>
-            <pc:sldMk cId="2614803726" sldId="257"/>
-            <ac:spMk id="2" creationId="{03C8E4C4-83DB-4B1C-A6E2-5E72FCB164A5}"/>
-          </ac:spMkLst>
-        </pc:spChg>
-        <pc:spChg chg="del">
-          <ac:chgData name="Ingmar Wever" userId="1d4f24f3f093ab16" providerId="LiveId" clId="{982A7207-6ECB-4C04-B0B1-32E71348DA82}" dt="2017-12-09T21:19:20.400" v="1" actId="2696"/>
-          <ac:spMkLst>
-            <pc:docMk/>
-            <pc:sldMk cId="2614803726" sldId="257"/>
-            <ac:spMk id="3" creationId="{BD3DB19A-2E91-4B3F-986E-8BD38149B9C2}"/>
-          </ac:spMkLst>
-        </pc:spChg>
-        <pc:spChg chg="add del mod">
-          <ac:chgData name="Ingmar Wever" userId="1d4f24f3f093ab16" providerId="LiveId" clId="{982A7207-6ECB-4C04-B0B1-32E71348DA82}" dt="2017-12-09T21:19:23.303" v="2" actId="2696"/>
-          <ac:spMkLst>
-            <pc:docMk/>
-            <pc:sldMk cId="2614803726" sldId="257"/>
-            <ac:spMk id="4" creationId="{259AC906-A7AB-4E56-A472-DBC82ABB5AC5}"/>
-          </ac:spMkLst>
-        </pc:spChg>
-        <pc:spChg chg="add del mod">
-          <ac:chgData name="Ingmar Wever" userId="1d4f24f3f093ab16" providerId="LiveId" clId="{982A7207-6ECB-4C04-B0B1-32E71348DA82}" dt="2017-12-09T21:19:23.303" v="2" actId="2696"/>
-          <ac:spMkLst>
-            <pc:docMk/>
-            <pc:sldMk cId="2614803726" sldId="257"/>
-            <ac:spMk id="5" creationId="{C27F35CA-FB0E-4EC1-B9F4-D3F09F14587D}"/>
-          </ac:spMkLst>
-        </pc:spChg>
-        <pc:spChg chg="add mod">
-          <ac:chgData name="Ingmar Wever" userId="1d4f24f3f093ab16" providerId="LiveId" clId="{982A7207-6ECB-4C04-B0B1-32E71348DA82}" dt="2017-12-09T21:48:07.211" v="4" actId="1076"/>
-          <ac:spMkLst>
-            <pc:docMk/>
-            <pc:sldMk cId="2614803726" sldId="257"/>
-            <ac:spMk id="6" creationId="{400FB663-4B6D-437A-8790-EFC17B07C897}"/>
-          </ac:spMkLst>
-        </pc:spChg>
-        <pc:spChg chg="add mod">
-          <ac:chgData name="Ingmar Wever" userId="1d4f24f3f093ab16" providerId="LiveId" clId="{982A7207-6ECB-4C04-B0B1-32E71348DA82}" dt="2017-12-09T21:48:07.211" v="4" actId="1076"/>
-          <ac:spMkLst>
-            <pc:docMk/>
-            <pc:sldMk cId="2614803726" sldId="257"/>
-            <ac:spMk id="7" creationId="{6D3CA00C-C7D9-41C6-B33A-E7B6E7134041}"/>
-          </ac:spMkLst>
-        </pc:spChg>
-        <pc:spChg chg="add mod">
-          <ac:chgData name="Ingmar Wever" userId="1d4f24f3f093ab16" providerId="LiveId" clId="{982A7207-6ECB-4C04-B0B1-32E71348DA82}" dt="2017-12-09T21:48:07.211" v="4" actId="1076"/>
-          <ac:spMkLst>
-            <pc:docMk/>
-            <pc:sldMk cId="2614803726" sldId="257"/>
-            <ac:spMk id="8" creationId="{1FFC1D1E-AC58-432A-AF7B-AAAB776DCCDB}"/>
-          </ac:spMkLst>
-        </pc:spChg>
-        <pc:spChg chg="add mod">
-          <ac:chgData name="Ingmar Wever" userId="1d4f24f3f093ab16" providerId="LiveId" clId="{982A7207-6ECB-4C04-B0B1-32E71348DA82}" dt="2017-12-09T21:48:07.211" v="4" actId="1076"/>
-          <ac:spMkLst>
-            <pc:docMk/>
-            <pc:sldMk cId="2614803726" sldId="257"/>
-            <ac:spMk id="9" creationId="{176E8384-E0CC-4E36-9C1A-B6973ADA0A8B}"/>
-          </ac:spMkLst>
-        </pc:spChg>
-      </pc:sldChg>
-      <pc:sldChg chg="addSp delSp modSp add del">
-        <pc:chgData name="Ingmar Wever" userId="1d4f24f3f093ab16" providerId="LiveId" clId="{982A7207-6ECB-4C04-B0B1-32E71348DA82}" dt="2017-12-11T13:46:14.862" v="3683" actId="2696"/>
-        <pc:sldMkLst>
-          <pc:docMk/>
-          <pc:sldMk cId="581981446" sldId="258"/>
-        </pc:sldMkLst>
-        <pc:graphicFrameChg chg="add del mod">
-          <ac:chgData name="Ingmar Wever" userId="1d4f24f3f093ab16" providerId="LiveId" clId="{982A7207-6ECB-4C04-B0B1-32E71348DA82}" dt="2017-12-11T13:44:51.589" v="3680" actId="478"/>
-          <ac:graphicFrameMkLst>
-            <pc:docMk/>
-            <pc:sldMk cId="581981446" sldId="258"/>
-            <ac:graphicFrameMk id="2" creationId="{94B86CD3-3FEC-4086-B1A2-6F06A28799F5}"/>
-          </ac:graphicFrameMkLst>
-        </pc:graphicFrameChg>
-        <pc:picChg chg="add del">
-          <ac:chgData name="Ingmar Wever" userId="1d4f24f3f093ab16" providerId="LiveId" clId="{982A7207-6ECB-4C04-B0B1-32E71348DA82}" dt="2017-12-11T13:46:11.013" v="3682" actId="478"/>
-          <ac:picMkLst>
-            <pc:docMk/>
-            <pc:sldMk cId="581981446" sldId="258"/>
-            <ac:picMk id="1026" creationId="{1FA059C7-A75F-4CB1-8668-0EC775247A87}"/>
-          </ac:picMkLst>
-        </pc:picChg>
       </pc:sldChg>
     </pc:docChg>
+  </pc:docChgLst>
+  <pc:docChgLst>
+    <pc:chgData name="Ingmar Wever" userId="1d4f24f3f093ab16" providerId="LiveId" clId="{982A7207-6ECB-4C04-B0B1-32E71348DA82}"/>
   </pc:docChgLst>
 </pc:chgInfo>
 </file>
@@ -1326,7 +300,7 @@
           <a:p>
             <a:fld id="{D0C7DDE5-4966-4824-816B-2644FBD3EB3C}" type="datetimeFigureOut">
               <a:rPr lang="nl-NL" smtClean="0"/>
-              <a:t>11-12-2017</a:t>
+              <a:t>19-3-2018</a:t>
             </a:fld>
             <a:endParaRPr lang="nl-NL"/>
           </a:p>
@@ -1368,7 +342,7 @@
           <a:p>
             <a:fld id="{239568A4-477D-4813-878B-CBEBEC4DA642}" type="slidenum">
               <a:rPr lang="nl-NL" smtClean="0"/>
-              <a:t>‹#›</a:t>
+              <a:t>‹nr.›</a:t>
             </a:fld>
             <a:endParaRPr lang="nl-NL"/>
           </a:p>
@@ -1496,7 +470,7 @@
           <a:p>
             <a:fld id="{D0C7DDE5-4966-4824-816B-2644FBD3EB3C}" type="datetimeFigureOut">
               <a:rPr lang="nl-NL" smtClean="0"/>
-              <a:t>11-12-2017</a:t>
+              <a:t>19-3-2018</a:t>
             </a:fld>
             <a:endParaRPr lang="nl-NL"/>
           </a:p>
@@ -1538,7 +512,7 @@
           <a:p>
             <a:fld id="{239568A4-477D-4813-878B-CBEBEC4DA642}" type="slidenum">
               <a:rPr lang="nl-NL" smtClean="0"/>
-              <a:t>‹#›</a:t>
+              <a:t>‹nr.›</a:t>
             </a:fld>
             <a:endParaRPr lang="nl-NL"/>
           </a:p>
@@ -1676,7 +650,7 @@
           <a:p>
             <a:fld id="{D0C7DDE5-4966-4824-816B-2644FBD3EB3C}" type="datetimeFigureOut">
               <a:rPr lang="nl-NL" smtClean="0"/>
-              <a:t>11-12-2017</a:t>
+              <a:t>19-3-2018</a:t>
             </a:fld>
             <a:endParaRPr lang="nl-NL"/>
           </a:p>
@@ -1718,7 +692,7 @@
           <a:p>
             <a:fld id="{239568A4-477D-4813-878B-CBEBEC4DA642}" type="slidenum">
               <a:rPr lang="nl-NL" smtClean="0"/>
-              <a:t>‹#›</a:t>
+              <a:t>‹nr.›</a:t>
             </a:fld>
             <a:endParaRPr lang="nl-NL"/>
           </a:p>
@@ -1846,7 +820,7 @@
           <a:p>
             <a:fld id="{D0C7DDE5-4966-4824-816B-2644FBD3EB3C}" type="datetimeFigureOut">
               <a:rPr lang="nl-NL" smtClean="0"/>
-              <a:t>11-12-2017</a:t>
+              <a:t>19-3-2018</a:t>
             </a:fld>
             <a:endParaRPr lang="nl-NL"/>
           </a:p>
@@ -1888,7 +862,7 @@
           <a:p>
             <a:fld id="{239568A4-477D-4813-878B-CBEBEC4DA642}" type="slidenum">
               <a:rPr lang="nl-NL" smtClean="0"/>
-              <a:t>‹#›</a:t>
+              <a:t>‹nr.›</a:t>
             </a:fld>
             <a:endParaRPr lang="nl-NL"/>
           </a:p>
@@ -2090,7 +1064,7 @@
           <a:p>
             <a:fld id="{D0C7DDE5-4966-4824-816B-2644FBD3EB3C}" type="datetimeFigureOut">
               <a:rPr lang="nl-NL" smtClean="0"/>
-              <a:t>11-12-2017</a:t>
+              <a:t>19-3-2018</a:t>
             </a:fld>
             <a:endParaRPr lang="nl-NL"/>
           </a:p>
@@ -2132,7 +1106,7 @@
           <a:p>
             <a:fld id="{239568A4-477D-4813-878B-CBEBEC4DA642}" type="slidenum">
               <a:rPr lang="nl-NL" smtClean="0"/>
-              <a:t>‹#›</a:t>
+              <a:t>‹nr.›</a:t>
             </a:fld>
             <a:endParaRPr lang="nl-NL"/>
           </a:p>
@@ -2322,7 +1296,7 @@
           <a:p>
             <a:fld id="{D0C7DDE5-4966-4824-816B-2644FBD3EB3C}" type="datetimeFigureOut">
               <a:rPr lang="nl-NL" smtClean="0"/>
-              <a:t>11-12-2017</a:t>
+              <a:t>19-3-2018</a:t>
             </a:fld>
             <a:endParaRPr lang="nl-NL"/>
           </a:p>
@@ -2364,7 +1338,7 @@
           <a:p>
             <a:fld id="{239568A4-477D-4813-878B-CBEBEC4DA642}" type="slidenum">
               <a:rPr lang="nl-NL" smtClean="0"/>
-              <a:t>‹#›</a:t>
+              <a:t>‹nr.›</a:t>
             </a:fld>
             <a:endParaRPr lang="nl-NL"/>
           </a:p>
@@ -2689,7 +1663,7 @@
           <a:p>
             <a:fld id="{D0C7DDE5-4966-4824-816B-2644FBD3EB3C}" type="datetimeFigureOut">
               <a:rPr lang="nl-NL" smtClean="0"/>
-              <a:t>11-12-2017</a:t>
+              <a:t>19-3-2018</a:t>
             </a:fld>
             <a:endParaRPr lang="nl-NL"/>
           </a:p>
@@ -2731,7 +1705,7 @@
           <a:p>
             <a:fld id="{239568A4-477D-4813-878B-CBEBEC4DA642}" type="slidenum">
               <a:rPr lang="nl-NL" smtClean="0"/>
-              <a:t>‹#›</a:t>
+              <a:t>‹nr.›</a:t>
             </a:fld>
             <a:endParaRPr lang="nl-NL"/>
           </a:p>
@@ -2807,7 +1781,7 @@
           <a:p>
             <a:fld id="{D0C7DDE5-4966-4824-816B-2644FBD3EB3C}" type="datetimeFigureOut">
               <a:rPr lang="nl-NL" smtClean="0"/>
-              <a:t>11-12-2017</a:t>
+              <a:t>19-3-2018</a:t>
             </a:fld>
             <a:endParaRPr lang="nl-NL"/>
           </a:p>
@@ -2849,7 +1823,7 @@
           <a:p>
             <a:fld id="{239568A4-477D-4813-878B-CBEBEC4DA642}" type="slidenum">
               <a:rPr lang="nl-NL" smtClean="0"/>
-              <a:t>‹#›</a:t>
+              <a:t>‹nr.›</a:t>
             </a:fld>
             <a:endParaRPr lang="nl-NL"/>
           </a:p>
@@ -2902,7 +1876,7 @@
           <a:p>
             <a:fld id="{D0C7DDE5-4966-4824-816B-2644FBD3EB3C}" type="datetimeFigureOut">
               <a:rPr lang="nl-NL" smtClean="0"/>
-              <a:t>11-12-2017</a:t>
+              <a:t>19-3-2018</a:t>
             </a:fld>
             <a:endParaRPr lang="nl-NL"/>
           </a:p>
@@ -2944,7 +1918,7 @@
           <a:p>
             <a:fld id="{239568A4-477D-4813-878B-CBEBEC4DA642}" type="slidenum">
               <a:rPr lang="nl-NL" smtClean="0"/>
-              <a:t>‹#›</a:t>
+              <a:t>‹nr.›</a:t>
             </a:fld>
             <a:endParaRPr lang="nl-NL"/>
           </a:p>
@@ -3179,7 +2153,7 @@
           <a:p>
             <a:fld id="{D0C7DDE5-4966-4824-816B-2644FBD3EB3C}" type="datetimeFigureOut">
               <a:rPr lang="nl-NL" smtClean="0"/>
-              <a:t>11-12-2017</a:t>
+              <a:t>19-3-2018</a:t>
             </a:fld>
             <a:endParaRPr lang="nl-NL"/>
           </a:p>
@@ -3221,7 +2195,7 @@
           <a:p>
             <a:fld id="{239568A4-477D-4813-878B-CBEBEC4DA642}" type="slidenum">
               <a:rPr lang="nl-NL" smtClean="0"/>
-              <a:t>‹#›</a:t>
+              <a:t>‹nr.›</a:t>
             </a:fld>
             <a:endParaRPr lang="nl-NL"/>
           </a:p>
@@ -3436,7 +2410,7 @@
           <a:p>
             <a:fld id="{D0C7DDE5-4966-4824-816B-2644FBD3EB3C}" type="datetimeFigureOut">
               <a:rPr lang="nl-NL" smtClean="0"/>
-              <a:t>11-12-2017</a:t>
+              <a:t>19-3-2018</a:t>
             </a:fld>
             <a:endParaRPr lang="nl-NL"/>
           </a:p>
@@ -3478,7 +2452,7 @@
           <a:p>
             <a:fld id="{239568A4-477D-4813-878B-CBEBEC4DA642}" type="slidenum">
               <a:rPr lang="nl-NL" smtClean="0"/>
-              <a:t>‹#›</a:t>
+              <a:t>‹nr.›</a:t>
             </a:fld>
             <a:endParaRPr lang="nl-NL"/>
           </a:p>
@@ -3649,7 +2623,7 @@
           <a:p>
             <a:fld id="{D0C7DDE5-4966-4824-816B-2644FBD3EB3C}" type="datetimeFigureOut">
               <a:rPr lang="nl-NL" smtClean="0"/>
-              <a:t>11-12-2017</a:t>
+              <a:t>19-3-2018</a:t>
             </a:fld>
             <a:endParaRPr lang="nl-NL"/>
           </a:p>
@@ -3727,7 +2701,7 @@
           <a:p>
             <a:fld id="{239568A4-477D-4813-878B-CBEBEC4DA642}" type="slidenum">
               <a:rPr lang="nl-NL" smtClean="0"/>
-              <a:t>‹#›</a:t>
+              <a:t>‹nr.›</a:t>
             </a:fld>
             <a:endParaRPr lang="nl-NL"/>
           </a:p>
@@ -6721,9 +5695,10 @@
           <a:p>
             <a:pPr algn="ctr"/>
             <a:r>
-              <a:rPr lang="nl-NL" sz="1400" dirty="0"/>
-              <a:t>Capability others</a:t>
-            </a:r>
+              <a:rPr lang="nl-NL" sz="1400"/>
+              <a:t>Capability</a:t>
+            </a:r>
+            <a:endParaRPr lang="nl-NL" sz="1400" dirty="0"/>
           </a:p>
         </p:txBody>
       </p:sp>
@@ -6777,9 +5752,18 @@
           <a:p>
             <a:pPr algn="ctr"/>
             <a:r>
+              <a:rPr lang="nl-NL" sz="1000" dirty="0" err="1"/>
+              <a:t>Physically</a:t>
+            </a:r>
+            <a:r>
               <a:rPr lang="nl-NL" sz="1000" dirty="0"/>
-              <a:t>Maximum</a:t>
-            </a:r>
+              <a:t> </a:t>
+            </a:r>
+            <a:r>
+              <a:rPr lang="nl-NL" sz="1000" dirty="0" err="1"/>
+              <a:t>possible</a:t>
+            </a:r>
+            <a:endParaRPr lang="nl-NL" sz="1000" dirty="0"/>
           </a:p>
         </p:txBody>
       </p:sp>
@@ -6833,9 +5817,14 @@
           <a:p>
             <a:pPr algn="ctr"/>
             <a:r>
-              <a:rPr lang="nl-NL" sz="1000" dirty="0"/>
-              <a:t>Standard deviation</a:t>
-            </a:r>
+              <a:rPr lang="nl-NL" sz="1000" dirty="0" err="1"/>
+              <a:t>Comfortable</a:t>
+            </a:r>
+            <a:r>
+              <a:rPr lang="nl-NL" sz="1000"/>
+              <a:t> change</a:t>
+            </a:r>
+            <a:endParaRPr lang="nl-NL" sz="1000" dirty="0"/>
           </a:p>
         </p:txBody>
       </p:sp>
@@ -7913,47 +6902,6 @@
           </a:fontRef>
         </p:style>
       </p:cxnSp>
-      <p:sp>
-        <p:nvSpPr>
-          <p:cNvPr id="112" name="TextBox 111">
-            <a:extLst>
-              <a:ext uri="{FF2B5EF4-FFF2-40B4-BE49-F238E27FC236}">
-                <a16:creationId xmlns:a16="http://schemas.microsoft.com/office/drawing/2014/main" id="{56AA9E43-ABC6-41D5-8224-286F29C208C8}"/>
-              </a:ext>
-            </a:extLst>
-          </p:cNvPr>
-          <p:cNvSpPr txBox="1"/>
-          <p:nvPr/>
-        </p:nvSpPr>
-        <p:spPr>
-          <a:xfrm>
-            <a:off x="4596986" y="3413518"/>
-            <a:ext cx="1515523" cy="400110"/>
-          </a:xfrm>
-          <a:prstGeom prst="rect">
-            <a:avLst/>
-          </a:prstGeom>
-          <a:noFill/>
-        </p:spPr>
-        <p:txBody>
-          <a:bodyPr wrap="square" rtlCol="0">
-            <a:spAutoFit/>
-          </a:bodyPr>
-          <a:lstStyle/>
-          <a:p>
-            <a:r>
-              <a:rPr lang="nl-NL" sz="1000" dirty="0"/>
-              <a:t>Leo van Breda</a:t>
-            </a:r>
-          </a:p>
-          <a:p>
-            <a:r>
-              <a:rPr lang="nl-NL" sz="1000" dirty="0"/>
-              <a:t>Autonomous shipping  JIP</a:t>
-            </a:r>
-          </a:p>
-        </p:txBody>
-      </p:sp>
       <p:sp>
         <p:nvSpPr>
           <p:cNvPr id="113" name="TextBox 112">

</xml_diff>

<commit_message>
Many additions to report, and improved manouvring model en written test for manouvring
</commit_message>
<xml_diff>
--- a/Model/Abstract model.pptx
+++ b/Model/Abstract model.pptx
@@ -117,7 +117,7 @@
 <file path=ppt/revisionInfo.xml><?xml version="1.0" encoding="utf-8"?>
 <p1510:revInfo xmlns:a="http://schemas.openxmlformats.org/drawingml/2006/main" xmlns:r="http://schemas.openxmlformats.org/officeDocument/2006/relationships" xmlns:p1510="http://schemas.microsoft.com/office/powerpoint/2015/10/main">
   <p1510:revLst>
-    <p1510:client id="{B2E8CC85-53E1-4B04-864D-427BF9D12E4E}" v="671" dt="2018-07-31T12:49:33.517"/>
+    <p1510:client id="{B2E8CC85-53E1-4B04-864D-427BF9D12E4E}" v="716" dt="2018-08-08T16:34:19.736"/>
   </p1510:revLst>
 </p1510:revInfo>
 </file>
@@ -130,7 +130,7 @@
   <pc:docChgLst>
     <pc:chgData name="Ingmar Wever" userId="1d4f24f3f093ab16" providerId="LiveId" clId="{B2E8CC85-53E1-4B04-864D-427BF9D12E4E}"/>
     <pc:docChg chg="addSld modSld sldOrd">
-      <pc:chgData name="Ingmar Wever" userId="1d4f24f3f093ab16" providerId="LiveId" clId="{B2E8CC85-53E1-4B04-864D-427BF9D12E4E}" dt="2018-07-31T12:49:33.517" v="670" actId="20577"/>
+      <pc:chgData name="Ingmar Wever" userId="1d4f24f3f093ab16" providerId="LiveId" clId="{B2E8CC85-53E1-4B04-864D-427BF9D12E4E}" dt="2018-08-08T16:34:19.736" v="715" actId="20577"/>
       <pc:docMkLst>
         <pc:docMk/>
       </pc:docMkLst>
@@ -142,7 +142,7 @@
         </pc:sldMkLst>
       </pc:sldChg>
       <pc:sldChg chg="addSp delSp modSp add">
-        <pc:chgData name="Ingmar Wever" userId="1d4f24f3f093ab16" providerId="LiveId" clId="{B2E8CC85-53E1-4B04-864D-427BF9D12E4E}" dt="2018-07-31T12:49:33.517" v="670" actId="20577"/>
+        <pc:chgData name="Ingmar Wever" userId="1d4f24f3f093ab16" providerId="LiveId" clId="{B2E8CC85-53E1-4B04-864D-427BF9D12E4E}" dt="2018-08-08T16:34:19.736" v="715" actId="20577"/>
         <pc:sldMkLst>
           <pc:docMk/>
           <pc:sldMk cId="774914654" sldId="258"/>
@@ -164,7 +164,7 @@
           </ac:spMkLst>
         </pc:spChg>
         <pc:graphicFrameChg chg="add mod">
-          <ac:chgData name="Ingmar Wever" userId="1d4f24f3f093ab16" providerId="LiveId" clId="{B2E8CC85-53E1-4B04-864D-427BF9D12E4E}" dt="2018-07-31T12:49:33.517" v="670" actId="20577"/>
+          <ac:chgData name="Ingmar Wever" userId="1d4f24f3f093ab16" providerId="LiveId" clId="{B2E8CC85-53E1-4B04-864D-427BF9D12E4E}" dt="2018-08-08T16:34:19.736" v="715" actId="20577"/>
           <ac:graphicFrameMkLst>
             <pc:docMk/>
             <pc:sldMk cId="774914654" sldId="258"/>
@@ -931,7 +931,7 @@
 <dgm:dataModel xmlns:dgm="http://schemas.openxmlformats.org/drawingml/2006/diagram" xmlns:a="http://schemas.openxmlformats.org/drawingml/2006/main">
   <dgm:ptLst>
     <dgm:pt modelId="{3B484BA8-4334-4382-BE4B-9A0962B30D59}" type="doc">
-      <dgm:prSet loTypeId="urn:microsoft.com/office/officeart/2009/3/layout/PieProcess" loCatId="list" qsTypeId="urn:microsoft.com/office/officeart/2005/8/quickstyle/simple1" qsCatId="simple" csTypeId="urn:microsoft.com/office/officeart/2005/8/colors/accent1_2" csCatId="accent1" phldr="1"/>
+      <dgm:prSet loTypeId="urn:microsoft.com/office/officeart/2005/8/layout/list1" loCatId="list" qsTypeId="urn:microsoft.com/office/officeart/2005/8/quickstyle/simple1" qsCatId="simple" csTypeId="urn:microsoft.com/office/officeart/2005/8/colors/accent1_2" csCatId="accent1" phldr="1"/>
       <dgm:spPr/>
       <dgm:t>
         <a:bodyPr/>
@@ -949,8 +949,12 @@
         <a:lstStyle/>
         <a:p>
           <a:r>
-            <a:rPr lang="nl-NL" dirty="0" err="1"/>
-            <a:t>Mental</a:t>
+            <a:rPr lang="nl-NL" noProof="0"/>
+            <a:t>M</a:t>
+          </a:r>
+          <a:r>
+            <a:rPr lang="nl-NL"/>
+            <a:t>ental</a:t>
           </a:r>
           <a:r>
             <a:rPr lang="nl-NL" dirty="0"/>
@@ -990,8 +994,12 @@
         <a:lstStyle/>
         <a:p>
           <a:r>
+            <a:rPr lang="nl-NL" dirty="0" err="1"/>
+            <a:t>Identify</a:t>
+          </a:r>
+          <a:r>
             <a:rPr lang="nl-NL" dirty="0"/>
-            <a:t>Map of </a:t>
+            <a:t> </a:t>
           </a:r>
           <a:r>
             <a:rPr lang="nl-NL" dirty="0" err="1"/>
@@ -1232,8 +1240,8 @@
         <a:lstStyle/>
         <a:p>
           <a:r>
-            <a:rPr lang="nl-NL" dirty="0"/>
-            <a:t>Extract</a:t>
+            <a:rPr lang="nl-NL"/>
+            <a:t>Identify</a:t>
           </a:r>
           <a:endParaRPr lang="en-GB" dirty="0"/>
         </a:p>
@@ -1704,59 +1712,6 @@
         </a:p>
       </dgm:t>
     </dgm:pt>
-    <dgm:pt modelId="{E3BE7625-A942-46DB-9512-46D80E8CC0F8}">
-      <dgm:prSet phldrT="[Tekst]"/>
-      <dgm:spPr/>
-      <dgm:t>
-        <a:bodyPr/>
-        <a:lstStyle/>
-        <a:p>
-          <a:r>
-            <a:rPr lang="nl-NL" dirty="0" err="1"/>
-            <a:t>Communicate</a:t>
-          </a:r>
-          <a:r>
-            <a:rPr lang="nl-NL" dirty="0"/>
-            <a:t> </a:t>
-          </a:r>
-          <a:r>
-            <a:rPr lang="nl-NL" dirty="0" err="1"/>
-            <a:t>when</a:t>
-          </a:r>
-          <a:r>
-            <a:rPr lang="nl-NL" dirty="0"/>
-            <a:t> </a:t>
-          </a:r>
-          <a:r>
-            <a:rPr lang="nl-NL" dirty="0" err="1"/>
-            <a:t>unsuccesfull</a:t>
-          </a:r>
-          <a:endParaRPr lang="en-GB" dirty="0"/>
-        </a:p>
-      </dgm:t>
-    </dgm:pt>
-    <dgm:pt modelId="{619D9CBD-4140-4FD1-96CF-2558F12D171B}" type="parTrans" cxnId="{369CBF1C-36F5-4190-A3C6-C96295EE456D}">
-      <dgm:prSet/>
-      <dgm:spPr/>
-      <dgm:t>
-        <a:bodyPr/>
-        <a:lstStyle/>
-        <a:p>
-          <a:endParaRPr lang="en-GB"/>
-        </a:p>
-      </dgm:t>
-    </dgm:pt>
-    <dgm:pt modelId="{F24B6A97-5BD8-464F-868F-F0BFB863DFE3}" type="sibTrans" cxnId="{369CBF1C-36F5-4190-A3C6-C96295EE456D}">
-      <dgm:prSet/>
-      <dgm:spPr/>
-      <dgm:t>
-        <a:bodyPr/>
-        <a:lstStyle/>
-        <a:p>
-          <a:endParaRPr lang="en-GB"/>
-        </a:p>
-      </dgm:t>
-    </dgm:pt>
     <dgm:pt modelId="{8661A6B4-B33C-41D4-9E73-1C3FABA777E3}">
       <dgm:prSet phldrT="[Tekst]"/>
       <dgm:spPr/>
@@ -1909,229 +1864,172 @@
         </a:p>
       </dgm:t>
     </dgm:pt>
-    <dgm:pt modelId="{8571A11B-4DD1-4B5F-8D0A-423772B01385}" type="pres">
-      <dgm:prSet presAssocID="{3B484BA8-4334-4382-BE4B-9A0962B30D59}" presName="Name0" presStyleCnt="0">
+    <dgm:pt modelId="{1F6E8870-6A82-4850-9F58-899EEC90C675}" type="pres">
+      <dgm:prSet presAssocID="{3B484BA8-4334-4382-BE4B-9A0962B30D59}" presName="linear" presStyleCnt="0">
         <dgm:presLayoutVars>
-          <dgm:chMax val="7"/>
-          <dgm:chPref val="7"/>
           <dgm:dir/>
-          <dgm:animOne val="branch"/>
           <dgm:animLvl val="lvl"/>
+          <dgm:resizeHandles val="exact"/>
         </dgm:presLayoutVars>
       </dgm:prSet>
       <dgm:spPr/>
     </dgm:pt>
-    <dgm:pt modelId="{931C2B1D-D52C-4DA8-AA60-FC2152F3B5B6}" type="pres">
-      <dgm:prSet presAssocID="{3ED8B981-2419-49F1-AA3E-CE3171980363}" presName="ParentComposite" presStyleCnt="0"/>
+    <dgm:pt modelId="{50182D03-7BFD-441C-81E2-B549963A636A}" type="pres">
+      <dgm:prSet presAssocID="{3ED8B981-2419-49F1-AA3E-CE3171980363}" presName="parentLin" presStyleCnt="0"/>
       <dgm:spPr/>
     </dgm:pt>
-    <dgm:pt modelId="{269EEAD9-5BED-4318-B334-93D23AA20ABC}" type="pres">
-      <dgm:prSet presAssocID="{3ED8B981-2419-49F1-AA3E-CE3171980363}" presName="Chord" presStyleLbl="bgShp" presStyleIdx="0" presStyleCnt="5"/>
+    <dgm:pt modelId="{6687310D-9AB9-44D5-8423-61B0B358461C}" type="pres">
+      <dgm:prSet presAssocID="{3ED8B981-2419-49F1-AA3E-CE3171980363}" presName="parentLeftMargin" presStyleLbl="node1" presStyleIdx="0" presStyleCnt="5"/>
       <dgm:spPr/>
     </dgm:pt>
-    <dgm:pt modelId="{FE83F8AF-A8C5-4058-BB5D-EC7CFAED2F50}" type="pres">
-      <dgm:prSet presAssocID="{3ED8B981-2419-49F1-AA3E-CE3171980363}" presName="Pie" presStyleLbl="alignNode1" presStyleIdx="0" presStyleCnt="5"/>
-      <dgm:spPr/>
-    </dgm:pt>
-    <dgm:pt modelId="{2FB46E21-917D-4228-A4E7-8EEF5373EB43}" type="pres">
-      <dgm:prSet presAssocID="{3ED8B981-2419-49F1-AA3E-CE3171980363}" presName="Parent" presStyleLbl="revTx" presStyleIdx="0" presStyleCnt="10">
+    <dgm:pt modelId="{7CA3CF54-81C9-4EA5-98A1-B689A151ED24}" type="pres">
+      <dgm:prSet presAssocID="{3ED8B981-2419-49F1-AA3E-CE3171980363}" presName="parentText" presStyleLbl="node1" presStyleIdx="0" presStyleCnt="5">
         <dgm:presLayoutVars>
-          <dgm:chMax val="1"/>
-          <dgm:chPref val="1"/>
+          <dgm:chMax val="0"/>
           <dgm:bulletEnabled val="1"/>
         </dgm:presLayoutVars>
       </dgm:prSet>
       <dgm:spPr/>
     </dgm:pt>
-    <dgm:pt modelId="{CEB8C10C-FA41-465E-96AC-CCB92AD7F8B3}" type="pres">
-      <dgm:prSet presAssocID="{381BFF4C-B961-44B1-9D84-E48A824D286B}" presName="negSibTrans" presStyleCnt="0"/>
+    <dgm:pt modelId="{31D77B2D-EEE3-4ABC-8C76-1794AD5127D5}" type="pres">
+      <dgm:prSet presAssocID="{3ED8B981-2419-49F1-AA3E-CE3171980363}" presName="negativeSpace" presStyleCnt="0"/>
       <dgm:spPr/>
     </dgm:pt>
-    <dgm:pt modelId="{74A5FED9-79FD-454A-A31A-FF291CA836BF}" type="pres">
-      <dgm:prSet presAssocID="{3ED8B981-2419-49F1-AA3E-CE3171980363}" presName="composite" presStyleCnt="0"/>
-      <dgm:spPr/>
-    </dgm:pt>
-    <dgm:pt modelId="{F7ADC11F-B29E-425E-97FE-1D18B82E97C8}" type="pres">
-      <dgm:prSet presAssocID="{3ED8B981-2419-49F1-AA3E-CE3171980363}" presName="Child" presStyleLbl="revTx" presStyleIdx="1" presStyleCnt="10">
+    <dgm:pt modelId="{2E222F4D-B4EE-4816-8038-5E24C2DAE4F3}" type="pres">
+      <dgm:prSet presAssocID="{3ED8B981-2419-49F1-AA3E-CE3171980363}" presName="childText" presStyleLbl="conFgAcc1" presStyleIdx="0" presStyleCnt="5">
         <dgm:presLayoutVars>
-          <dgm:chMax val="0"/>
-          <dgm:chPref val="0"/>
           <dgm:bulletEnabled val="1"/>
         </dgm:presLayoutVars>
       </dgm:prSet>
       <dgm:spPr/>
     </dgm:pt>
-    <dgm:pt modelId="{DC78E8F5-D987-4B6D-8553-5278F149C2F9}" type="pres">
-      <dgm:prSet presAssocID="{2D626B28-A9F8-4765-8027-75AAFB1D0F3F}" presName="sibTrans" presStyleCnt="0"/>
+    <dgm:pt modelId="{1943275C-0EA5-4AD2-BA95-9F64A520D70D}" type="pres">
+      <dgm:prSet presAssocID="{2D626B28-A9F8-4765-8027-75AAFB1D0F3F}" presName="spaceBetweenRectangles" presStyleCnt="0"/>
       <dgm:spPr/>
     </dgm:pt>
-    <dgm:pt modelId="{3F23FF0E-C253-4421-8E1C-D95B2091075D}" type="pres">
-      <dgm:prSet presAssocID="{DAE99FA4-C160-411B-B154-8B1A56869BD7}" presName="ParentComposite" presStyleCnt="0"/>
+    <dgm:pt modelId="{E32AD969-F305-42E5-8CDE-F6EFF503547C}" type="pres">
+      <dgm:prSet presAssocID="{DAE99FA4-C160-411B-B154-8B1A56869BD7}" presName="parentLin" presStyleCnt="0"/>
       <dgm:spPr/>
     </dgm:pt>
-    <dgm:pt modelId="{D7D5BD64-771B-406F-9F77-C588574FD50F}" type="pres">
-      <dgm:prSet presAssocID="{DAE99FA4-C160-411B-B154-8B1A56869BD7}" presName="Chord" presStyleLbl="bgShp" presStyleIdx="1" presStyleCnt="5"/>
+    <dgm:pt modelId="{095ABDFF-0B60-47D0-9AC2-995B6E24EC52}" type="pres">
+      <dgm:prSet presAssocID="{DAE99FA4-C160-411B-B154-8B1A56869BD7}" presName="parentLeftMargin" presStyleLbl="node1" presStyleIdx="0" presStyleCnt="5"/>
       <dgm:spPr/>
     </dgm:pt>
-    <dgm:pt modelId="{54EEA023-20EF-46C0-995C-83ECC8E51C4B}" type="pres">
-      <dgm:prSet presAssocID="{DAE99FA4-C160-411B-B154-8B1A56869BD7}" presName="Pie" presStyleLbl="alignNode1" presStyleIdx="1" presStyleCnt="5"/>
-      <dgm:spPr/>
-    </dgm:pt>
-    <dgm:pt modelId="{A4F5433F-A0F8-4143-8D05-4194FA38DDD5}" type="pres">
-      <dgm:prSet presAssocID="{DAE99FA4-C160-411B-B154-8B1A56869BD7}" presName="Parent" presStyleLbl="revTx" presStyleIdx="2" presStyleCnt="10">
+    <dgm:pt modelId="{E90CCC8F-8562-4556-B9B4-458A0E383B1C}" type="pres">
+      <dgm:prSet presAssocID="{DAE99FA4-C160-411B-B154-8B1A56869BD7}" presName="parentText" presStyleLbl="node1" presStyleIdx="1" presStyleCnt="5">
         <dgm:presLayoutVars>
-          <dgm:chMax val="1"/>
-          <dgm:chPref val="1"/>
+          <dgm:chMax val="0"/>
           <dgm:bulletEnabled val="1"/>
         </dgm:presLayoutVars>
       </dgm:prSet>
       <dgm:spPr/>
     </dgm:pt>
-    <dgm:pt modelId="{F8BE4EB5-C655-451D-B2B0-6C12429E331F}" type="pres">
-      <dgm:prSet presAssocID="{E0C30168-EFAF-4BF3-9545-9B36FBD99E0B}" presName="negSibTrans" presStyleCnt="0"/>
+    <dgm:pt modelId="{6D0BE74E-4D6C-4EC7-846F-9D3BD35C7463}" type="pres">
+      <dgm:prSet presAssocID="{DAE99FA4-C160-411B-B154-8B1A56869BD7}" presName="negativeSpace" presStyleCnt="0"/>
       <dgm:spPr/>
     </dgm:pt>
-    <dgm:pt modelId="{83A65D8E-8FEE-4036-AD02-8257FECB668B}" type="pres">
-      <dgm:prSet presAssocID="{DAE99FA4-C160-411B-B154-8B1A56869BD7}" presName="composite" presStyleCnt="0"/>
-      <dgm:spPr/>
-    </dgm:pt>
-    <dgm:pt modelId="{2846E483-72DC-45FA-90A6-7588E8C4BB2F}" type="pres">
-      <dgm:prSet presAssocID="{DAE99FA4-C160-411B-B154-8B1A56869BD7}" presName="Child" presStyleLbl="revTx" presStyleIdx="3" presStyleCnt="10">
+    <dgm:pt modelId="{1D7E373B-62EE-4097-8383-EA46023FB4BF}" type="pres">
+      <dgm:prSet presAssocID="{DAE99FA4-C160-411B-B154-8B1A56869BD7}" presName="childText" presStyleLbl="conFgAcc1" presStyleIdx="1" presStyleCnt="5">
         <dgm:presLayoutVars>
-          <dgm:chMax val="0"/>
-          <dgm:chPref val="0"/>
           <dgm:bulletEnabled val="1"/>
         </dgm:presLayoutVars>
       </dgm:prSet>
       <dgm:spPr/>
     </dgm:pt>
-    <dgm:pt modelId="{D62EB3B5-10A3-4EAB-ADC6-5B087EB70BEC}" type="pres">
-      <dgm:prSet presAssocID="{2FC829A5-4F35-4B05-9609-2406216F002D}" presName="sibTrans" presStyleCnt="0"/>
+    <dgm:pt modelId="{C060E05D-91B8-42DA-BAF3-88054D5C3803}" type="pres">
+      <dgm:prSet presAssocID="{2FC829A5-4F35-4B05-9609-2406216F002D}" presName="spaceBetweenRectangles" presStyleCnt="0"/>
       <dgm:spPr/>
     </dgm:pt>
-    <dgm:pt modelId="{D7AA0EA6-0EA5-40DD-B409-0268D3A9144A}" type="pres">
-      <dgm:prSet presAssocID="{55BE11E8-8A50-4E0F-BF8A-95A15CFF4463}" presName="ParentComposite" presStyleCnt="0"/>
+    <dgm:pt modelId="{710880D4-317A-4C6F-8C07-422DE5170889}" type="pres">
+      <dgm:prSet presAssocID="{55BE11E8-8A50-4E0F-BF8A-95A15CFF4463}" presName="parentLin" presStyleCnt="0"/>
       <dgm:spPr/>
     </dgm:pt>
-    <dgm:pt modelId="{A76C61C1-6AFA-4D5D-BEDC-075B51D104C1}" type="pres">
-      <dgm:prSet presAssocID="{55BE11E8-8A50-4E0F-BF8A-95A15CFF4463}" presName="Chord" presStyleLbl="bgShp" presStyleIdx="2" presStyleCnt="5"/>
+    <dgm:pt modelId="{C369BA4A-9467-458B-80D5-F89ECC27E0B3}" type="pres">
+      <dgm:prSet presAssocID="{55BE11E8-8A50-4E0F-BF8A-95A15CFF4463}" presName="parentLeftMargin" presStyleLbl="node1" presStyleIdx="1" presStyleCnt="5"/>
       <dgm:spPr/>
     </dgm:pt>
-    <dgm:pt modelId="{85CF1AC6-E8FD-45AA-B447-A983A2C8647A}" type="pres">
-      <dgm:prSet presAssocID="{55BE11E8-8A50-4E0F-BF8A-95A15CFF4463}" presName="Pie" presStyleLbl="alignNode1" presStyleIdx="2" presStyleCnt="5"/>
-      <dgm:spPr/>
-    </dgm:pt>
-    <dgm:pt modelId="{EFDFD436-3138-46CE-8FA8-756F4FCA80A2}" type="pres">
-      <dgm:prSet presAssocID="{55BE11E8-8A50-4E0F-BF8A-95A15CFF4463}" presName="Parent" presStyleLbl="revTx" presStyleIdx="4" presStyleCnt="10">
+    <dgm:pt modelId="{BA9FDDE1-33CC-4965-BE47-D2FE7B9D0BAB}" type="pres">
+      <dgm:prSet presAssocID="{55BE11E8-8A50-4E0F-BF8A-95A15CFF4463}" presName="parentText" presStyleLbl="node1" presStyleIdx="2" presStyleCnt="5">
         <dgm:presLayoutVars>
-          <dgm:chMax val="1"/>
-          <dgm:chPref val="1"/>
+          <dgm:chMax val="0"/>
           <dgm:bulletEnabled val="1"/>
         </dgm:presLayoutVars>
       </dgm:prSet>
       <dgm:spPr/>
     </dgm:pt>
-    <dgm:pt modelId="{B4606010-2FE4-4641-914F-803A38FCA0C8}" type="pres">
-      <dgm:prSet presAssocID="{35A67EE0-86D8-42ED-B6E9-9AFDCDF9D92B}" presName="negSibTrans" presStyleCnt="0"/>
+    <dgm:pt modelId="{3321A187-39C7-4144-8CF0-93DD59AEDF61}" type="pres">
+      <dgm:prSet presAssocID="{55BE11E8-8A50-4E0F-BF8A-95A15CFF4463}" presName="negativeSpace" presStyleCnt="0"/>
       <dgm:spPr/>
     </dgm:pt>
-    <dgm:pt modelId="{1B007060-6B41-4BFD-A2E3-60C8E650BCA5}" type="pres">
-      <dgm:prSet presAssocID="{55BE11E8-8A50-4E0F-BF8A-95A15CFF4463}" presName="composite" presStyleCnt="0"/>
-      <dgm:spPr/>
-    </dgm:pt>
-    <dgm:pt modelId="{B49A5AC8-DC03-4E01-9F78-3C6AEC1AE3BD}" type="pres">
-      <dgm:prSet presAssocID="{55BE11E8-8A50-4E0F-BF8A-95A15CFF4463}" presName="Child" presStyleLbl="revTx" presStyleIdx="5" presStyleCnt="10">
+    <dgm:pt modelId="{1AEFC7B9-4E17-4373-B889-88C020B8414F}" type="pres">
+      <dgm:prSet presAssocID="{55BE11E8-8A50-4E0F-BF8A-95A15CFF4463}" presName="childText" presStyleLbl="conFgAcc1" presStyleIdx="2" presStyleCnt="5">
         <dgm:presLayoutVars>
-          <dgm:chMax val="0"/>
-          <dgm:chPref val="0"/>
           <dgm:bulletEnabled val="1"/>
         </dgm:presLayoutVars>
       </dgm:prSet>
       <dgm:spPr/>
     </dgm:pt>
-    <dgm:pt modelId="{918C83EA-28FA-448F-A025-0A758A04E9BA}" type="pres">
-      <dgm:prSet presAssocID="{292E318F-F578-4DC4-A204-F672C4692765}" presName="sibTrans" presStyleCnt="0"/>
+    <dgm:pt modelId="{AC46350E-A408-4BAA-9FDE-8F66334969DF}" type="pres">
+      <dgm:prSet presAssocID="{292E318F-F578-4DC4-A204-F672C4692765}" presName="spaceBetweenRectangles" presStyleCnt="0"/>
       <dgm:spPr/>
     </dgm:pt>
-    <dgm:pt modelId="{0D466379-13B3-46CD-994D-566CD95E6ED7}" type="pres">
-      <dgm:prSet presAssocID="{E959D2C4-3465-443A-9FD9-EF859A5B8B8C}" presName="ParentComposite" presStyleCnt="0"/>
+    <dgm:pt modelId="{51C6FBD1-F611-4061-ADFC-D2C92E474A3F}" type="pres">
+      <dgm:prSet presAssocID="{E959D2C4-3465-443A-9FD9-EF859A5B8B8C}" presName="parentLin" presStyleCnt="0"/>
       <dgm:spPr/>
     </dgm:pt>
-    <dgm:pt modelId="{37EEA1A5-B486-4DFA-9FC0-D442431F571A}" type="pres">
-      <dgm:prSet presAssocID="{E959D2C4-3465-443A-9FD9-EF859A5B8B8C}" presName="Chord" presStyleLbl="bgShp" presStyleIdx="3" presStyleCnt="5"/>
+    <dgm:pt modelId="{CB703570-B5CB-4DC4-935C-02C1EB08C4CF}" type="pres">
+      <dgm:prSet presAssocID="{E959D2C4-3465-443A-9FD9-EF859A5B8B8C}" presName="parentLeftMargin" presStyleLbl="node1" presStyleIdx="2" presStyleCnt="5"/>
       <dgm:spPr/>
     </dgm:pt>
-    <dgm:pt modelId="{6895D33D-AAC7-4C90-8C46-D5C76F04A5EC}" type="pres">
-      <dgm:prSet presAssocID="{E959D2C4-3465-443A-9FD9-EF859A5B8B8C}" presName="Pie" presStyleLbl="alignNode1" presStyleIdx="3" presStyleCnt="5"/>
-      <dgm:spPr/>
-    </dgm:pt>
-    <dgm:pt modelId="{C89B0AB5-B955-482C-AE2A-C9ABCFCF81B8}" type="pres">
-      <dgm:prSet presAssocID="{E959D2C4-3465-443A-9FD9-EF859A5B8B8C}" presName="Parent" presStyleLbl="revTx" presStyleIdx="6" presStyleCnt="10">
+    <dgm:pt modelId="{BBC987B7-7DFB-4489-981A-01A4226BD49F}" type="pres">
+      <dgm:prSet presAssocID="{E959D2C4-3465-443A-9FD9-EF859A5B8B8C}" presName="parentText" presStyleLbl="node1" presStyleIdx="3" presStyleCnt="5">
         <dgm:presLayoutVars>
-          <dgm:chMax val="1"/>
-          <dgm:chPref val="1"/>
+          <dgm:chMax val="0"/>
           <dgm:bulletEnabled val="1"/>
         </dgm:presLayoutVars>
       </dgm:prSet>
       <dgm:spPr/>
     </dgm:pt>
-    <dgm:pt modelId="{ADC8FFFC-2942-441B-8ED5-314E9A0EBE9A}" type="pres">
-      <dgm:prSet presAssocID="{560F6354-A7C2-4628-AF46-24684A131364}" presName="negSibTrans" presStyleCnt="0"/>
+    <dgm:pt modelId="{85A3DB5C-1143-49DB-BF98-CC7ADE23E5A4}" type="pres">
+      <dgm:prSet presAssocID="{E959D2C4-3465-443A-9FD9-EF859A5B8B8C}" presName="negativeSpace" presStyleCnt="0"/>
       <dgm:spPr/>
     </dgm:pt>
-    <dgm:pt modelId="{4A3867B4-FD6E-43EE-A45C-99DE12DAD299}" type="pres">
-      <dgm:prSet presAssocID="{E959D2C4-3465-443A-9FD9-EF859A5B8B8C}" presName="composite" presStyleCnt="0"/>
-      <dgm:spPr/>
-    </dgm:pt>
-    <dgm:pt modelId="{C84D355D-DEEB-4AD5-A665-ED17B4FF9262}" type="pres">
-      <dgm:prSet presAssocID="{E959D2C4-3465-443A-9FD9-EF859A5B8B8C}" presName="Child" presStyleLbl="revTx" presStyleIdx="7" presStyleCnt="10">
+    <dgm:pt modelId="{42C27377-0741-4F65-9B0D-6210A28EEDFB}" type="pres">
+      <dgm:prSet presAssocID="{E959D2C4-3465-443A-9FD9-EF859A5B8B8C}" presName="childText" presStyleLbl="conFgAcc1" presStyleIdx="3" presStyleCnt="5">
         <dgm:presLayoutVars>
-          <dgm:chMax val="0"/>
-          <dgm:chPref val="0"/>
           <dgm:bulletEnabled val="1"/>
         </dgm:presLayoutVars>
       </dgm:prSet>
       <dgm:spPr/>
     </dgm:pt>
-    <dgm:pt modelId="{C13BFC05-3B5F-488B-87CD-D11CDFFA43E2}" type="pres">
-      <dgm:prSet presAssocID="{F44153C0-1E3A-4BE7-A0FE-F0AFF8D0B344}" presName="sibTrans" presStyleCnt="0"/>
+    <dgm:pt modelId="{ADEF1525-9C7F-4CB0-91E1-D206BBDC553C}" type="pres">
+      <dgm:prSet presAssocID="{F44153C0-1E3A-4BE7-A0FE-F0AFF8D0B344}" presName="spaceBetweenRectangles" presStyleCnt="0"/>
       <dgm:spPr/>
     </dgm:pt>
-    <dgm:pt modelId="{3056FB71-C1D2-424C-B948-DB6DEA471625}" type="pres">
-      <dgm:prSet presAssocID="{BACAE75D-00C5-4EE5-9917-7515BA58D63A}" presName="ParentComposite" presStyleCnt="0"/>
+    <dgm:pt modelId="{A35CE42C-3C9E-4BC2-91B8-EC59AC3D26AF}" type="pres">
+      <dgm:prSet presAssocID="{BACAE75D-00C5-4EE5-9917-7515BA58D63A}" presName="parentLin" presStyleCnt="0"/>
       <dgm:spPr/>
     </dgm:pt>
-    <dgm:pt modelId="{BC5F3FB8-3B5A-42CE-8461-7C136CBF500D}" type="pres">
-      <dgm:prSet presAssocID="{BACAE75D-00C5-4EE5-9917-7515BA58D63A}" presName="Chord" presStyleLbl="bgShp" presStyleIdx="4" presStyleCnt="5"/>
+    <dgm:pt modelId="{BD22A25B-4305-4DAF-902E-F858F6CF391D}" type="pres">
+      <dgm:prSet presAssocID="{BACAE75D-00C5-4EE5-9917-7515BA58D63A}" presName="parentLeftMargin" presStyleLbl="node1" presStyleIdx="3" presStyleCnt="5"/>
       <dgm:spPr/>
     </dgm:pt>
-    <dgm:pt modelId="{62E997E4-4E8A-45C6-9EED-AD1F6AB1A3E5}" type="pres">
-      <dgm:prSet presAssocID="{BACAE75D-00C5-4EE5-9917-7515BA58D63A}" presName="Pie" presStyleLbl="alignNode1" presStyleIdx="4" presStyleCnt="5"/>
-      <dgm:spPr/>
-    </dgm:pt>
-    <dgm:pt modelId="{D38D2675-464E-4488-B695-984A9A9AB692}" type="pres">
-      <dgm:prSet presAssocID="{BACAE75D-00C5-4EE5-9917-7515BA58D63A}" presName="Parent" presStyleLbl="revTx" presStyleIdx="8" presStyleCnt="10">
+    <dgm:pt modelId="{677A82DF-9EC6-48C3-886F-ABD6798103A4}" type="pres">
+      <dgm:prSet presAssocID="{BACAE75D-00C5-4EE5-9917-7515BA58D63A}" presName="parentText" presStyleLbl="node1" presStyleIdx="4" presStyleCnt="5">
         <dgm:presLayoutVars>
-          <dgm:chMax val="1"/>
-          <dgm:chPref val="1"/>
+          <dgm:chMax val="0"/>
           <dgm:bulletEnabled val="1"/>
         </dgm:presLayoutVars>
       </dgm:prSet>
       <dgm:spPr/>
     </dgm:pt>
-    <dgm:pt modelId="{83556737-9521-4B24-94F1-46279F6D4510}" type="pres">
-      <dgm:prSet presAssocID="{B18497F4-6D7D-4E64-8D2F-C936D700E00A}" presName="negSibTrans" presStyleCnt="0"/>
+    <dgm:pt modelId="{9EABB1F8-DAB8-4662-B9E7-A494E97919D4}" type="pres">
+      <dgm:prSet presAssocID="{BACAE75D-00C5-4EE5-9917-7515BA58D63A}" presName="negativeSpace" presStyleCnt="0"/>
       <dgm:spPr/>
     </dgm:pt>
-    <dgm:pt modelId="{EBA8BF5D-5E15-4B2C-9AA9-9EDCB77DA2D2}" type="pres">
-      <dgm:prSet presAssocID="{BACAE75D-00C5-4EE5-9917-7515BA58D63A}" presName="composite" presStyleCnt="0"/>
-      <dgm:spPr/>
-    </dgm:pt>
-    <dgm:pt modelId="{447FE049-B941-49A1-93CE-93EF92A5ECD8}" type="pres">
-      <dgm:prSet presAssocID="{BACAE75D-00C5-4EE5-9917-7515BA58D63A}" presName="Child" presStyleLbl="revTx" presStyleIdx="9" presStyleCnt="10">
+    <dgm:pt modelId="{2D2F9F65-531D-4DCD-8A6F-711CFA8F88A3}" type="pres">
+      <dgm:prSet presAssocID="{BACAE75D-00C5-4EE5-9917-7515BA58D63A}" presName="childText" presStyleLbl="conFgAcc1" presStyleIdx="4" presStyleCnt="5">
         <dgm:presLayoutVars>
-          <dgm:chMax val="0"/>
-          <dgm:chPref val="0"/>
           <dgm:bulletEnabled val="1"/>
         </dgm:presLayoutVars>
       </dgm:prSet>
@@ -2139,94 +2037,87 @@
     </dgm:pt>
   </dgm:ptLst>
   <dgm:cxnLst>
-    <dgm:cxn modelId="{203D2500-F752-4FB3-8407-50DCBB7BE24A}" type="presOf" srcId="{E959D2C4-3465-443A-9FD9-EF859A5B8B8C}" destId="{C89B0AB5-B955-482C-AE2A-C9ABCFCF81B8}" srcOrd="0" destOrd="0" presId="urn:microsoft.com/office/officeart/2009/3/layout/PieProcess"/>
+    <dgm:cxn modelId="{584EBB02-124A-4454-AFE3-4D08EB2F30BC}" type="presOf" srcId="{BC916986-E295-4DC2-880C-F56125038ED0}" destId="{2D2F9F65-531D-4DCD-8A6F-711CFA8F88A3}" srcOrd="0" destOrd="0" presId="urn:microsoft.com/office/officeart/2005/8/layout/list1"/>
     <dgm:cxn modelId="{BCD71D03-71BB-4D19-84D4-5B1B3F9ED683}" srcId="{F45A1763-1D37-4176-A01A-8B388675DEE6}" destId="{14197409-D674-49E3-9313-06DD040F4AC9}" srcOrd="0" destOrd="0" parTransId="{E621A4E1-FE7B-4630-B5AB-C534CB5C369E}" sibTransId="{2597C8CF-F793-4A8C-8901-E5CADD793088}"/>
-    <dgm:cxn modelId="{415C5908-B192-4453-A670-D629FEBE8B27}" type="presOf" srcId="{14197409-D674-49E3-9313-06DD040F4AC9}" destId="{C84D355D-DEEB-4AD5-A665-ED17B4FF9262}" srcOrd="0" destOrd="4" presId="urn:microsoft.com/office/officeart/2009/3/layout/PieProcess"/>
-    <dgm:cxn modelId="{2900BE09-7661-47A5-8342-2FD8770EC838}" type="presOf" srcId="{75C54E77-67B0-4978-9B78-24908691C701}" destId="{C84D355D-DEEB-4AD5-A665-ED17B4FF9262}" srcOrd="0" destOrd="2" presId="urn:microsoft.com/office/officeart/2009/3/layout/PieProcess"/>
     <dgm:cxn modelId="{4CD1E50A-5243-4DA1-96A1-600B3584EB03}" srcId="{DAE99FA4-C160-411B-B154-8B1A56869BD7}" destId="{FBE23FA9-F6FE-4849-920A-E0614201F88D}" srcOrd="0" destOrd="0" parTransId="{6FE5BA40-A7AA-43F0-B092-BD7DBC1B156D}" sibTransId="{E0C30168-EFAF-4BF3-9545-9B36FBD99E0B}"/>
-    <dgm:cxn modelId="{E79D1B15-89FF-4980-AD2B-8C5D32D03DE1}" type="presOf" srcId="{8661A6B4-B33C-41D4-9E73-1C3FABA777E3}" destId="{C84D355D-DEEB-4AD5-A665-ED17B4FF9262}" srcOrd="0" destOrd="1" presId="urn:microsoft.com/office/officeart/2009/3/layout/PieProcess"/>
+    <dgm:cxn modelId="{31CD9E0B-8F5F-404C-BBD5-7FB9ED76FEFB}" type="presOf" srcId="{FFF17D55-4622-42B6-8D73-400DC5415335}" destId="{2D2F9F65-531D-4DCD-8A6F-711CFA8F88A3}" srcOrd="0" destOrd="1" presId="urn:microsoft.com/office/officeart/2005/8/layout/list1"/>
     <dgm:cxn modelId="{E0ECF715-3C3E-485E-8403-02C70CD77C2A}" srcId="{55BE11E8-8A50-4E0F-BF8A-95A15CFF4463}" destId="{3965C573-745C-414F-99E9-166FA985D4A2}" srcOrd="0" destOrd="0" parTransId="{9F7DA690-543E-4235-8352-0659D82CE91B}" sibTransId="{35A67EE0-86D8-42ED-B6E9-9AFDCDF9D92B}"/>
     <dgm:cxn modelId="{D9945E1C-B1F4-4720-A158-38454D054AE5}" srcId="{3B484BA8-4334-4382-BE4B-9A0962B30D59}" destId="{BACAE75D-00C5-4EE5-9917-7515BA58D63A}" srcOrd="4" destOrd="0" parTransId="{45DDBBDB-4BC4-4CC2-9849-55DBBC94ADA4}" sibTransId="{B86E6B9B-BFCE-4901-8E72-3D21FCAEDBA8}"/>
-    <dgm:cxn modelId="{369CBF1C-36F5-4190-A3C6-C96295EE456D}" srcId="{55BE11E8-8A50-4E0F-BF8A-95A15CFF4463}" destId="{E3BE7625-A942-46DB-9512-46D80E8CC0F8}" srcOrd="2" destOrd="0" parTransId="{619D9CBD-4140-4FD1-96CF-2558F12D171B}" sibTransId="{F24B6A97-5BD8-464F-868F-F0BFB863DFE3}"/>
     <dgm:cxn modelId="{A39C571D-5BC5-4A1F-B9F9-E58D2D6BDCDE}" srcId="{A60FD67B-1B8B-44C2-AD67-DD690C8E26C3}" destId="{37D58DA0-3DA7-49D5-A52A-841D5B9B7376}" srcOrd="0" destOrd="0" parTransId="{8392B15D-BDB4-4345-8656-7440EC8F82A2}" sibTransId="{00F5D029-CF32-49E4-9101-607E59C0D3A1}"/>
-    <dgm:cxn modelId="{0E406127-EA70-44E7-A826-413024757030}" type="presOf" srcId="{6C1FD421-F219-49B4-9FD2-497108303691}" destId="{B49A5AC8-DC03-4E01-9F78-3C6AEC1AE3BD}" srcOrd="0" destOrd="1" presId="urn:microsoft.com/office/officeart/2009/3/layout/PieProcess"/>
     <dgm:cxn modelId="{B76CD927-8D26-4988-97DA-67896A34015C}" srcId="{3ED8B981-2419-49F1-AA3E-CE3171980363}" destId="{73FAE996-5CCA-4765-B72D-7695CC354779}" srcOrd="0" destOrd="0" parTransId="{8D4BCBE6-78AD-46E7-9564-4CAC4BEBC850}" sibTransId="{381BFF4C-B961-44B1-9D84-E48A824D286B}"/>
     <dgm:cxn modelId="{E6C8362A-3943-4F0D-8365-ACF3E6EDB557}" srcId="{3B484BA8-4334-4382-BE4B-9A0962B30D59}" destId="{3ED8B981-2419-49F1-AA3E-CE3171980363}" srcOrd="0" destOrd="0" parTransId="{3A986244-103F-4CA8-81D1-2C7781C60B00}" sibTransId="{2D626B28-A9F8-4765-8027-75AAFB1D0F3F}"/>
-    <dgm:cxn modelId="{E0546C2A-C276-4E16-B2B9-5AF8B32BD655}" type="presOf" srcId="{12C5520A-7E88-425E-B962-BDE40417DA5F}" destId="{F7ADC11F-B29E-425E-97FE-1D18B82E97C8}" srcOrd="0" destOrd="2" presId="urn:microsoft.com/office/officeart/2009/3/layout/PieProcess"/>
-    <dgm:cxn modelId="{EA32FE62-88B6-4134-AD36-F5FE98A8F711}" type="presOf" srcId="{FFF17D55-4622-42B6-8D73-400DC5415335}" destId="{447FE049-B941-49A1-93CE-93EF92A5ECD8}" srcOrd="0" destOrd="1" presId="urn:microsoft.com/office/officeart/2009/3/layout/PieProcess"/>
+    <dgm:cxn modelId="{76E69135-A87B-43F3-A8FE-A1D37AD613CE}" type="presOf" srcId="{75C54E77-67B0-4978-9B78-24908691C701}" destId="{42C27377-0741-4F65-9B0D-6210A28EEDFB}" srcOrd="0" destOrd="2" presId="urn:microsoft.com/office/officeart/2005/8/layout/list1"/>
+    <dgm:cxn modelId="{26D7A661-4E3A-442F-B463-B3D18ED3CA9E}" type="presOf" srcId="{E959D2C4-3465-443A-9FD9-EF859A5B8B8C}" destId="{CB703570-B5CB-4DC4-935C-02C1EB08C4CF}" srcOrd="0" destOrd="0" presId="urn:microsoft.com/office/officeart/2005/8/layout/list1"/>
+    <dgm:cxn modelId="{E951EF44-18D8-4281-AB0A-12EC0EBB7CFB}" type="presOf" srcId="{3B484BA8-4334-4382-BE4B-9A0962B30D59}" destId="{1F6E8870-6A82-4850-9F58-899EEC90C675}" srcOrd="0" destOrd="0" presId="urn:microsoft.com/office/officeart/2005/8/layout/list1"/>
     <dgm:cxn modelId="{DD87F645-EB6B-4BD7-B23B-38C8DA75F6BC}" srcId="{3ED8B981-2419-49F1-AA3E-CE3171980363}" destId="{B444A99B-3C52-4F46-8E74-BB55C3DF2AC9}" srcOrd="1" destOrd="0" parTransId="{6F0278B7-D416-4496-98C3-FA7779BA2272}" sibTransId="{8C1FB35C-9F9F-41CB-908B-5914688706D3}"/>
-    <dgm:cxn modelId="{8E766B66-5ED0-4878-B098-7D6AAAA9AB2D}" type="presOf" srcId="{F45A1763-1D37-4176-A01A-8B388675DEE6}" destId="{C84D355D-DEEB-4AD5-A665-ED17B4FF9262}" srcOrd="0" destOrd="3" presId="urn:microsoft.com/office/officeart/2009/3/layout/PieProcess"/>
     <dgm:cxn modelId="{32254C66-AAB7-4E19-B499-4FC54C194164}" srcId="{3B484BA8-4334-4382-BE4B-9A0962B30D59}" destId="{DAE99FA4-C160-411B-B154-8B1A56869BD7}" srcOrd="1" destOrd="0" parTransId="{8EC597DB-714E-4F76-AE44-71176EDC7046}" sibTransId="{2FC829A5-4F35-4B05-9609-2406216F002D}"/>
     <dgm:cxn modelId="{225E7269-8737-4150-8635-E3ACFFDCFAC7}" srcId="{3B484BA8-4334-4382-BE4B-9A0962B30D59}" destId="{55BE11E8-8A50-4E0F-BF8A-95A15CFF4463}" srcOrd="2" destOrd="0" parTransId="{DCF610E3-C496-4066-8D97-9265ECD24E27}" sibTransId="{292E318F-F578-4DC4-A204-F672C4692765}"/>
+    <dgm:cxn modelId="{98C9244E-94FB-4966-8052-AD7D8AB21748}" type="presOf" srcId="{A60FD67B-1B8B-44C2-AD67-DD690C8E26C3}" destId="{2D2F9F65-531D-4DCD-8A6F-711CFA8F88A3}" srcOrd="0" destOrd="2" presId="urn:microsoft.com/office/officeart/2005/8/layout/list1"/>
     <dgm:cxn modelId="{5A42F471-5A94-4DC9-A921-643E87ACFCF7}" srcId="{E959D2C4-3465-443A-9FD9-EF859A5B8B8C}" destId="{DB6F21F3-2CD8-4754-A820-12F344633180}" srcOrd="0" destOrd="0" parTransId="{039D56A0-11A0-4D20-B469-C233AC89B8D4}" sibTransId="{560F6354-A7C2-4628-AF46-24684A131364}"/>
+    <dgm:cxn modelId="{DE4E7C72-AC9A-4A44-9EB8-50B183DEDF7F}" type="presOf" srcId="{12C5520A-7E88-425E-B962-BDE40417DA5F}" destId="{2E222F4D-B4EE-4816-8038-5E24C2DAE4F3}" srcOrd="0" destOrd="2" presId="urn:microsoft.com/office/officeart/2005/8/layout/list1"/>
     <dgm:cxn modelId="{97B76D74-C794-4EA3-9E54-40DF121A30CF}" srcId="{BC916986-E295-4DC2-880C-F56125038ED0}" destId="{FFF17D55-4622-42B6-8D73-400DC5415335}" srcOrd="0" destOrd="0" parTransId="{0ECD9BE7-B775-41B8-99A1-8C4C4F87E5CF}" sibTransId="{9AA57100-92BC-4E64-9887-39C13A80F574}"/>
-    <dgm:cxn modelId="{8FABBD74-274B-415B-BF1A-9D842FD52F16}" type="presOf" srcId="{DAE99FA4-C160-411B-B154-8B1A56869BD7}" destId="{A4F5433F-A0F8-4143-8D05-4194FA38DDD5}" srcOrd="0" destOrd="0" presId="urn:microsoft.com/office/officeart/2009/3/layout/PieProcess"/>
+    <dgm:cxn modelId="{0298FD74-BBE8-4870-A72A-DCD999B32B9B}" type="presOf" srcId="{3ED8B981-2419-49F1-AA3E-CE3171980363}" destId="{7CA3CF54-81C9-4EA5-98A1-B689A151ED24}" srcOrd="1" destOrd="0" presId="urn:microsoft.com/office/officeart/2005/8/layout/list1"/>
     <dgm:cxn modelId="{9ECF8F55-C626-4250-A1CA-7D79FF510B62}" srcId="{E959D2C4-3465-443A-9FD9-EF859A5B8B8C}" destId="{F45A1763-1D37-4176-A01A-8B388675DEE6}" srcOrd="1" destOrd="0" parTransId="{329D0DBC-691D-4FCC-8599-9F96B8F82716}" sibTransId="{BACD0AA3-D511-43B9-B0F2-471C8A780117}"/>
-    <dgm:cxn modelId="{09D7CA76-A8F1-4154-9641-8F75C4C1ED30}" type="presOf" srcId="{A60FD67B-1B8B-44C2-AD67-DD690C8E26C3}" destId="{447FE049-B941-49A1-93CE-93EF92A5ECD8}" srcOrd="0" destOrd="2" presId="urn:microsoft.com/office/officeart/2009/3/layout/PieProcess"/>
     <dgm:cxn modelId="{59C28878-278D-4F74-A150-8A27BD5B42DA}" srcId="{DAE99FA4-C160-411B-B154-8B1A56869BD7}" destId="{4FDF2127-BD41-4A09-94A1-AA192C05774C}" srcOrd="1" destOrd="0" parTransId="{FD93E72B-61E8-48AE-9EED-87757DF04B2C}" sibTransId="{4AF4A9B8-BC21-4B08-A44D-0EE42ED3AD36}"/>
-    <dgm:cxn modelId="{D0A7CC78-B311-4BB2-8D46-E6587B11F86C}" type="presOf" srcId="{B444A99B-3C52-4F46-8E74-BB55C3DF2AC9}" destId="{F7ADC11F-B29E-425E-97FE-1D18B82E97C8}" srcOrd="0" destOrd="1" presId="urn:microsoft.com/office/officeart/2009/3/layout/PieProcess"/>
-    <dgm:cxn modelId="{4AD1B85A-E698-43EA-8DDF-4772BF157ABA}" type="presOf" srcId="{C3A61AE4-A5E6-453F-AE1C-3298ACCF301B}" destId="{C84D355D-DEEB-4AD5-A665-ED17B4FF9262}" srcOrd="0" destOrd="5" presId="urn:microsoft.com/office/officeart/2009/3/layout/PieProcess"/>
+    <dgm:cxn modelId="{2DC6DB59-B8D0-41CA-B053-C635C05FB9CF}" type="presOf" srcId="{F45A1763-1D37-4176-A01A-8B388675DEE6}" destId="{42C27377-0741-4F65-9B0D-6210A28EEDFB}" srcOrd="0" destOrd="3" presId="urn:microsoft.com/office/officeart/2005/8/layout/list1"/>
+    <dgm:cxn modelId="{61F5797A-0E84-4216-AC7F-E64104A12032}" type="presOf" srcId="{3965C573-745C-414F-99E9-166FA985D4A2}" destId="{1AEFC7B9-4E17-4373-B889-88C020B8414F}" srcOrd="0" destOrd="0" presId="urn:microsoft.com/office/officeart/2005/8/layout/list1"/>
     <dgm:cxn modelId="{B2CED07D-B8B9-47D2-8591-F2A273FE12DA}" srcId="{BACAE75D-00C5-4EE5-9917-7515BA58D63A}" destId="{BC916986-E295-4DC2-880C-F56125038ED0}" srcOrd="0" destOrd="0" parTransId="{2E214677-018E-47C9-8668-A24E6C44C39C}" sibTransId="{B18497F4-6D7D-4E64-8D2F-C936D700E00A}"/>
-    <dgm:cxn modelId="{08A45683-D30A-467A-B33B-1E3A9457C893}" type="presOf" srcId="{86F40B3C-09C0-4E8B-9180-8D6239DE422F}" destId="{C84D355D-DEEB-4AD5-A665-ED17B4FF9262}" srcOrd="0" destOrd="6" presId="urn:microsoft.com/office/officeart/2009/3/layout/PieProcess"/>
+    <dgm:cxn modelId="{365D3985-F8DE-4246-BF46-95A87CA1B843}" type="presOf" srcId="{4FDF2127-BD41-4A09-94A1-AA192C05774C}" destId="{1D7E373B-62EE-4097-8383-EA46023FB4BF}" srcOrd="0" destOrd="1" presId="urn:microsoft.com/office/officeart/2005/8/layout/list1"/>
+    <dgm:cxn modelId="{8271BA86-76C5-4104-A23C-2F05B5C4815C}" type="presOf" srcId="{C3A61AE4-A5E6-453F-AE1C-3298ACCF301B}" destId="{42C27377-0741-4F65-9B0D-6210A28EEDFB}" srcOrd="0" destOrd="5" presId="urn:microsoft.com/office/officeart/2005/8/layout/list1"/>
     <dgm:cxn modelId="{EDF0F088-1757-4440-8DE5-EE9E376E4BBE}" srcId="{3ED8B981-2419-49F1-AA3E-CE3171980363}" destId="{12C5520A-7E88-425E-B962-BDE40417DA5F}" srcOrd="2" destOrd="0" parTransId="{2058FD1F-DA39-44D7-A133-2B17ADA43D19}" sibTransId="{BDAB5EB4-436A-4ABB-B3DE-CF43E4A473C1}"/>
-    <dgm:cxn modelId="{CA8B738E-FF8A-41D2-AB49-B7451359D0E7}" type="presOf" srcId="{FBE23FA9-F6FE-4849-920A-E0614201F88D}" destId="{2846E483-72DC-45FA-90A6-7588E8C4BB2F}" srcOrd="0" destOrd="0" presId="urn:microsoft.com/office/officeart/2009/3/layout/PieProcess"/>
+    <dgm:cxn modelId="{A0EB3B90-F7CD-4C5A-9C92-3258BC79C370}" type="presOf" srcId="{FBE23FA9-F6FE-4849-920A-E0614201F88D}" destId="{1D7E373B-62EE-4097-8383-EA46023FB4BF}" srcOrd="0" destOrd="0" presId="urn:microsoft.com/office/officeart/2005/8/layout/list1"/>
+    <dgm:cxn modelId="{731DBF96-8E48-4962-AF54-525A63BC77E8}" type="presOf" srcId="{BACAE75D-00C5-4EE5-9917-7515BA58D63A}" destId="{677A82DF-9EC6-48C3-886F-ABD6798103A4}" srcOrd="1" destOrd="0" presId="urn:microsoft.com/office/officeart/2005/8/layout/list1"/>
     <dgm:cxn modelId="{F04D4B98-1D6B-41D2-9BBB-696CF2C3DE98}" srcId="{55BE11E8-8A50-4E0F-BF8A-95A15CFF4463}" destId="{6C1FD421-F219-49B4-9FD2-497108303691}" srcOrd="1" destOrd="0" parTransId="{6220DB40-1B5B-4F0B-921A-B8695D72B0A7}" sibTransId="{1D077771-17EE-479A-8008-7F068EF1480C}"/>
-    <dgm:cxn modelId="{FEAF0FA6-1C74-441C-9249-07519060DF7F}" type="presOf" srcId="{BC916986-E295-4DC2-880C-F56125038ED0}" destId="{447FE049-B941-49A1-93CE-93EF92A5ECD8}" srcOrd="0" destOrd="0" presId="urn:microsoft.com/office/officeart/2009/3/layout/PieProcess"/>
+    <dgm:cxn modelId="{48FFB798-E271-4DAC-A441-1A197996A11B}" type="presOf" srcId="{E959D2C4-3465-443A-9FD9-EF859A5B8B8C}" destId="{BBC987B7-7DFB-4489-981A-01A4226BD49F}" srcOrd="1" destOrd="0" presId="urn:microsoft.com/office/officeart/2005/8/layout/list1"/>
+    <dgm:cxn modelId="{66F8E898-10DD-4C1E-9D67-1F70D0B26453}" type="presOf" srcId="{86F40B3C-09C0-4E8B-9180-8D6239DE422F}" destId="{42C27377-0741-4F65-9B0D-6210A28EEDFB}" srcOrd="0" destOrd="6" presId="urn:microsoft.com/office/officeart/2005/8/layout/list1"/>
+    <dgm:cxn modelId="{D96162AE-5B41-45AB-9F74-37D1845190D6}" type="presOf" srcId="{8661A6B4-B33C-41D4-9E73-1C3FABA777E3}" destId="{42C27377-0741-4F65-9B0D-6210A28EEDFB}" srcOrd="0" destOrd="1" presId="urn:microsoft.com/office/officeart/2005/8/layout/list1"/>
+    <dgm:cxn modelId="{B99A72B1-618D-47CF-B8B1-2AD9BE8A50D2}" type="presOf" srcId="{37D58DA0-3DA7-49D5-A52A-841D5B9B7376}" destId="{2D2F9F65-531D-4DCD-8A6F-711CFA8F88A3}" srcOrd="0" destOrd="3" presId="urn:microsoft.com/office/officeart/2005/8/layout/list1"/>
     <dgm:cxn modelId="{E7C156B5-63AD-4397-B636-47CBB5D3DB81}" srcId="{BACAE75D-00C5-4EE5-9917-7515BA58D63A}" destId="{A60FD67B-1B8B-44C2-AD67-DD690C8E26C3}" srcOrd="1" destOrd="0" parTransId="{70197955-AFF1-4875-8A4E-C64394C02868}" sibTransId="{2BF92286-9529-493D-B42E-8AE443861EEF}"/>
+    <dgm:cxn modelId="{090207B6-CDC6-4A5E-AE24-AC629DE6ED90}" type="presOf" srcId="{73FAE996-5CCA-4765-B72D-7695CC354779}" destId="{2E222F4D-B4EE-4816-8038-5E24C2DAE4F3}" srcOrd="0" destOrd="0" presId="urn:microsoft.com/office/officeart/2005/8/layout/list1"/>
+    <dgm:cxn modelId="{00D437BB-8455-442F-BFA4-7D1B00AED709}" type="presOf" srcId="{BACAE75D-00C5-4EE5-9917-7515BA58D63A}" destId="{BD22A25B-4305-4DAF-902E-F858F6CF391D}" srcOrd="0" destOrd="0" presId="urn:microsoft.com/office/officeart/2005/8/layout/list1"/>
     <dgm:cxn modelId="{C9BB0FBC-6687-4594-9096-866D57C46319}" srcId="{DB6F21F3-2CD8-4754-A820-12F344633180}" destId="{8661A6B4-B33C-41D4-9E73-1C3FABA777E3}" srcOrd="0" destOrd="0" parTransId="{A6DC3D9C-3887-4BF7-9555-C6A2A3565299}" sibTransId="{8D923B9B-A95A-4E47-AEED-39C897860760}"/>
     <dgm:cxn modelId="{553C0EC2-61C7-49C5-99D6-FBCD7D083499}" srcId="{E959D2C4-3465-443A-9FD9-EF859A5B8B8C}" destId="{86F40B3C-09C0-4E8B-9180-8D6239DE422F}" srcOrd="2" destOrd="0" parTransId="{8B5E92C3-554D-4EBD-BB12-4C2981A0AF06}" sibTransId="{5FFB46E6-58F7-45F8-AA99-CC48BABD3C94}"/>
-    <dgm:cxn modelId="{4C6BEEC5-CBFB-4BBD-8B59-32EBD187F5BC}" type="presOf" srcId="{55BE11E8-8A50-4E0F-BF8A-95A15CFF4463}" destId="{EFDFD436-3138-46CE-8FA8-756F4FCA80A2}" srcOrd="0" destOrd="0" presId="urn:microsoft.com/office/officeart/2009/3/layout/PieProcess"/>
     <dgm:cxn modelId="{B87375C7-B2AD-4D1E-BB9B-89D5FA1426DD}" srcId="{3B484BA8-4334-4382-BE4B-9A0962B30D59}" destId="{E959D2C4-3465-443A-9FD9-EF859A5B8B8C}" srcOrd="3" destOrd="0" parTransId="{E5F61252-ED4D-4F5F-B67E-F0960BFD5A92}" sibTransId="{F44153C0-1E3A-4BE7-A0FE-F0AFF8D0B344}"/>
-    <dgm:cxn modelId="{940F91C9-D1B8-4928-A8A8-0D7E46EECCB8}" type="presOf" srcId="{BACAE75D-00C5-4EE5-9917-7515BA58D63A}" destId="{D38D2675-464E-4488-B695-984A9A9AB692}" srcOrd="0" destOrd="0" presId="urn:microsoft.com/office/officeart/2009/3/layout/PieProcess"/>
+    <dgm:cxn modelId="{FBAB88C9-725E-4F88-B53B-D59C1F0C44A8}" type="presOf" srcId="{DAE99FA4-C160-411B-B154-8B1A56869BD7}" destId="{095ABDFF-0B60-47D0-9AC2-995B6E24EC52}" srcOrd="0" destOrd="0" presId="urn:microsoft.com/office/officeart/2005/8/layout/list1"/>
     <dgm:cxn modelId="{24EDA7CD-E1C5-4ECF-AC4F-0774ED0E7806}" srcId="{DB6F21F3-2CD8-4754-A820-12F344633180}" destId="{75C54E77-67B0-4978-9B78-24908691C701}" srcOrd="1" destOrd="0" parTransId="{8D1FCF03-D2C4-4E91-90F8-07E272FB52A9}" sibTransId="{096C6CDE-557E-4712-A12A-53DEB9AC2AD3}"/>
-    <dgm:cxn modelId="{CA67ADD3-AD5F-4F4D-8175-79D74842A826}" type="presOf" srcId="{DB6F21F3-2CD8-4754-A820-12F344633180}" destId="{C84D355D-DEEB-4AD5-A665-ED17B4FF9262}" srcOrd="0" destOrd="0" presId="urn:microsoft.com/office/officeart/2009/3/layout/PieProcess"/>
-    <dgm:cxn modelId="{5624F3D4-3E43-4541-933C-F38D7D52FFA7}" type="presOf" srcId="{3965C573-745C-414F-99E9-166FA985D4A2}" destId="{B49A5AC8-DC03-4E01-9F78-3C6AEC1AE3BD}" srcOrd="0" destOrd="0" presId="urn:microsoft.com/office/officeart/2009/3/layout/PieProcess"/>
-    <dgm:cxn modelId="{D8951FDD-208C-408C-973A-BB3ECE6414DE}" type="presOf" srcId="{3B484BA8-4334-4382-BE4B-9A0962B30D59}" destId="{8571A11B-4DD1-4B5F-8D0A-423772B01385}" srcOrd="0" destOrd="0" presId="urn:microsoft.com/office/officeart/2009/3/layout/PieProcess"/>
+    <dgm:cxn modelId="{26CDBCCD-813B-4C6B-BB20-21B3C75A94EE}" type="presOf" srcId="{55BE11E8-8A50-4E0F-BF8A-95A15CFF4463}" destId="{C369BA4A-9467-458B-80D5-F89ECC27E0B3}" srcOrd="0" destOrd="0" presId="urn:microsoft.com/office/officeart/2005/8/layout/list1"/>
+    <dgm:cxn modelId="{1BBA0BCF-8D75-4257-B6F3-B1CECCFD1948}" type="presOf" srcId="{6C1FD421-F219-49B4-9FD2-497108303691}" destId="{1AEFC7B9-4E17-4373-B889-88C020B8414F}" srcOrd="0" destOrd="1" presId="urn:microsoft.com/office/officeart/2005/8/layout/list1"/>
+    <dgm:cxn modelId="{1AFE23D6-C26E-4E4C-9F44-D17F615D9108}" type="presOf" srcId="{DB6F21F3-2CD8-4754-A820-12F344633180}" destId="{42C27377-0741-4F65-9B0D-6210A28EEDFB}" srcOrd="0" destOrd="0" presId="urn:microsoft.com/office/officeart/2005/8/layout/list1"/>
     <dgm:cxn modelId="{F4EF6DDD-8C8F-4C99-AECF-D2568667E9AA}" srcId="{F45A1763-1D37-4176-A01A-8B388675DEE6}" destId="{C3A61AE4-A5E6-453F-AE1C-3298ACCF301B}" srcOrd="1" destOrd="0" parTransId="{308E8E79-8A0D-4D55-B735-6342D1B3336C}" sibTransId="{636E46AF-EA0C-4A02-802A-88E0E8F9B6E2}"/>
-    <dgm:cxn modelId="{D8F6ACDE-2638-45F7-AB18-7F6F6131A2D6}" type="presOf" srcId="{3ED8B981-2419-49F1-AA3E-CE3171980363}" destId="{2FB46E21-917D-4228-A4E7-8EEF5373EB43}" srcOrd="0" destOrd="0" presId="urn:microsoft.com/office/officeart/2009/3/layout/PieProcess"/>
-    <dgm:cxn modelId="{F8B3B5EA-49E3-4762-9B85-C73202D43DF2}" type="presOf" srcId="{73FAE996-5CCA-4765-B72D-7695CC354779}" destId="{F7ADC11F-B29E-425E-97FE-1D18B82E97C8}" srcOrd="0" destOrd="0" presId="urn:microsoft.com/office/officeart/2009/3/layout/PieProcess"/>
-    <dgm:cxn modelId="{DD5759F7-7CD5-481D-A51E-649FD1182167}" type="presOf" srcId="{37D58DA0-3DA7-49D5-A52A-841D5B9B7376}" destId="{447FE049-B941-49A1-93CE-93EF92A5ECD8}" srcOrd="0" destOrd="3" presId="urn:microsoft.com/office/officeart/2009/3/layout/PieProcess"/>
-    <dgm:cxn modelId="{50DB78F8-B025-41E9-8053-30897931FB2A}" type="presOf" srcId="{4FDF2127-BD41-4A09-94A1-AA192C05774C}" destId="{2846E483-72DC-45FA-90A6-7588E8C4BB2F}" srcOrd="0" destOrd="1" presId="urn:microsoft.com/office/officeart/2009/3/layout/PieProcess"/>
-    <dgm:cxn modelId="{47D306F9-161E-44A6-B7CB-319A96A16EE4}" type="presOf" srcId="{E3BE7625-A942-46DB-9512-46D80E8CC0F8}" destId="{B49A5AC8-DC03-4E01-9F78-3C6AEC1AE3BD}" srcOrd="0" destOrd="2" presId="urn:microsoft.com/office/officeart/2009/3/layout/PieProcess"/>
-    <dgm:cxn modelId="{FB0C18B8-F850-4D97-B964-4FFB90A7BEAD}" type="presParOf" srcId="{8571A11B-4DD1-4B5F-8D0A-423772B01385}" destId="{931C2B1D-D52C-4DA8-AA60-FC2152F3B5B6}" srcOrd="0" destOrd="0" presId="urn:microsoft.com/office/officeart/2009/3/layout/PieProcess"/>
-    <dgm:cxn modelId="{9868113D-6ED5-4877-B746-8D2B43A9EEDE}" type="presParOf" srcId="{931C2B1D-D52C-4DA8-AA60-FC2152F3B5B6}" destId="{269EEAD9-5BED-4318-B334-93D23AA20ABC}" srcOrd="0" destOrd="0" presId="urn:microsoft.com/office/officeart/2009/3/layout/PieProcess"/>
-    <dgm:cxn modelId="{328AC622-77B6-45D4-827A-4EE11F105582}" type="presParOf" srcId="{931C2B1D-D52C-4DA8-AA60-FC2152F3B5B6}" destId="{FE83F8AF-A8C5-4058-BB5D-EC7CFAED2F50}" srcOrd="1" destOrd="0" presId="urn:microsoft.com/office/officeart/2009/3/layout/PieProcess"/>
-    <dgm:cxn modelId="{7A6A4040-D619-4763-B992-2F8461B031F8}" type="presParOf" srcId="{931C2B1D-D52C-4DA8-AA60-FC2152F3B5B6}" destId="{2FB46E21-917D-4228-A4E7-8EEF5373EB43}" srcOrd="2" destOrd="0" presId="urn:microsoft.com/office/officeart/2009/3/layout/PieProcess"/>
-    <dgm:cxn modelId="{CE11A87A-BAB1-4DFD-80CE-E1F93CC3E716}" type="presParOf" srcId="{8571A11B-4DD1-4B5F-8D0A-423772B01385}" destId="{CEB8C10C-FA41-465E-96AC-CCB92AD7F8B3}" srcOrd="1" destOrd="0" presId="urn:microsoft.com/office/officeart/2009/3/layout/PieProcess"/>
-    <dgm:cxn modelId="{B684AAE1-A1A7-4E46-840E-9A18E47386E1}" type="presParOf" srcId="{8571A11B-4DD1-4B5F-8D0A-423772B01385}" destId="{74A5FED9-79FD-454A-A31A-FF291CA836BF}" srcOrd="2" destOrd="0" presId="urn:microsoft.com/office/officeart/2009/3/layout/PieProcess"/>
-    <dgm:cxn modelId="{EF5D4ECF-32E8-4143-9A93-905B70079ADE}" type="presParOf" srcId="{74A5FED9-79FD-454A-A31A-FF291CA836BF}" destId="{F7ADC11F-B29E-425E-97FE-1D18B82E97C8}" srcOrd="0" destOrd="0" presId="urn:microsoft.com/office/officeart/2009/3/layout/PieProcess"/>
-    <dgm:cxn modelId="{9E7654D4-2A66-4444-8E2D-E5FC79A4D694}" type="presParOf" srcId="{8571A11B-4DD1-4B5F-8D0A-423772B01385}" destId="{DC78E8F5-D987-4B6D-8553-5278F149C2F9}" srcOrd="3" destOrd="0" presId="urn:microsoft.com/office/officeart/2009/3/layout/PieProcess"/>
-    <dgm:cxn modelId="{A135E7AC-EEB1-4E36-8469-CC6866F85075}" type="presParOf" srcId="{8571A11B-4DD1-4B5F-8D0A-423772B01385}" destId="{3F23FF0E-C253-4421-8E1C-D95B2091075D}" srcOrd="4" destOrd="0" presId="urn:microsoft.com/office/officeart/2009/3/layout/PieProcess"/>
-    <dgm:cxn modelId="{E06C3850-A4F4-4C35-88FF-9F4CC9C6F710}" type="presParOf" srcId="{3F23FF0E-C253-4421-8E1C-D95B2091075D}" destId="{D7D5BD64-771B-406F-9F77-C588574FD50F}" srcOrd="0" destOrd="0" presId="urn:microsoft.com/office/officeart/2009/3/layout/PieProcess"/>
-    <dgm:cxn modelId="{4A08E459-B1A2-40B9-8FBA-8511F2F81A6C}" type="presParOf" srcId="{3F23FF0E-C253-4421-8E1C-D95B2091075D}" destId="{54EEA023-20EF-46C0-995C-83ECC8E51C4B}" srcOrd="1" destOrd="0" presId="urn:microsoft.com/office/officeart/2009/3/layout/PieProcess"/>
-    <dgm:cxn modelId="{C81D0A5A-3FF9-4541-9BB6-E09F8F5E03D2}" type="presParOf" srcId="{3F23FF0E-C253-4421-8E1C-D95B2091075D}" destId="{A4F5433F-A0F8-4143-8D05-4194FA38DDD5}" srcOrd="2" destOrd="0" presId="urn:microsoft.com/office/officeart/2009/3/layout/PieProcess"/>
-    <dgm:cxn modelId="{BAA4447F-B67F-4FA4-AB3A-C8DF4D0E7411}" type="presParOf" srcId="{8571A11B-4DD1-4B5F-8D0A-423772B01385}" destId="{F8BE4EB5-C655-451D-B2B0-6C12429E331F}" srcOrd="5" destOrd="0" presId="urn:microsoft.com/office/officeart/2009/3/layout/PieProcess"/>
-    <dgm:cxn modelId="{D715EC4C-B951-4026-BD0E-2BFFD9F8C98E}" type="presParOf" srcId="{8571A11B-4DD1-4B5F-8D0A-423772B01385}" destId="{83A65D8E-8FEE-4036-AD02-8257FECB668B}" srcOrd="6" destOrd="0" presId="urn:microsoft.com/office/officeart/2009/3/layout/PieProcess"/>
-    <dgm:cxn modelId="{F68CFFDD-155A-44C1-85E6-0CE778FA64C3}" type="presParOf" srcId="{83A65D8E-8FEE-4036-AD02-8257FECB668B}" destId="{2846E483-72DC-45FA-90A6-7588E8C4BB2F}" srcOrd="0" destOrd="0" presId="urn:microsoft.com/office/officeart/2009/3/layout/PieProcess"/>
-    <dgm:cxn modelId="{602ED355-3DCA-4F05-81F7-6F2AAC8141EA}" type="presParOf" srcId="{8571A11B-4DD1-4B5F-8D0A-423772B01385}" destId="{D62EB3B5-10A3-4EAB-ADC6-5B087EB70BEC}" srcOrd="7" destOrd="0" presId="urn:microsoft.com/office/officeart/2009/3/layout/PieProcess"/>
-    <dgm:cxn modelId="{895D4415-0B81-4BD3-9A13-3371F7CCE7BB}" type="presParOf" srcId="{8571A11B-4DD1-4B5F-8D0A-423772B01385}" destId="{D7AA0EA6-0EA5-40DD-B409-0268D3A9144A}" srcOrd="8" destOrd="0" presId="urn:microsoft.com/office/officeart/2009/3/layout/PieProcess"/>
-    <dgm:cxn modelId="{8DEF6786-B4F2-459C-A338-F63425790891}" type="presParOf" srcId="{D7AA0EA6-0EA5-40DD-B409-0268D3A9144A}" destId="{A76C61C1-6AFA-4D5D-BEDC-075B51D104C1}" srcOrd="0" destOrd="0" presId="urn:microsoft.com/office/officeart/2009/3/layout/PieProcess"/>
-    <dgm:cxn modelId="{A6C10215-62AE-495B-B0D9-FD047198AD9A}" type="presParOf" srcId="{D7AA0EA6-0EA5-40DD-B409-0268D3A9144A}" destId="{85CF1AC6-E8FD-45AA-B447-A983A2C8647A}" srcOrd="1" destOrd="0" presId="urn:microsoft.com/office/officeart/2009/3/layout/PieProcess"/>
-    <dgm:cxn modelId="{CDE4F04A-1137-4B07-843F-92FECCE5174D}" type="presParOf" srcId="{D7AA0EA6-0EA5-40DD-B409-0268D3A9144A}" destId="{EFDFD436-3138-46CE-8FA8-756F4FCA80A2}" srcOrd="2" destOrd="0" presId="urn:microsoft.com/office/officeart/2009/3/layout/PieProcess"/>
-    <dgm:cxn modelId="{E976B7A8-4E74-4A55-B461-9948D514DF53}" type="presParOf" srcId="{8571A11B-4DD1-4B5F-8D0A-423772B01385}" destId="{B4606010-2FE4-4641-914F-803A38FCA0C8}" srcOrd="9" destOrd="0" presId="urn:microsoft.com/office/officeart/2009/3/layout/PieProcess"/>
-    <dgm:cxn modelId="{84A0923C-16FE-4667-A658-3D4E4D3F0135}" type="presParOf" srcId="{8571A11B-4DD1-4B5F-8D0A-423772B01385}" destId="{1B007060-6B41-4BFD-A2E3-60C8E650BCA5}" srcOrd="10" destOrd="0" presId="urn:microsoft.com/office/officeart/2009/3/layout/PieProcess"/>
-    <dgm:cxn modelId="{A7FA4F01-ECBA-4BBA-9BEE-E33A56543908}" type="presParOf" srcId="{1B007060-6B41-4BFD-A2E3-60C8E650BCA5}" destId="{B49A5AC8-DC03-4E01-9F78-3C6AEC1AE3BD}" srcOrd="0" destOrd="0" presId="urn:microsoft.com/office/officeart/2009/3/layout/PieProcess"/>
-    <dgm:cxn modelId="{FD11B2EE-0D83-470A-B998-C33591D18D69}" type="presParOf" srcId="{8571A11B-4DD1-4B5F-8D0A-423772B01385}" destId="{918C83EA-28FA-448F-A025-0A758A04E9BA}" srcOrd="11" destOrd="0" presId="urn:microsoft.com/office/officeart/2009/3/layout/PieProcess"/>
-    <dgm:cxn modelId="{A3814047-6500-450A-AE5A-EC293CED5CEE}" type="presParOf" srcId="{8571A11B-4DD1-4B5F-8D0A-423772B01385}" destId="{0D466379-13B3-46CD-994D-566CD95E6ED7}" srcOrd="12" destOrd="0" presId="urn:microsoft.com/office/officeart/2009/3/layout/PieProcess"/>
-    <dgm:cxn modelId="{3A69E766-E0E5-4BAA-AF7E-E070E0D2A698}" type="presParOf" srcId="{0D466379-13B3-46CD-994D-566CD95E6ED7}" destId="{37EEA1A5-B486-4DFA-9FC0-D442431F571A}" srcOrd="0" destOrd="0" presId="urn:microsoft.com/office/officeart/2009/3/layout/PieProcess"/>
-    <dgm:cxn modelId="{CCD28963-06BD-416B-971D-8CD8E08A93B7}" type="presParOf" srcId="{0D466379-13B3-46CD-994D-566CD95E6ED7}" destId="{6895D33D-AAC7-4C90-8C46-D5C76F04A5EC}" srcOrd="1" destOrd="0" presId="urn:microsoft.com/office/officeart/2009/3/layout/PieProcess"/>
-    <dgm:cxn modelId="{20EBFAD0-16B2-4BB6-BB33-63B0A7BB4760}" type="presParOf" srcId="{0D466379-13B3-46CD-994D-566CD95E6ED7}" destId="{C89B0AB5-B955-482C-AE2A-C9ABCFCF81B8}" srcOrd="2" destOrd="0" presId="urn:microsoft.com/office/officeart/2009/3/layout/PieProcess"/>
-    <dgm:cxn modelId="{91D53FAF-6F62-4BCD-B5F5-6CF4EC5A2F10}" type="presParOf" srcId="{8571A11B-4DD1-4B5F-8D0A-423772B01385}" destId="{ADC8FFFC-2942-441B-8ED5-314E9A0EBE9A}" srcOrd="13" destOrd="0" presId="urn:microsoft.com/office/officeart/2009/3/layout/PieProcess"/>
-    <dgm:cxn modelId="{1ACF3B57-2E85-49C1-A91F-626D79CB7C2B}" type="presParOf" srcId="{8571A11B-4DD1-4B5F-8D0A-423772B01385}" destId="{4A3867B4-FD6E-43EE-A45C-99DE12DAD299}" srcOrd="14" destOrd="0" presId="urn:microsoft.com/office/officeart/2009/3/layout/PieProcess"/>
-    <dgm:cxn modelId="{2F5E54A5-3F30-4D28-81D2-9A617053185C}" type="presParOf" srcId="{4A3867B4-FD6E-43EE-A45C-99DE12DAD299}" destId="{C84D355D-DEEB-4AD5-A665-ED17B4FF9262}" srcOrd="0" destOrd="0" presId="urn:microsoft.com/office/officeart/2009/3/layout/PieProcess"/>
-    <dgm:cxn modelId="{C3CCC27D-76EB-4B79-8C80-E627727491E7}" type="presParOf" srcId="{8571A11B-4DD1-4B5F-8D0A-423772B01385}" destId="{C13BFC05-3B5F-488B-87CD-D11CDFFA43E2}" srcOrd="15" destOrd="0" presId="urn:microsoft.com/office/officeart/2009/3/layout/PieProcess"/>
-    <dgm:cxn modelId="{5D4254DA-4424-48D2-8727-2B1D90FEADF6}" type="presParOf" srcId="{8571A11B-4DD1-4B5F-8D0A-423772B01385}" destId="{3056FB71-C1D2-424C-B948-DB6DEA471625}" srcOrd="16" destOrd="0" presId="urn:microsoft.com/office/officeart/2009/3/layout/PieProcess"/>
-    <dgm:cxn modelId="{BE05C348-5CB2-4016-8A41-97A68F114F5F}" type="presParOf" srcId="{3056FB71-C1D2-424C-B948-DB6DEA471625}" destId="{BC5F3FB8-3B5A-42CE-8461-7C136CBF500D}" srcOrd="0" destOrd="0" presId="urn:microsoft.com/office/officeart/2009/3/layout/PieProcess"/>
-    <dgm:cxn modelId="{782F02E2-E762-48C8-9623-552627EE44B0}" type="presParOf" srcId="{3056FB71-C1D2-424C-B948-DB6DEA471625}" destId="{62E997E4-4E8A-45C6-9EED-AD1F6AB1A3E5}" srcOrd="1" destOrd="0" presId="urn:microsoft.com/office/officeart/2009/3/layout/PieProcess"/>
-    <dgm:cxn modelId="{D970B4E9-140D-4F4F-87FD-5F71635193EF}" type="presParOf" srcId="{3056FB71-C1D2-424C-B948-DB6DEA471625}" destId="{D38D2675-464E-4488-B695-984A9A9AB692}" srcOrd="2" destOrd="0" presId="urn:microsoft.com/office/officeart/2009/3/layout/PieProcess"/>
-    <dgm:cxn modelId="{AAB2FFDA-AE73-49C4-9E38-4BCF87A5A7BE}" type="presParOf" srcId="{8571A11B-4DD1-4B5F-8D0A-423772B01385}" destId="{83556737-9521-4B24-94F1-46279F6D4510}" srcOrd="17" destOrd="0" presId="urn:microsoft.com/office/officeart/2009/3/layout/PieProcess"/>
-    <dgm:cxn modelId="{0805A80F-3E53-44B3-963E-285A7FB7AE4B}" type="presParOf" srcId="{8571A11B-4DD1-4B5F-8D0A-423772B01385}" destId="{EBA8BF5D-5E15-4B2C-9AA9-9EDCB77DA2D2}" srcOrd="18" destOrd="0" presId="urn:microsoft.com/office/officeart/2009/3/layout/PieProcess"/>
-    <dgm:cxn modelId="{3B2F4B93-D255-44C0-856B-555016281945}" type="presParOf" srcId="{EBA8BF5D-5E15-4B2C-9AA9-9EDCB77DA2D2}" destId="{447FE049-B941-49A1-93CE-93EF92A5ECD8}" srcOrd="0" destOrd="0" presId="urn:microsoft.com/office/officeart/2009/3/layout/PieProcess"/>
+    <dgm:cxn modelId="{A17281E3-F261-4004-B0D5-B25689C6F2E4}" type="presOf" srcId="{3ED8B981-2419-49F1-AA3E-CE3171980363}" destId="{6687310D-9AB9-44D5-8423-61B0B358461C}" srcOrd="0" destOrd="0" presId="urn:microsoft.com/office/officeart/2005/8/layout/list1"/>
+    <dgm:cxn modelId="{4DF7CCEB-07B7-4EC6-8794-B032D470DDC5}" type="presOf" srcId="{14197409-D674-49E3-9313-06DD040F4AC9}" destId="{42C27377-0741-4F65-9B0D-6210A28EEDFB}" srcOrd="0" destOrd="4" presId="urn:microsoft.com/office/officeart/2005/8/layout/list1"/>
+    <dgm:cxn modelId="{816FBCEC-3678-417B-BFCE-E91A74EFCF32}" type="presOf" srcId="{B444A99B-3C52-4F46-8E74-BB55C3DF2AC9}" destId="{2E222F4D-B4EE-4816-8038-5E24C2DAE4F3}" srcOrd="0" destOrd="1" presId="urn:microsoft.com/office/officeart/2005/8/layout/list1"/>
+    <dgm:cxn modelId="{017BA0EE-203E-4BD0-A0E6-5A621CED44D7}" type="presOf" srcId="{DAE99FA4-C160-411B-B154-8B1A56869BD7}" destId="{E90CCC8F-8562-4556-B9B4-458A0E383B1C}" srcOrd="1" destOrd="0" presId="urn:microsoft.com/office/officeart/2005/8/layout/list1"/>
+    <dgm:cxn modelId="{797133FC-7185-4449-9FC7-B6063DD4C322}" type="presOf" srcId="{55BE11E8-8A50-4E0F-BF8A-95A15CFF4463}" destId="{BA9FDDE1-33CC-4965-BE47-D2FE7B9D0BAB}" srcOrd="1" destOrd="0" presId="urn:microsoft.com/office/officeart/2005/8/layout/list1"/>
+    <dgm:cxn modelId="{60C5F023-68FC-4EB9-B051-EE7BA1C058D6}" type="presParOf" srcId="{1F6E8870-6A82-4850-9F58-899EEC90C675}" destId="{50182D03-7BFD-441C-81E2-B549963A636A}" srcOrd="0" destOrd="0" presId="urn:microsoft.com/office/officeart/2005/8/layout/list1"/>
+    <dgm:cxn modelId="{DD6E3587-33AE-471E-BFFE-AE1A406C74A2}" type="presParOf" srcId="{50182D03-7BFD-441C-81E2-B549963A636A}" destId="{6687310D-9AB9-44D5-8423-61B0B358461C}" srcOrd="0" destOrd="0" presId="urn:microsoft.com/office/officeart/2005/8/layout/list1"/>
+    <dgm:cxn modelId="{A8FD747A-33C7-41B6-91A4-20C7403FBCC2}" type="presParOf" srcId="{50182D03-7BFD-441C-81E2-B549963A636A}" destId="{7CA3CF54-81C9-4EA5-98A1-B689A151ED24}" srcOrd="1" destOrd="0" presId="urn:microsoft.com/office/officeart/2005/8/layout/list1"/>
+    <dgm:cxn modelId="{4805F49A-C837-47FA-8D29-C723EC25FA97}" type="presParOf" srcId="{1F6E8870-6A82-4850-9F58-899EEC90C675}" destId="{31D77B2D-EEE3-4ABC-8C76-1794AD5127D5}" srcOrd="1" destOrd="0" presId="urn:microsoft.com/office/officeart/2005/8/layout/list1"/>
+    <dgm:cxn modelId="{E9040240-B4F1-448C-B577-0215E40B5FD6}" type="presParOf" srcId="{1F6E8870-6A82-4850-9F58-899EEC90C675}" destId="{2E222F4D-B4EE-4816-8038-5E24C2DAE4F3}" srcOrd="2" destOrd="0" presId="urn:microsoft.com/office/officeart/2005/8/layout/list1"/>
+    <dgm:cxn modelId="{FD0BC5CB-0F3B-4C23-9F1D-59B6B525F630}" type="presParOf" srcId="{1F6E8870-6A82-4850-9F58-899EEC90C675}" destId="{1943275C-0EA5-4AD2-BA95-9F64A520D70D}" srcOrd="3" destOrd="0" presId="urn:microsoft.com/office/officeart/2005/8/layout/list1"/>
+    <dgm:cxn modelId="{F830B328-8B82-4C0F-959E-FFC788253A39}" type="presParOf" srcId="{1F6E8870-6A82-4850-9F58-899EEC90C675}" destId="{E32AD969-F305-42E5-8CDE-F6EFF503547C}" srcOrd="4" destOrd="0" presId="urn:microsoft.com/office/officeart/2005/8/layout/list1"/>
+    <dgm:cxn modelId="{DBF42B8B-B36F-4588-BDE3-1EAE1A6A3188}" type="presParOf" srcId="{E32AD969-F305-42E5-8CDE-F6EFF503547C}" destId="{095ABDFF-0B60-47D0-9AC2-995B6E24EC52}" srcOrd="0" destOrd="0" presId="urn:microsoft.com/office/officeart/2005/8/layout/list1"/>
+    <dgm:cxn modelId="{4F5496E8-131B-4A18-A6E3-CA5DB946B2F8}" type="presParOf" srcId="{E32AD969-F305-42E5-8CDE-F6EFF503547C}" destId="{E90CCC8F-8562-4556-B9B4-458A0E383B1C}" srcOrd="1" destOrd="0" presId="urn:microsoft.com/office/officeart/2005/8/layout/list1"/>
+    <dgm:cxn modelId="{181F649F-5BE4-42A3-98F3-548B1917823C}" type="presParOf" srcId="{1F6E8870-6A82-4850-9F58-899EEC90C675}" destId="{6D0BE74E-4D6C-4EC7-846F-9D3BD35C7463}" srcOrd="5" destOrd="0" presId="urn:microsoft.com/office/officeart/2005/8/layout/list1"/>
+    <dgm:cxn modelId="{97F0DF9D-5B3B-4908-A480-23F19911756C}" type="presParOf" srcId="{1F6E8870-6A82-4850-9F58-899EEC90C675}" destId="{1D7E373B-62EE-4097-8383-EA46023FB4BF}" srcOrd="6" destOrd="0" presId="urn:microsoft.com/office/officeart/2005/8/layout/list1"/>
+    <dgm:cxn modelId="{D3C7CC44-64BD-41C7-85EE-6257738D2822}" type="presParOf" srcId="{1F6E8870-6A82-4850-9F58-899EEC90C675}" destId="{C060E05D-91B8-42DA-BAF3-88054D5C3803}" srcOrd="7" destOrd="0" presId="urn:microsoft.com/office/officeart/2005/8/layout/list1"/>
+    <dgm:cxn modelId="{BCE4FB97-09AF-4C8F-8796-E7B9918A7C47}" type="presParOf" srcId="{1F6E8870-6A82-4850-9F58-899EEC90C675}" destId="{710880D4-317A-4C6F-8C07-422DE5170889}" srcOrd="8" destOrd="0" presId="urn:microsoft.com/office/officeart/2005/8/layout/list1"/>
+    <dgm:cxn modelId="{7C57AABE-315B-4B28-8135-BFC752D5ADB0}" type="presParOf" srcId="{710880D4-317A-4C6F-8C07-422DE5170889}" destId="{C369BA4A-9467-458B-80D5-F89ECC27E0B3}" srcOrd="0" destOrd="0" presId="urn:microsoft.com/office/officeart/2005/8/layout/list1"/>
+    <dgm:cxn modelId="{62181B87-FA38-4732-9AFC-B2C8C4660D24}" type="presParOf" srcId="{710880D4-317A-4C6F-8C07-422DE5170889}" destId="{BA9FDDE1-33CC-4965-BE47-D2FE7B9D0BAB}" srcOrd="1" destOrd="0" presId="urn:microsoft.com/office/officeart/2005/8/layout/list1"/>
+    <dgm:cxn modelId="{02694087-7737-45B2-BE18-F12709ED9CA2}" type="presParOf" srcId="{1F6E8870-6A82-4850-9F58-899EEC90C675}" destId="{3321A187-39C7-4144-8CF0-93DD59AEDF61}" srcOrd="9" destOrd="0" presId="urn:microsoft.com/office/officeart/2005/8/layout/list1"/>
+    <dgm:cxn modelId="{A5B1283C-3E4D-4C3B-9FC7-214C265DCC7D}" type="presParOf" srcId="{1F6E8870-6A82-4850-9F58-899EEC90C675}" destId="{1AEFC7B9-4E17-4373-B889-88C020B8414F}" srcOrd="10" destOrd="0" presId="urn:microsoft.com/office/officeart/2005/8/layout/list1"/>
+    <dgm:cxn modelId="{84DAF74D-2795-409F-996B-318D1202AF54}" type="presParOf" srcId="{1F6E8870-6A82-4850-9F58-899EEC90C675}" destId="{AC46350E-A408-4BAA-9FDE-8F66334969DF}" srcOrd="11" destOrd="0" presId="urn:microsoft.com/office/officeart/2005/8/layout/list1"/>
+    <dgm:cxn modelId="{AFEFE147-066F-4E13-8D18-B696FFDF9241}" type="presParOf" srcId="{1F6E8870-6A82-4850-9F58-899EEC90C675}" destId="{51C6FBD1-F611-4061-ADFC-D2C92E474A3F}" srcOrd="12" destOrd="0" presId="urn:microsoft.com/office/officeart/2005/8/layout/list1"/>
+    <dgm:cxn modelId="{8F68E340-F1DE-4D2D-880D-E427777234FE}" type="presParOf" srcId="{51C6FBD1-F611-4061-ADFC-D2C92E474A3F}" destId="{CB703570-B5CB-4DC4-935C-02C1EB08C4CF}" srcOrd="0" destOrd="0" presId="urn:microsoft.com/office/officeart/2005/8/layout/list1"/>
+    <dgm:cxn modelId="{D853E01C-5AC6-471F-91B5-3A4E5FB36B5F}" type="presParOf" srcId="{51C6FBD1-F611-4061-ADFC-D2C92E474A3F}" destId="{BBC987B7-7DFB-4489-981A-01A4226BD49F}" srcOrd="1" destOrd="0" presId="urn:microsoft.com/office/officeart/2005/8/layout/list1"/>
+    <dgm:cxn modelId="{1A1A22EE-DB92-4133-B11E-2247053F7AFB}" type="presParOf" srcId="{1F6E8870-6A82-4850-9F58-899EEC90C675}" destId="{85A3DB5C-1143-49DB-BF98-CC7ADE23E5A4}" srcOrd="13" destOrd="0" presId="urn:microsoft.com/office/officeart/2005/8/layout/list1"/>
+    <dgm:cxn modelId="{6F35AB6C-D6FA-4581-B479-7B07F96A6D03}" type="presParOf" srcId="{1F6E8870-6A82-4850-9F58-899EEC90C675}" destId="{42C27377-0741-4F65-9B0D-6210A28EEDFB}" srcOrd="14" destOrd="0" presId="urn:microsoft.com/office/officeart/2005/8/layout/list1"/>
+    <dgm:cxn modelId="{D95EBDD4-DA75-4FA7-8C7F-54663D512D0F}" type="presParOf" srcId="{1F6E8870-6A82-4850-9F58-899EEC90C675}" destId="{ADEF1525-9C7F-4CB0-91E1-D206BBDC553C}" srcOrd="15" destOrd="0" presId="urn:microsoft.com/office/officeart/2005/8/layout/list1"/>
+    <dgm:cxn modelId="{908B1F32-E5E3-405D-893A-13E514CDE7EF}" type="presParOf" srcId="{1F6E8870-6A82-4850-9F58-899EEC90C675}" destId="{A35CE42C-3C9E-4BC2-91B8-EC59AC3D26AF}" srcOrd="16" destOrd="0" presId="urn:microsoft.com/office/officeart/2005/8/layout/list1"/>
+    <dgm:cxn modelId="{7FB95369-EDC8-4655-91DF-F213F87F8EE8}" type="presParOf" srcId="{A35CE42C-3C9E-4BC2-91B8-EC59AC3D26AF}" destId="{BD22A25B-4305-4DAF-902E-F858F6CF391D}" srcOrd="0" destOrd="0" presId="urn:microsoft.com/office/officeart/2005/8/layout/list1"/>
+    <dgm:cxn modelId="{797B78CD-ECAD-416B-AE35-7B635CEAE067}" type="presParOf" srcId="{A35CE42C-3C9E-4BC2-91B8-EC59AC3D26AF}" destId="{677A82DF-9EC6-48C3-886F-ABD6798103A4}" srcOrd="1" destOrd="0" presId="urn:microsoft.com/office/officeart/2005/8/layout/list1"/>
+    <dgm:cxn modelId="{8A5C375E-D5AF-484E-8C9F-2C6D82B05959}" type="presParOf" srcId="{1F6E8870-6A82-4850-9F58-899EEC90C675}" destId="{9EABB1F8-DAB8-4662-B9E7-A494E97919D4}" srcOrd="17" destOrd="0" presId="urn:microsoft.com/office/officeart/2005/8/layout/list1"/>
+    <dgm:cxn modelId="{90B10D81-7A0C-42AD-84D8-E3E72C475165}" type="presParOf" srcId="{1F6E8870-6A82-4850-9F58-899EEC90C675}" destId="{2D2F9F65-531D-4DCD-8A6F-711CFA8F88A3}" srcOrd="18" destOrd="0" presId="urn:microsoft.com/office/officeart/2005/8/layout/list1"/>
   </dgm:cxnLst>
   <dgm:bg/>
   <dgm:whole/>
@@ -2246,67 +2137,22 @@
       <dsp:cNvGrpSpPr/>
     </dsp:nvGrpSpPr>
     <dsp:grpSpPr/>
-    <dsp:sp modelId="{269EEAD9-5BED-4318-B334-93D23AA20ABC}">
+    <dsp:sp modelId="{2E222F4D-B4EE-4816-8038-5E24C2DAE4F3}">
       <dsp:nvSpPr>
         <dsp:cNvPr id="0" name=""/>
         <dsp:cNvSpPr/>
       </dsp:nvSpPr>
       <dsp:spPr>
         <a:xfrm>
-          <a:off x="1206" y="1961623"/>
-          <a:ext cx="664317" cy="664317"/>
+          <a:off x="0" y="343477"/>
+          <a:ext cx="2666558" cy="907200"/>
         </a:xfrm>
-        <a:prstGeom prst="chord">
-          <a:avLst>
-            <a:gd name="adj1" fmla="val 4800000"/>
-            <a:gd name="adj2" fmla="val 16800000"/>
-          </a:avLst>
+        <a:prstGeom prst="rect">
+          <a:avLst/>
         </a:prstGeom>
         <a:solidFill>
-          <a:schemeClr val="accent1">
-            <a:tint val="40000"/>
-            <a:hueOff val="0"/>
-            <a:satOff val="0"/>
-            <a:lumOff val="0"/>
-            <a:alphaOff val="0"/>
-          </a:schemeClr>
-        </a:solidFill>
-        <a:ln>
-          <a:noFill/>
-        </a:ln>
-        <a:effectLst/>
-      </dsp:spPr>
-      <dsp:style>
-        <a:lnRef idx="0">
-          <a:scrgbClr r="0" g="0" b="0"/>
-        </a:lnRef>
-        <a:fillRef idx="1">
-          <a:scrgbClr r="0" g="0" b="0"/>
-        </a:fillRef>
-        <a:effectRef idx="0">
-          <a:scrgbClr r="0" g="0" b="0"/>
-        </a:effectRef>
-        <a:fontRef idx="minor"/>
-      </dsp:style>
-    </dsp:sp>
-    <dsp:sp modelId="{FE83F8AF-A8C5-4058-BB5D-EC7CFAED2F50}">
-      <dsp:nvSpPr>
-        <dsp:cNvPr id="0" name=""/>
-        <dsp:cNvSpPr/>
-      </dsp:nvSpPr>
-      <dsp:spPr>
-        <a:xfrm>
-          <a:off x="67638" y="2028054"/>
-          <a:ext cx="531453" cy="531453"/>
-        </a:xfrm>
-        <a:prstGeom prst="pie">
-          <a:avLst>
-            <a:gd name="adj1" fmla="val 14040000"/>
-            <a:gd name="adj2" fmla="val 16200000"/>
-          </a:avLst>
-        </a:prstGeom>
-        <a:solidFill>
-          <a:schemeClr val="accent1">
+          <a:schemeClr val="lt1">
+            <a:alpha val="90000"/>
             <a:hueOff val="0"/>
             <a:satOff val="0"/>
             <a:lumOff val="0"/>
@@ -2337,49 +2183,132 @@
         <a:effectRef idx="0">
           <a:scrgbClr r="0" g="0" b="0"/>
         </a:effectRef>
-        <a:fontRef idx="minor">
-          <a:schemeClr val="lt1"/>
-        </a:fontRef>
+        <a:fontRef idx="minor"/>
       </dsp:style>
+      <dsp:txBody>
+        <a:bodyPr spcFirstLastPara="0" vert="horz" wrap="square" lIns="206955" tIns="249936" rIns="206955" bIns="85344" numCol="1" spcCol="1270" anchor="t" anchorCtr="0">
+          <a:noAutofit/>
+        </a:bodyPr>
+        <a:lstStyle/>
+        <a:p>
+          <a:pPr marL="114300" lvl="1" indent="-114300" algn="l" defTabSz="533400">
+            <a:lnSpc>
+              <a:spcPct val="90000"/>
+            </a:lnSpc>
+            <a:spcBef>
+              <a:spcPct val="0"/>
+            </a:spcBef>
+            <a:spcAft>
+              <a:spcPct val="15000"/>
+            </a:spcAft>
+            <a:buChar char="•"/>
+          </a:pPr>
+          <a:r>
+            <a:rPr lang="nl-NL" sz="1200" kern="1200" dirty="0"/>
+            <a:t>Sensors</a:t>
+          </a:r>
+          <a:endParaRPr lang="en-GB" sz="1200" kern="1200" dirty="0"/>
+        </a:p>
+        <a:p>
+          <a:pPr marL="114300" lvl="1" indent="-114300" algn="l" defTabSz="533400">
+            <a:lnSpc>
+              <a:spcPct val="90000"/>
+            </a:lnSpc>
+            <a:spcBef>
+              <a:spcPct val="0"/>
+            </a:spcBef>
+            <a:spcAft>
+              <a:spcPct val="15000"/>
+            </a:spcAft>
+            <a:buChar char="•"/>
+          </a:pPr>
+          <a:r>
+            <a:rPr lang="nl-NL" sz="1200" kern="1200" dirty="0"/>
+            <a:t>Paramaters</a:t>
+          </a:r>
+          <a:endParaRPr lang="en-GB" sz="1200" kern="1200" dirty="0"/>
+        </a:p>
+        <a:p>
+          <a:pPr marL="114300" lvl="1" indent="-114300" algn="l" defTabSz="533400">
+            <a:lnSpc>
+              <a:spcPct val="90000"/>
+            </a:lnSpc>
+            <a:spcBef>
+              <a:spcPct val="0"/>
+            </a:spcBef>
+            <a:spcAft>
+              <a:spcPct val="15000"/>
+            </a:spcAft>
+            <a:buChar char="•"/>
+          </a:pPr>
+          <a:r>
+            <a:rPr lang="nl-NL" sz="1200" kern="1200" dirty="0"/>
+            <a:t>Information</a:t>
+          </a:r>
+          <a:endParaRPr lang="en-GB" sz="1200" kern="1200" dirty="0"/>
+        </a:p>
+      </dsp:txBody>
+      <dsp:txXfrm>
+        <a:off x="0" y="343477"/>
+        <a:ext cx="2666558" cy="907200"/>
+      </dsp:txXfrm>
     </dsp:sp>
-    <dsp:sp modelId="{2FB46E21-917D-4228-A4E7-8EEF5373EB43}">
+    <dsp:sp modelId="{7CA3CF54-81C9-4EA5-98A1-B689A151ED24}">
       <dsp:nvSpPr>
         <dsp:cNvPr id="0" name=""/>
         <dsp:cNvSpPr/>
       </dsp:nvSpPr>
       <dsp:spPr>
-        <a:xfrm rot="16200000">
-          <a:off x="-762758" y="3456336"/>
-          <a:ext cx="1926519" cy="398590"/>
+        <a:xfrm>
+          <a:off x="133327" y="166357"/>
+          <a:ext cx="1866590" cy="354240"/>
         </a:xfrm>
-        <a:prstGeom prst="rect">
+        <a:prstGeom prst="roundRect">
           <a:avLst/>
         </a:prstGeom>
-        <a:noFill/>
-        <a:ln>
-          <a:noFill/>
+        <a:solidFill>
+          <a:schemeClr val="accent1">
+            <a:hueOff val="0"/>
+            <a:satOff val="0"/>
+            <a:lumOff val="0"/>
+            <a:alphaOff val="0"/>
+          </a:schemeClr>
+        </a:solidFill>
+        <a:ln w="12700" cap="flat" cmpd="sng" algn="ctr">
+          <a:solidFill>
+            <a:schemeClr val="lt1">
+              <a:hueOff val="0"/>
+              <a:satOff val="0"/>
+              <a:lumOff val="0"/>
+              <a:alphaOff val="0"/>
+            </a:schemeClr>
+          </a:solidFill>
+          <a:prstDash val="solid"/>
+          <a:miter lim="800000"/>
         </a:ln>
         <a:effectLst/>
       </dsp:spPr>
       <dsp:style>
-        <a:lnRef idx="0">
+        <a:lnRef idx="2">
           <a:scrgbClr r="0" g="0" b="0"/>
         </a:lnRef>
-        <a:fillRef idx="0">
+        <a:fillRef idx="1">
           <a:scrgbClr r="0" g="0" b="0"/>
         </a:fillRef>
         <a:effectRef idx="0">
           <a:scrgbClr r="0" g="0" b="0"/>
         </a:effectRef>
-        <a:fontRef idx="minor"/>
+        <a:fontRef idx="minor">
+          <a:schemeClr val="lt1"/>
+        </a:fontRef>
       </dsp:style>
       <dsp:txBody>
-        <a:bodyPr spcFirstLastPara="0" vert="horz" wrap="square" lIns="0" tIns="0" rIns="0" bIns="0" numCol="1" spcCol="1270" anchor="b" anchorCtr="0">
+        <a:bodyPr spcFirstLastPara="0" vert="horz" wrap="square" lIns="70553" tIns="0" rIns="70553" bIns="0" numCol="1" spcCol="1270" anchor="ctr" anchorCtr="0">
           <a:noAutofit/>
         </a:bodyPr>
         <a:lstStyle/>
         <a:p>
-          <a:pPr marL="0" lvl="0" indent="0" algn="r" defTabSz="800100">
+          <a:pPr marL="0" lvl="0" indent="0" algn="l" defTabSz="533400">
             <a:lnSpc>
               <a:spcPct val="90000"/>
             </a:lnSpc>
@@ -2392,181 +2321,41 @@
             <a:buNone/>
           </a:pPr>
           <a:r>
-            <a:rPr lang="nl-NL" sz="1800" kern="1200" dirty="0" err="1"/>
-            <a:t>Mental</a:t>
+            <a:rPr lang="nl-NL" sz="1200" kern="1200" noProof="0"/>
+            <a:t>M</a:t>
           </a:r>
           <a:r>
-            <a:rPr lang="nl-NL" sz="1800" kern="1200" dirty="0"/>
+            <a:rPr lang="nl-NL" sz="1200" kern="1200"/>
+            <a:t>ental</a:t>
+          </a:r>
+          <a:r>
+            <a:rPr lang="nl-NL" sz="1200" kern="1200" dirty="0"/>
             <a:t> model</a:t>
           </a:r>
-          <a:endParaRPr lang="en-GB" sz="1800" kern="1200" dirty="0"/>
+          <a:endParaRPr lang="en-GB" sz="1200" kern="1200" dirty="0"/>
         </a:p>
       </dsp:txBody>
       <dsp:txXfrm>
-        <a:off x="-762758" y="3456336"/>
-        <a:ext cx="1926519" cy="398590"/>
+        <a:off x="150620" y="183650"/>
+        <a:ext cx="1832004" cy="319654"/>
       </dsp:txXfrm>
     </dsp:sp>
-    <dsp:sp modelId="{F7ADC11F-B29E-425E-97FE-1D18B82E97C8}">
+    <dsp:sp modelId="{1D7E373B-62EE-4097-8383-EA46023FB4BF}">
       <dsp:nvSpPr>
         <dsp:cNvPr id="0" name=""/>
         <dsp:cNvSpPr/>
       </dsp:nvSpPr>
       <dsp:spPr>
         <a:xfrm>
-          <a:off x="466228" y="1961623"/>
-          <a:ext cx="1328634" cy="2657268"/>
+          <a:off x="0" y="1492597"/>
+          <a:ext cx="2666558" cy="699300"/>
         </a:xfrm>
         <a:prstGeom prst="rect">
           <a:avLst/>
         </a:prstGeom>
-        <a:noFill/>
-        <a:ln>
-          <a:noFill/>
-        </a:ln>
-        <a:effectLst/>
-      </dsp:spPr>
-      <dsp:style>
-        <a:lnRef idx="0">
-          <a:scrgbClr r="0" g="0" b="0"/>
-        </a:lnRef>
-        <a:fillRef idx="0">
-          <a:scrgbClr r="0" g="0" b="0"/>
-        </a:fillRef>
-        <a:effectRef idx="0">
-          <a:scrgbClr r="0" g="0" b="0"/>
-        </a:effectRef>
-        <a:fontRef idx="minor"/>
-      </dsp:style>
-      <dsp:txBody>
-        <a:bodyPr spcFirstLastPara="0" vert="horz" wrap="square" lIns="0" tIns="0" rIns="0" bIns="0" numCol="1" spcCol="1270" anchor="t" anchorCtr="0">
-          <a:noAutofit/>
-        </a:bodyPr>
-        <a:lstStyle/>
-        <a:p>
-          <a:pPr marL="0" lvl="0" indent="0" algn="l" defTabSz="755650">
-            <a:lnSpc>
-              <a:spcPct val="90000"/>
-            </a:lnSpc>
-            <a:spcBef>
-              <a:spcPct val="0"/>
-            </a:spcBef>
-            <a:spcAft>
-              <a:spcPct val="35000"/>
-            </a:spcAft>
-            <a:buNone/>
-          </a:pPr>
-          <a:r>
-            <a:rPr lang="nl-NL" sz="1700" kern="1200" dirty="0"/>
-            <a:t>Sensors</a:t>
-          </a:r>
-          <a:endParaRPr lang="en-GB" sz="1700" kern="1200" dirty="0"/>
-        </a:p>
-        <a:p>
-          <a:pPr marL="0" lvl="0" indent="0" algn="l" defTabSz="755650">
-            <a:lnSpc>
-              <a:spcPct val="90000"/>
-            </a:lnSpc>
-            <a:spcBef>
-              <a:spcPct val="0"/>
-            </a:spcBef>
-            <a:spcAft>
-              <a:spcPct val="35000"/>
-            </a:spcAft>
-            <a:buNone/>
-          </a:pPr>
-          <a:r>
-            <a:rPr lang="nl-NL" sz="1700" kern="1200" dirty="0"/>
-            <a:t>Paramaters</a:t>
-          </a:r>
-          <a:endParaRPr lang="en-GB" sz="1700" kern="1200" dirty="0"/>
-        </a:p>
-        <a:p>
-          <a:pPr marL="0" lvl="0" indent="0" algn="l" defTabSz="755650">
-            <a:lnSpc>
-              <a:spcPct val="90000"/>
-            </a:lnSpc>
-            <a:spcBef>
-              <a:spcPct val="0"/>
-            </a:spcBef>
-            <a:spcAft>
-              <a:spcPct val="35000"/>
-            </a:spcAft>
-            <a:buNone/>
-          </a:pPr>
-          <a:r>
-            <a:rPr lang="nl-NL" sz="1700" kern="1200" dirty="0"/>
-            <a:t>Information</a:t>
-          </a:r>
-          <a:endParaRPr lang="en-GB" sz="1700" kern="1200" dirty="0"/>
-        </a:p>
-      </dsp:txBody>
-      <dsp:txXfrm>
-        <a:off x="466228" y="1961623"/>
-        <a:ext cx="1328634" cy="2657268"/>
-      </dsp:txXfrm>
-    </dsp:sp>
-    <dsp:sp modelId="{D7D5BD64-771B-406F-9F77-C588574FD50F}">
-      <dsp:nvSpPr>
-        <dsp:cNvPr id="0" name=""/>
-        <dsp:cNvSpPr/>
-      </dsp:nvSpPr>
-      <dsp:spPr>
-        <a:xfrm>
-          <a:off x="1960164" y="1961623"/>
-          <a:ext cx="664317" cy="664317"/>
-        </a:xfrm>
-        <a:prstGeom prst="chord">
-          <a:avLst>
-            <a:gd name="adj1" fmla="val 4800000"/>
-            <a:gd name="adj2" fmla="val 16800000"/>
-          </a:avLst>
-        </a:prstGeom>
         <a:solidFill>
-          <a:schemeClr val="accent1">
-            <a:tint val="40000"/>
-            <a:hueOff val="0"/>
-            <a:satOff val="0"/>
-            <a:lumOff val="0"/>
-            <a:alphaOff val="0"/>
-          </a:schemeClr>
-        </a:solidFill>
-        <a:ln>
-          <a:noFill/>
-        </a:ln>
-        <a:effectLst/>
-      </dsp:spPr>
-      <dsp:style>
-        <a:lnRef idx="0">
-          <a:scrgbClr r="0" g="0" b="0"/>
-        </a:lnRef>
-        <a:fillRef idx="1">
-          <a:scrgbClr r="0" g="0" b="0"/>
-        </a:fillRef>
-        <a:effectRef idx="0">
-          <a:scrgbClr r="0" g="0" b="0"/>
-        </a:effectRef>
-        <a:fontRef idx="minor"/>
-      </dsp:style>
-    </dsp:sp>
-    <dsp:sp modelId="{54EEA023-20EF-46C0-995C-83ECC8E51C4B}">
-      <dsp:nvSpPr>
-        <dsp:cNvPr id="0" name=""/>
-        <dsp:cNvSpPr/>
-      </dsp:nvSpPr>
-      <dsp:spPr>
-        <a:xfrm>
-          <a:off x="2026595" y="2028054"/>
-          <a:ext cx="531453" cy="531453"/>
-        </a:xfrm>
-        <a:prstGeom prst="pie">
-          <a:avLst>
-            <a:gd name="adj1" fmla="val 11880000"/>
-            <a:gd name="adj2" fmla="val 16200000"/>
-          </a:avLst>
-        </a:prstGeom>
-        <a:solidFill>
-          <a:schemeClr val="accent1">
+          <a:schemeClr val="lt1">
+            <a:alpha val="90000"/>
             <a:hueOff val="0"/>
             <a:satOff val="0"/>
             <a:lumOff val="0"/>
@@ -2597,49 +2386,121 @@
         <a:effectRef idx="0">
           <a:scrgbClr r="0" g="0" b="0"/>
         </a:effectRef>
-        <a:fontRef idx="minor">
-          <a:schemeClr val="lt1"/>
-        </a:fontRef>
+        <a:fontRef idx="minor"/>
       </dsp:style>
+      <dsp:txBody>
+        <a:bodyPr spcFirstLastPara="0" vert="horz" wrap="square" lIns="206955" tIns="249936" rIns="206955" bIns="85344" numCol="1" spcCol="1270" anchor="t" anchorCtr="0">
+          <a:noAutofit/>
+        </a:bodyPr>
+        <a:lstStyle/>
+        <a:p>
+          <a:pPr marL="114300" lvl="1" indent="-114300" algn="l" defTabSz="533400">
+            <a:lnSpc>
+              <a:spcPct val="90000"/>
+            </a:lnSpc>
+            <a:spcBef>
+              <a:spcPct val="0"/>
+            </a:spcBef>
+            <a:spcAft>
+              <a:spcPct val="15000"/>
+            </a:spcAft>
+            <a:buChar char="•"/>
+          </a:pPr>
+          <a:r>
+            <a:rPr lang="nl-NL" sz="1200" kern="1200" dirty="0" err="1"/>
+            <a:t>Static</a:t>
+          </a:r>
+          <a:r>
+            <a:rPr lang="nl-NL" sz="1200" kern="1200" dirty="0"/>
+            <a:t> hazards</a:t>
+          </a:r>
+          <a:endParaRPr lang="en-GB" sz="1200" kern="1200" dirty="0"/>
+        </a:p>
+        <a:p>
+          <a:pPr marL="114300" lvl="1" indent="-114300" algn="l" defTabSz="533400">
+            <a:lnSpc>
+              <a:spcPct val="90000"/>
+            </a:lnSpc>
+            <a:spcBef>
+              <a:spcPct val="0"/>
+            </a:spcBef>
+            <a:spcAft>
+              <a:spcPct val="15000"/>
+            </a:spcAft>
+            <a:buChar char="•"/>
+          </a:pPr>
+          <a:r>
+            <a:rPr lang="nl-NL" sz="1200" kern="1200" dirty="0"/>
+            <a:t>Relevant </a:t>
+          </a:r>
+          <a:r>
+            <a:rPr lang="nl-NL" sz="1200" kern="1200" dirty="0" err="1"/>
+            <a:t>objects</a:t>
+          </a:r>
+          <a:endParaRPr lang="en-GB" sz="1200" kern="1200" dirty="0"/>
+        </a:p>
+      </dsp:txBody>
+      <dsp:txXfrm>
+        <a:off x="0" y="1492597"/>
+        <a:ext cx="2666558" cy="699300"/>
+      </dsp:txXfrm>
     </dsp:sp>
-    <dsp:sp modelId="{A4F5433F-A0F8-4143-8D05-4194FA38DDD5}">
+    <dsp:sp modelId="{E90CCC8F-8562-4556-B9B4-458A0E383B1C}">
       <dsp:nvSpPr>
         <dsp:cNvPr id="0" name=""/>
         <dsp:cNvSpPr/>
       </dsp:nvSpPr>
       <dsp:spPr>
-        <a:xfrm rot="16200000">
-          <a:off x="1196199" y="3456336"/>
-          <a:ext cx="1926519" cy="398590"/>
+        <a:xfrm>
+          <a:off x="133327" y="1315477"/>
+          <a:ext cx="1866590" cy="354240"/>
         </a:xfrm>
-        <a:prstGeom prst="rect">
+        <a:prstGeom prst="roundRect">
           <a:avLst/>
         </a:prstGeom>
-        <a:noFill/>
-        <a:ln>
-          <a:noFill/>
+        <a:solidFill>
+          <a:schemeClr val="accent1">
+            <a:hueOff val="0"/>
+            <a:satOff val="0"/>
+            <a:lumOff val="0"/>
+            <a:alphaOff val="0"/>
+          </a:schemeClr>
+        </a:solidFill>
+        <a:ln w="12700" cap="flat" cmpd="sng" algn="ctr">
+          <a:solidFill>
+            <a:schemeClr val="lt1">
+              <a:hueOff val="0"/>
+              <a:satOff val="0"/>
+              <a:lumOff val="0"/>
+              <a:alphaOff val="0"/>
+            </a:schemeClr>
+          </a:solidFill>
+          <a:prstDash val="solid"/>
+          <a:miter lim="800000"/>
         </a:ln>
         <a:effectLst/>
       </dsp:spPr>
       <dsp:style>
-        <a:lnRef idx="0">
+        <a:lnRef idx="2">
           <a:scrgbClr r="0" g="0" b="0"/>
         </a:lnRef>
-        <a:fillRef idx="0">
+        <a:fillRef idx="1">
           <a:scrgbClr r="0" g="0" b="0"/>
         </a:fillRef>
         <a:effectRef idx="0">
           <a:scrgbClr r="0" g="0" b="0"/>
         </a:effectRef>
-        <a:fontRef idx="minor"/>
+        <a:fontRef idx="minor">
+          <a:schemeClr val="lt1"/>
+        </a:fontRef>
       </dsp:style>
       <dsp:txBody>
-        <a:bodyPr spcFirstLastPara="0" vert="horz" wrap="square" lIns="0" tIns="0" rIns="0" bIns="0" numCol="1" spcCol="1270" anchor="b" anchorCtr="0">
+        <a:bodyPr spcFirstLastPara="0" vert="horz" wrap="square" lIns="70553" tIns="0" rIns="70553" bIns="0" numCol="1" spcCol="1270" anchor="ctr" anchorCtr="0">
           <a:noAutofit/>
         </a:bodyPr>
         <a:lstStyle/>
         <a:p>
-          <a:pPr marL="0" lvl="0" indent="0" algn="r" defTabSz="800100">
+          <a:pPr marL="0" lvl="0" indent="0" algn="l" defTabSz="533400">
             <a:lnSpc>
               <a:spcPct val="90000"/>
             </a:lnSpc>
@@ -2652,170 +2513,41 @@
             <a:buNone/>
           </a:pPr>
           <a:r>
-            <a:rPr lang="nl-NL" sz="1800" kern="1200" dirty="0"/>
-            <a:t>Map of </a:t>
+            <a:rPr lang="nl-NL" sz="1200" kern="1200" dirty="0" err="1"/>
+            <a:t>Identify</a:t>
           </a:r>
           <a:r>
-            <a:rPr lang="nl-NL" sz="1800" kern="1200" dirty="0" err="1"/>
+            <a:rPr lang="nl-NL" sz="1200" kern="1200" dirty="0"/>
+            <a:t> </a:t>
+          </a:r>
+          <a:r>
+            <a:rPr lang="nl-NL" sz="1200" kern="1200" dirty="0" err="1"/>
             <a:t>situation</a:t>
           </a:r>
-          <a:endParaRPr lang="en-GB" sz="1800" kern="1200" dirty="0"/>
+          <a:endParaRPr lang="en-GB" sz="1200" kern="1200" dirty="0"/>
         </a:p>
       </dsp:txBody>
       <dsp:txXfrm>
-        <a:off x="1196199" y="3456336"/>
-        <a:ext cx="1926519" cy="398590"/>
+        <a:off x="150620" y="1332770"/>
+        <a:ext cx="1832004" cy="319654"/>
       </dsp:txXfrm>
     </dsp:sp>
-    <dsp:sp modelId="{2846E483-72DC-45FA-90A6-7588E8C4BB2F}">
+    <dsp:sp modelId="{1AEFC7B9-4E17-4373-B889-88C020B8414F}">
       <dsp:nvSpPr>
         <dsp:cNvPr id="0" name=""/>
         <dsp:cNvSpPr/>
       </dsp:nvSpPr>
       <dsp:spPr>
         <a:xfrm>
-          <a:off x="2425186" y="1961623"/>
-          <a:ext cx="1328634" cy="2657268"/>
+          <a:off x="0" y="2433817"/>
+          <a:ext cx="2666558" cy="699300"/>
         </a:xfrm>
         <a:prstGeom prst="rect">
           <a:avLst/>
         </a:prstGeom>
-        <a:noFill/>
-        <a:ln>
-          <a:noFill/>
-        </a:ln>
-        <a:effectLst/>
-      </dsp:spPr>
-      <dsp:style>
-        <a:lnRef idx="0">
-          <a:scrgbClr r="0" g="0" b="0"/>
-        </a:lnRef>
-        <a:fillRef idx="0">
-          <a:scrgbClr r="0" g="0" b="0"/>
-        </a:fillRef>
-        <a:effectRef idx="0">
-          <a:scrgbClr r="0" g="0" b="0"/>
-        </a:effectRef>
-        <a:fontRef idx="minor"/>
-      </dsp:style>
-      <dsp:txBody>
-        <a:bodyPr spcFirstLastPara="0" vert="horz" wrap="square" lIns="0" tIns="0" rIns="0" bIns="0" numCol="1" spcCol="1270" anchor="t" anchorCtr="0">
-          <a:noAutofit/>
-        </a:bodyPr>
-        <a:lstStyle/>
-        <a:p>
-          <a:pPr marL="0" lvl="0" indent="0" algn="l" defTabSz="755650">
-            <a:lnSpc>
-              <a:spcPct val="90000"/>
-            </a:lnSpc>
-            <a:spcBef>
-              <a:spcPct val="0"/>
-            </a:spcBef>
-            <a:spcAft>
-              <a:spcPct val="35000"/>
-            </a:spcAft>
-            <a:buNone/>
-          </a:pPr>
-          <a:r>
-            <a:rPr lang="nl-NL" sz="1700" kern="1200" dirty="0" err="1"/>
-            <a:t>Static</a:t>
-          </a:r>
-          <a:r>
-            <a:rPr lang="nl-NL" sz="1700" kern="1200" dirty="0"/>
-            <a:t> hazards</a:t>
-          </a:r>
-          <a:endParaRPr lang="en-GB" sz="1700" kern="1200" dirty="0"/>
-        </a:p>
-        <a:p>
-          <a:pPr marL="0" lvl="0" indent="0" algn="l" defTabSz="755650">
-            <a:lnSpc>
-              <a:spcPct val="90000"/>
-            </a:lnSpc>
-            <a:spcBef>
-              <a:spcPct val="0"/>
-            </a:spcBef>
-            <a:spcAft>
-              <a:spcPct val="35000"/>
-            </a:spcAft>
-            <a:buNone/>
-          </a:pPr>
-          <a:r>
-            <a:rPr lang="nl-NL" sz="1700" kern="1200" dirty="0"/>
-            <a:t>Relevant </a:t>
-          </a:r>
-          <a:r>
-            <a:rPr lang="nl-NL" sz="1700" kern="1200" dirty="0" err="1"/>
-            <a:t>objects</a:t>
-          </a:r>
-          <a:endParaRPr lang="en-GB" sz="1700" kern="1200" dirty="0"/>
-        </a:p>
-      </dsp:txBody>
-      <dsp:txXfrm>
-        <a:off x="2425186" y="1961623"/>
-        <a:ext cx="1328634" cy="2657268"/>
-      </dsp:txXfrm>
-    </dsp:sp>
-    <dsp:sp modelId="{A76C61C1-6AFA-4D5D-BEDC-075B51D104C1}">
-      <dsp:nvSpPr>
-        <dsp:cNvPr id="0" name=""/>
-        <dsp:cNvSpPr/>
-      </dsp:nvSpPr>
-      <dsp:spPr>
-        <a:xfrm>
-          <a:off x="3919121" y="1961623"/>
-          <a:ext cx="664317" cy="664317"/>
-        </a:xfrm>
-        <a:prstGeom prst="chord">
-          <a:avLst>
-            <a:gd name="adj1" fmla="val 4800000"/>
-            <a:gd name="adj2" fmla="val 16800000"/>
-          </a:avLst>
-        </a:prstGeom>
         <a:solidFill>
-          <a:schemeClr val="accent1">
-            <a:tint val="40000"/>
-            <a:hueOff val="0"/>
-            <a:satOff val="0"/>
-            <a:lumOff val="0"/>
-            <a:alphaOff val="0"/>
-          </a:schemeClr>
-        </a:solidFill>
-        <a:ln>
-          <a:noFill/>
-        </a:ln>
-        <a:effectLst/>
-      </dsp:spPr>
-      <dsp:style>
-        <a:lnRef idx="0">
-          <a:scrgbClr r="0" g="0" b="0"/>
-        </a:lnRef>
-        <a:fillRef idx="1">
-          <a:scrgbClr r="0" g="0" b="0"/>
-        </a:fillRef>
-        <a:effectRef idx="0">
-          <a:scrgbClr r="0" g="0" b="0"/>
-        </a:effectRef>
-        <a:fontRef idx="minor"/>
-      </dsp:style>
-    </dsp:sp>
-    <dsp:sp modelId="{85CF1AC6-E8FD-45AA-B447-A983A2C8647A}">
-      <dsp:nvSpPr>
-        <dsp:cNvPr id="0" name=""/>
-        <dsp:cNvSpPr/>
-      </dsp:nvSpPr>
-      <dsp:spPr>
-        <a:xfrm>
-          <a:off x="3985553" y="2028054"/>
-          <a:ext cx="531453" cy="531453"/>
-        </a:xfrm>
-        <a:prstGeom prst="pie">
-          <a:avLst>
-            <a:gd name="adj1" fmla="val 9720000"/>
-            <a:gd name="adj2" fmla="val 16200000"/>
-          </a:avLst>
-        </a:prstGeom>
-        <a:solidFill>
-          <a:schemeClr val="accent1">
+          <a:schemeClr val="lt1">
+            <a:alpha val="90000"/>
             <a:hueOff val="0"/>
             <a:satOff val="0"/>
             <a:lumOff val="0"/>
@@ -2846,49 +2578,125 @@
         <a:effectRef idx="0">
           <a:scrgbClr r="0" g="0" b="0"/>
         </a:effectRef>
-        <a:fontRef idx="minor">
-          <a:schemeClr val="lt1"/>
-        </a:fontRef>
+        <a:fontRef idx="minor"/>
       </dsp:style>
+      <dsp:txBody>
+        <a:bodyPr spcFirstLastPara="0" vert="horz" wrap="square" lIns="206955" tIns="249936" rIns="206955" bIns="85344" numCol="1" spcCol="1270" anchor="t" anchorCtr="0">
+          <a:noAutofit/>
+        </a:bodyPr>
+        <a:lstStyle/>
+        <a:p>
+          <a:pPr marL="114300" lvl="1" indent="-114300" algn="l" defTabSz="533400">
+            <a:lnSpc>
+              <a:spcPct val="90000"/>
+            </a:lnSpc>
+            <a:spcBef>
+              <a:spcPct val="0"/>
+            </a:spcBef>
+            <a:spcAft>
+              <a:spcPct val="15000"/>
+            </a:spcAft>
+            <a:buChar char="•"/>
+          </a:pPr>
+          <a:r>
+            <a:rPr lang="nl-NL" sz="1200" kern="1200" dirty="0" err="1"/>
+            <a:t>Dynamic</a:t>
+          </a:r>
+          <a:r>
+            <a:rPr lang="nl-NL" sz="1200" kern="1200" dirty="0"/>
+            <a:t> hazards</a:t>
+          </a:r>
+          <a:endParaRPr lang="en-GB" sz="1200" kern="1200" dirty="0"/>
+        </a:p>
+        <a:p>
+          <a:pPr marL="114300" lvl="1" indent="-114300" algn="l" defTabSz="533400">
+            <a:lnSpc>
+              <a:spcPct val="90000"/>
+            </a:lnSpc>
+            <a:spcBef>
+              <a:spcPct val="0"/>
+            </a:spcBef>
+            <a:spcAft>
+              <a:spcPct val="15000"/>
+            </a:spcAft>
+            <a:buChar char="•"/>
+          </a:pPr>
+          <a:r>
+            <a:rPr lang="nl-NL" sz="1200" kern="1200" dirty="0" err="1"/>
+            <a:t>Own</a:t>
+          </a:r>
+          <a:r>
+            <a:rPr lang="nl-NL" sz="1200" kern="1200" dirty="0"/>
+            <a:t> </a:t>
+          </a:r>
+          <a:r>
+            <a:rPr lang="nl-NL" sz="1200" kern="1200" dirty="0" err="1"/>
+            <a:t>manouvrability</a:t>
+          </a:r>
+          <a:endParaRPr lang="en-GB" sz="1200" kern="1200" dirty="0"/>
+        </a:p>
+      </dsp:txBody>
+      <dsp:txXfrm>
+        <a:off x="0" y="2433817"/>
+        <a:ext cx="2666558" cy="699300"/>
+      </dsp:txXfrm>
     </dsp:sp>
-    <dsp:sp modelId="{EFDFD436-3138-46CE-8FA8-756F4FCA80A2}">
+    <dsp:sp modelId="{BA9FDDE1-33CC-4965-BE47-D2FE7B9D0BAB}">
       <dsp:nvSpPr>
         <dsp:cNvPr id="0" name=""/>
         <dsp:cNvSpPr/>
       </dsp:nvSpPr>
       <dsp:spPr>
-        <a:xfrm rot="16200000">
-          <a:off x="3155157" y="3456336"/>
-          <a:ext cx="1926519" cy="398590"/>
+        <a:xfrm>
+          <a:off x="133327" y="2256697"/>
+          <a:ext cx="1866590" cy="354240"/>
         </a:xfrm>
-        <a:prstGeom prst="rect">
+        <a:prstGeom prst="roundRect">
           <a:avLst/>
         </a:prstGeom>
-        <a:noFill/>
-        <a:ln>
-          <a:noFill/>
+        <a:solidFill>
+          <a:schemeClr val="accent1">
+            <a:hueOff val="0"/>
+            <a:satOff val="0"/>
+            <a:lumOff val="0"/>
+            <a:alphaOff val="0"/>
+          </a:schemeClr>
+        </a:solidFill>
+        <a:ln w="12700" cap="flat" cmpd="sng" algn="ctr">
+          <a:solidFill>
+            <a:schemeClr val="lt1">
+              <a:hueOff val="0"/>
+              <a:satOff val="0"/>
+              <a:lumOff val="0"/>
+              <a:alphaOff val="0"/>
+            </a:schemeClr>
+          </a:solidFill>
+          <a:prstDash val="solid"/>
+          <a:miter lim="800000"/>
         </a:ln>
         <a:effectLst/>
       </dsp:spPr>
       <dsp:style>
-        <a:lnRef idx="0">
+        <a:lnRef idx="2">
           <a:scrgbClr r="0" g="0" b="0"/>
         </a:lnRef>
-        <a:fillRef idx="0">
+        <a:fillRef idx="1">
           <a:scrgbClr r="0" g="0" b="0"/>
         </a:fillRef>
         <a:effectRef idx="0">
           <a:scrgbClr r="0" g="0" b="0"/>
         </a:effectRef>
-        <a:fontRef idx="minor"/>
+        <a:fontRef idx="minor">
+          <a:schemeClr val="lt1"/>
+        </a:fontRef>
       </dsp:style>
       <dsp:txBody>
-        <a:bodyPr spcFirstLastPara="0" vert="horz" wrap="square" lIns="0" tIns="0" rIns="0" bIns="0" numCol="1" spcCol="1270" anchor="b" anchorCtr="0">
+        <a:bodyPr spcFirstLastPara="0" vert="horz" wrap="square" lIns="70553" tIns="0" rIns="70553" bIns="0" numCol="1" spcCol="1270" anchor="ctr" anchorCtr="0">
           <a:noAutofit/>
         </a:bodyPr>
         <a:lstStyle/>
         <a:p>
-          <a:pPr marL="0" lvl="0" indent="0" algn="r" defTabSz="800100">
+          <a:pPr marL="0" lvl="0" indent="0" algn="l" defTabSz="533400">
             <a:lnSpc>
               <a:spcPct val="90000"/>
             </a:lnSpc>
@@ -2901,221 +2709,49 @@
             <a:buNone/>
           </a:pPr>
           <a:r>
-            <a:rPr lang="nl-NL" sz="1800" kern="1200" dirty="0" err="1"/>
+            <a:rPr lang="nl-NL" sz="1200" kern="1200" dirty="0" err="1"/>
             <a:t>Predict</a:t>
           </a:r>
           <a:r>
-            <a:rPr lang="nl-NL" sz="1800" kern="1200" dirty="0"/>
+            <a:rPr lang="nl-NL" sz="1200" kern="1200" dirty="0"/>
             <a:t> </a:t>
           </a:r>
           <a:r>
-            <a:rPr lang="nl-NL" sz="1800" kern="1200" dirty="0" err="1"/>
+            <a:rPr lang="nl-NL" sz="1200" kern="1200" dirty="0" err="1"/>
             <a:t>future</a:t>
           </a:r>
           <a:r>
-            <a:rPr lang="nl-NL" sz="1800" kern="1200" dirty="0"/>
+            <a:rPr lang="nl-NL" sz="1200" kern="1200" dirty="0"/>
             <a:t> </a:t>
           </a:r>
           <a:r>
-            <a:rPr lang="nl-NL" sz="1800" kern="1200" dirty="0" err="1"/>
+            <a:rPr lang="nl-NL" sz="1200" kern="1200" dirty="0" err="1"/>
             <a:t>states</a:t>
           </a:r>
-          <a:endParaRPr lang="en-GB" sz="1800" kern="1200" dirty="0"/>
+          <a:endParaRPr lang="en-GB" sz="1200" kern="1200" dirty="0"/>
         </a:p>
       </dsp:txBody>
       <dsp:txXfrm>
-        <a:off x="3155157" y="3456336"/>
-        <a:ext cx="1926519" cy="398590"/>
+        <a:off x="150620" y="2273990"/>
+        <a:ext cx="1832004" cy="319654"/>
       </dsp:txXfrm>
     </dsp:sp>
-    <dsp:sp modelId="{B49A5AC8-DC03-4E01-9F78-3C6AEC1AE3BD}">
+    <dsp:sp modelId="{42C27377-0741-4F65-9B0D-6210A28EEDFB}">
       <dsp:nvSpPr>
         <dsp:cNvPr id="0" name=""/>
         <dsp:cNvSpPr/>
       </dsp:nvSpPr>
       <dsp:spPr>
         <a:xfrm>
-          <a:off x="4384143" y="1961623"/>
-          <a:ext cx="1328634" cy="2657268"/>
+          <a:off x="0" y="3375037"/>
+          <a:ext cx="2666558" cy="1701000"/>
         </a:xfrm>
         <a:prstGeom prst="rect">
           <a:avLst/>
         </a:prstGeom>
-        <a:noFill/>
-        <a:ln>
-          <a:noFill/>
-        </a:ln>
-        <a:effectLst/>
-      </dsp:spPr>
-      <dsp:style>
-        <a:lnRef idx="0">
-          <a:scrgbClr r="0" g="0" b="0"/>
-        </a:lnRef>
-        <a:fillRef idx="0">
-          <a:scrgbClr r="0" g="0" b="0"/>
-        </a:fillRef>
-        <a:effectRef idx="0">
-          <a:scrgbClr r="0" g="0" b="0"/>
-        </a:effectRef>
-        <a:fontRef idx="minor"/>
-      </dsp:style>
-      <dsp:txBody>
-        <a:bodyPr spcFirstLastPara="0" vert="horz" wrap="square" lIns="0" tIns="0" rIns="0" bIns="0" numCol="1" spcCol="1270" anchor="t" anchorCtr="0">
-          <a:noAutofit/>
-        </a:bodyPr>
-        <a:lstStyle/>
-        <a:p>
-          <a:pPr marL="0" lvl="0" indent="0" algn="l" defTabSz="755650">
-            <a:lnSpc>
-              <a:spcPct val="90000"/>
-            </a:lnSpc>
-            <a:spcBef>
-              <a:spcPct val="0"/>
-            </a:spcBef>
-            <a:spcAft>
-              <a:spcPct val="35000"/>
-            </a:spcAft>
-            <a:buNone/>
-          </a:pPr>
-          <a:r>
-            <a:rPr lang="nl-NL" sz="1700" kern="1200" dirty="0" err="1"/>
-            <a:t>Dynamic</a:t>
-          </a:r>
-          <a:r>
-            <a:rPr lang="nl-NL" sz="1700" kern="1200" dirty="0"/>
-            <a:t> hazards</a:t>
-          </a:r>
-          <a:endParaRPr lang="en-GB" sz="1700" kern="1200" dirty="0"/>
-        </a:p>
-        <a:p>
-          <a:pPr marL="0" lvl="0" indent="0" algn="l" defTabSz="755650">
-            <a:lnSpc>
-              <a:spcPct val="90000"/>
-            </a:lnSpc>
-            <a:spcBef>
-              <a:spcPct val="0"/>
-            </a:spcBef>
-            <a:spcAft>
-              <a:spcPct val="35000"/>
-            </a:spcAft>
-            <a:buNone/>
-          </a:pPr>
-          <a:r>
-            <a:rPr lang="nl-NL" sz="1700" kern="1200" dirty="0" err="1"/>
-            <a:t>Own</a:t>
-          </a:r>
-          <a:r>
-            <a:rPr lang="nl-NL" sz="1700" kern="1200" dirty="0"/>
-            <a:t> </a:t>
-          </a:r>
-          <a:r>
-            <a:rPr lang="nl-NL" sz="1700" kern="1200" dirty="0" err="1"/>
-            <a:t>manouvrability</a:t>
-          </a:r>
-          <a:endParaRPr lang="en-GB" sz="1700" kern="1200" dirty="0"/>
-        </a:p>
-        <a:p>
-          <a:pPr marL="0" lvl="0" indent="0" algn="l" defTabSz="755650">
-            <a:lnSpc>
-              <a:spcPct val="90000"/>
-            </a:lnSpc>
-            <a:spcBef>
-              <a:spcPct val="0"/>
-            </a:spcBef>
-            <a:spcAft>
-              <a:spcPct val="35000"/>
-            </a:spcAft>
-            <a:buNone/>
-          </a:pPr>
-          <a:r>
-            <a:rPr lang="nl-NL" sz="1700" kern="1200" dirty="0" err="1"/>
-            <a:t>Communicate</a:t>
-          </a:r>
-          <a:r>
-            <a:rPr lang="nl-NL" sz="1700" kern="1200" dirty="0"/>
-            <a:t> </a:t>
-          </a:r>
-          <a:r>
-            <a:rPr lang="nl-NL" sz="1700" kern="1200" dirty="0" err="1"/>
-            <a:t>when</a:t>
-          </a:r>
-          <a:r>
-            <a:rPr lang="nl-NL" sz="1700" kern="1200" dirty="0"/>
-            <a:t> </a:t>
-          </a:r>
-          <a:r>
-            <a:rPr lang="nl-NL" sz="1700" kern="1200" dirty="0" err="1"/>
-            <a:t>unsuccesfull</a:t>
-          </a:r>
-          <a:endParaRPr lang="en-GB" sz="1700" kern="1200" dirty="0"/>
-        </a:p>
-      </dsp:txBody>
-      <dsp:txXfrm>
-        <a:off x="4384143" y="1961623"/>
-        <a:ext cx="1328634" cy="2657268"/>
-      </dsp:txXfrm>
-    </dsp:sp>
-    <dsp:sp modelId="{37EEA1A5-B486-4DFA-9FC0-D442431F571A}">
-      <dsp:nvSpPr>
-        <dsp:cNvPr id="0" name=""/>
-        <dsp:cNvSpPr/>
-      </dsp:nvSpPr>
-      <dsp:spPr>
-        <a:xfrm>
-          <a:off x="5878079" y="1961623"/>
-          <a:ext cx="664317" cy="664317"/>
-        </a:xfrm>
-        <a:prstGeom prst="chord">
-          <a:avLst>
-            <a:gd name="adj1" fmla="val 4800000"/>
-            <a:gd name="adj2" fmla="val 16800000"/>
-          </a:avLst>
-        </a:prstGeom>
         <a:solidFill>
-          <a:schemeClr val="accent1">
-            <a:tint val="40000"/>
-            <a:hueOff val="0"/>
-            <a:satOff val="0"/>
-            <a:lumOff val="0"/>
-            <a:alphaOff val="0"/>
-          </a:schemeClr>
-        </a:solidFill>
-        <a:ln>
-          <a:noFill/>
-        </a:ln>
-        <a:effectLst/>
-      </dsp:spPr>
-      <dsp:style>
-        <a:lnRef idx="0">
-          <a:scrgbClr r="0" g="0" b="0"/>
-        </a:lnRef>
-        <a:fillRef idx="1">
-          <a:scrgbClr r="0" g="0" b="0"/>
-        </a:fillRef>
-        <a:effectRef idx="0">
-          <a:scrgbClr r="0" g="0" b="0"/>
-        </a:effectRef>
-        <a:fontRef idx="minor"/>
-      </dsp:style>
-    </dsp:sp>
-    <dsp:sp modelId="{6895D33D-AAC7-4C90-8C46-D5C76F04A5EC}">
-      <dsp:nvSpPr>
-        <dsp:cNvPr id="0" name=""/>
-        <dsp:cNvSpPr/>
-      </dsp:nvSpPr>
-      <dsp:spPr>
-        <a:xfrm>
-          <a:off x="5944511" y="2028054"/>
-          <a:ext cx="531453" cy="531453"/>
-        </a:xfrm>
-        <a:prstGeom prst="pie">
-          <a:avLst>
-            <a:gd name="adj1" fmla="val 7560000"/>
-            <a:gd name="adj2" fmla="val 16200000"/>
-          </a:avLst>
-        </a:prstGeom>
-        <a:solidFill>
-          <a:schemeClr val="accent1">
+          <a:schemeClr val="lt1">
+            <a:alpha val="90000"/>
             <a:hueOff val="0"/>
             <a:satOff val="0"/>
             <a:lumOff val="0"/>
@@ -3146,49 +2782,212 @@
         <a:effectRef idx="0">
           <a:scrgbClr r="0" g="0" b="0"/>
         </a:effectRef>
-        <a:fontRef idx="minor">
-          <a:schemeClr val="lt1"/>
-        </a:fontRef>
+        <a:fontRef idx="minor"/>
       </dsp:style>
+      <dsp:txBody>
+        <a:bodyPr spcFirstLastPara="0" vert="horz" wrap="square" lIns="206955" tIns="249936" rIns="206955" bIns="85344" numCol="1" spcCol="1270" anchor="t" anchorCtr="0">
+          <a:noAutofit/>
+        </a:bodyPr>
+        <a:lstStyle/>
+        <a:p>
+          <a:pPr marL="114300" lvl="1" indent="-114300" algn="l" defTabSz="533400">
+            <a:lnSpc>
+              <a:spcPct val="90000"/>
+            </a:lnSpc>
+            <a:spcBef>
+              <a:spcPct val="0"/>
+            </a:spcBef>
+            <a:spcAft>
+              <a:spcPct val="15000"/>
+            </a:spcAft>
+            <a:buChar char="•"/>
+          </a:pPr>
+          <a:r>
+            <a:rPr lang="nl-NL" sz="1200" kern="1200"/>
+            <a:t>Identify</a:t>
+          </a:r>
+          <a:endParaRPr lang="en-GB" sz="1200" kern="1200" dirty="0"/>
+        </a:p>
+        <a:p>
+          <a:pPr marL="228600" lvl="2" indent="-114300" algn="l" defTabSz="533400">
+            <a:lnSpc>
+              <a:spcPct val="90000"/>
+            </a:lnSpc>
+            <a:spcBef>
+              <a:spcPct val="0"/>
+            </a:spcBef>
+            <a:spcAft>
+              <a:spcPct val="15000"/>
+            </a:spcAft>
+            <a:buChar char="•"/>
+          </a:pPr>
+          <a:r>
+            <a:rPr lang="nl-NL" sz="1200" kern="1200" dirty="0"/>
+            <a:t>Safe motion parameters</a:t>
+          </a:r>
+          <a:endParaRPr lang="en-GB" sz="1200" kern="1200" dirty="0"/>
+        </a:p>
+        <a:p>
+          <a:pPr marL="228600" lvl="2" indent="-114300" algn="l" defTabSz="533400">
+            <a:lnSpc>
+              <a:spcPct val="90000"/>
+            </a:lnSpc>
+            <a:spcBef>
+              <a:spcPct val="0"/>
+            </a:spcBef>
+            <a:spcAft>
+              <a:spcPct val="15000"/>
+            </a:spcAft>
+            <a:buChar char="•"/>
+          </a:pPr>
+          <a:r>
+            <a:rPr lang="nl-NL" sz="1200" kern="1200" dirty="0"/>
+            <a:t>Filter </a:t>
+          </a:r>
+          <a:r>
+            <a:rPr lang="nl-NL" sz="1200" kern="1200" dirty="0" err="1"/>
+            <a:t>situation</a:t>
+          </a:r>
+          <a:endParaRPr lang="en-GB" sz="1200" kern="1200" dirty="0"/>
+        </a:p>
+        <a:p>
+          <a:pPr marL="114300" lvl="1" indent="-114300" algn="l" defTabSz="533400">
+            <a:lnSpc>
+              <a:spcPct val="90000"/>
+            </a:lnSpc>
+            <a:spcBef>
+              <a:spcPct val="0"/>
+            </a:spcBef>
+            <a:spcAft>
+              <a:spcPct val="15000"/>
+            </a:spcAft>
+            <a:buChar char="•"/>
+          </a:pPr>
+          <a:r>
+            <a:rPr lang="nl-NL" sz="1200" kern="1200" dirty="0" err="1"/>
+            <a:t>Evaluate</a:t>
+          </a:r>
+          <a:endParaRPr lang="en-GB" sz="1200" kern="1200" dirty="0"/>
+        </a:p>
+        <a:p>
+          <a:pPr marL="228600" lvl="2" indent="-114300" algn="l" defTabSz="533400">
+            <a:lnSpc>
+              <a:spcPct val="90000"/>
+            </a:lnSpc>
+            <a:spcBef>
+              <a:spcPct val="0"/>
+            </a:spcBef>
+            <a:spcAft>
+              <a:spcPct val="15000"/>
+            </a:spcAft>
+            <a:buChar char="•"/>
+          </a:pPr>
+          <a:r>
+            <a:rPr lang="nl-NL" sz="1200" kern="1200" dirty="0"/>
+            <a:t>Hazard criteria</a:t>
+          </a:r>
+          <a:endParaRPr lang="en-GB" sz="1200" kern="1200" dirty="0"/>
+        </a:p>
+        <a:p>
+          <a:pPr marL="228600" lvl="2" indent="-114300" algn="l" defTabSz="533400">
+            <a:lnSpc>
+              <a:spcPct val="90000"/>
+            </a:lnSpc>
+            <a:spcBef>
+              <a:spcPct val="0"/>
+            </a:spcBef>
+            <a:spcAft>
+              <a:spcPct val="15000"/>
+            </a:spcAft>
+            <a:buChar char="•"/>
+          </a:pPr>
+          <a:r>
+            <a:rPr lang="nl-NL" sz="1200" kern="1200" dirty="0"/>
+            <a:t>Routeplanning criteria</a:t>
+          </a:r>
+          <a:endParaRPr lang="en-GB" sz="1200" kern="1200" dirty="0"/>
+        </a:p>
+        <a:p>
+          <a:pPr marL="114300" lvl="1" indent="-114300" algn="l" defTabSz="533400">
+            <a:lnSpc>
+              <a:spcPct val="90000"/>
+            </a:lnSpc>
+            <a:spcBef>
+              <a:spcPct val="0"/>
+            </a:spcBef>
+            <a:spcAft>
+              <a:spcPct val="15000"/>
+            </a:spcAft>
+            <a:buChar char="•"/>
+          </a:pPr>
+          <a:r>
+            <a:rPr lang="nl-NL" sz="1200" kern="1200" dirty="0" err="1"/>
+            <a:t>Decide</a:t>
+          </a:r>
+          <a:endParaRPr lang="en-GB" sz="1200" kern="1200" dirty="0"/>
+        </a:p>
+      </dsp:txBody>
+      <dsp:txXfrm>
+        <a:off x="0" y="3375037"/>
+        <a:ext cx="2666558" cy="1701000"/>
+      </dsp:txXfrm>
     </dsp:sp>
-    <dsp:sp modelId="{C89B0AB5-B955-482C-AE2A-C9ABCFCF81B8}">
+    <dsp:sp modelId="{BBC987B7-7DFB-4489-981A-01A4226BD49F}">
       <dsp:nvSpPr>
         <dsp:cNvPr id="0" name=""/>
         <dsp:cNvSpPr/>
       </dsp:nvSpPr>
       <dsp:spPr>
-        <a:xfrm rot="16200000">
-          <a:off x="5114114" y="3456336"/>
-          <a:ext cx="1926519" cy="398590"/>
+        <a:xfrm>
+          <a:off x="133327" y="3197917"/>
+          <a:ext cx="1866590" cy="354240"/>
         </a:xfrm>
-        <a:prstGeom prst="rect">
+        <a:prstGeom prst="roundRect">
           <a:avLst/>
         </a:prstGeom>
-        <a:noFill/>
-        <a:ln>
-          <a:noFill/>
+        <a:solidFill>
+          <a:schemeClr val="accent1">
+            <a:hueOff val="0"/>
+            <a:satOff val="0"/>
+            <a:lumOff val="0"/>
+            <a:alphaOff val="0"/>
+          </a:schemeClr>
+        </a:solidFill>
+        <a:ln w="12700" cap="flat" cmpd="sng" algn="ctr">
+          <a:solidFill>
+            <a:schemeClr val="lt1">
+              <a:hueOff val="0"/>
+              <a:satOff val="0"/>
+              <a:lumOff val="0"/>
+              <a:alphaOff val="0"/>
+            </a:schemeClr>
+          </a:solidFill>
+          <a:prstDash val="solid"/>
+          <a:miter lim="800000"/>
         </a:ln>
         <a:effectLst/>
       </dsp:spPr>
       <dsp:style>
-        <a:lnRef idx="0">
+        <a:lnRef idx="2">
           <a:scrgbClr r="0" g="0" b="0"/>
         </a:lnRef>
-        <a:fillRef idx="0">
+        <a:fillRef idx="1">
           <a:scrgbClr r="0" g="0" b="0"/>
         </a:fillRef>
         <a:effectRef idx="0">
           <a:scrgbClr r="0" g="0" b="0"/>
         </a:effectRef>
-        <a:fontRef idx="minor"/>
+        <a:fontRef idx="minor">
+          <a:schemeClr val="lt1"/>
+        </a:fontRef>
       </dsp:style>
       <dsp:txBody>
-        <a:bodyPr spcFirstLastPara="0" vert="horz" wrap="square" lIns="0" tIns="0" rIns="0" bIns="0" numCol="1" spcCol="1270" anchor="b" anchorCtr="0">
+        <a:bodyPr spcFirstLastPara="0" vert="horz" wrap="square" lIns="70553" tIns="0" rIns="70553" bIns="0" numCol="1" spcCol="1270" anchor="ctr" anchorCtr="0">
           <a:noAutofit/>
         </a:bodyPr>
         <a:lstStyle/>
         <a:p>
-          <a:pPr marL="0" lvl="0" indent="0" algn="r" defTabSz="800100">
+          <a:pPr marL="0" lvl="0" indent="0" algn="l" defTabSz="533400">
             <a:lnSpc>
               <a:spcPct val="90000"/>
             </a:lnSpc>
@@ -3201,257 +3000,33 @@
             <a:buNone/>
           </a:pPr>
           <a:r>
-            <a:rPr lang="nl-NL" sz="1800" kern="1200" dirty="0" err="1"/>
+            <a:rPr lang="nl-NL" sz="1200" kern="1200" dirty="0" err="1"/>
             <a:t>Strategy</a:t>
           </a:r>
-          <a:endParaRPr lang="en-GB" sz="1800" kern="1200" dirty="0"/>
+          <a:endParaRPr lang="en-GB" sz="1200" kern="1200" dirty="0"/>
         </a:p>
       </dsp:txBody>
       <dsp:txXfrm>
-        <a:off x="5114114" y="3456336"/>
-        <a:ext cx="1926519" cy="398590"/>
+        <a:off x="150620" y="3215210"/>
+        <a:ext cx="1832004" cy="319654"/>
       </dsp:txXfrm>
     </dsp:sp>
-    <dsp:sp modelId="{C84D355D-DEEB-4AD5-A665-ED17B4FF9262}">
+    <dsp:sp modelId="{2D2F9F65-531D-4DCD-8A6F-711CFA8F88A3}">
       <dsp:nvSpPr>
         <dsp:cNvPr id="0" name=""/>
         <dsp:cNvSpPr/>
       </dsp:nvSpPr>
       <dsp:spPr>
         <a:xfrm>
-          <a:off x="6343101" y="1961623"/>
-          <a:ext cx="1328634" cy="2657268"/>
+          <a:off x="0" y="5317957"/>
+          <a:ext cx="2666558" cy="1096200"/>
         </a:xfrm>
         <a:prstGeom prst="rect">
           <a:avLst/>
         </a:prstGeom>
-        <a:noFill/>
-        <a:ln>
-          <a:noFill/>
-        </a:ln>
-        <a:effectLst/>
-      </dsp:spPr>
-      <dsp:style>
-        <a:lnRef idx="0">
-          <a:scrgbClr r="0" g="0" b="0"/>
-        </a:lnRef>
-        <a:fillRef idx="0">
-          <a:scrgbClr r="0" g="0" b="0"/>
-        </a:fillRef>
-        <a:effectRef idx="0">
-          <a:scrgbClr r="0" g="0" b="0"/>
-        </a:effectRef>
-        <a:fontRef idx="minor"/>
-      </dsp:style>
-      <dsp:txBody>
-        <a:bodyPr spcFirstLastPara="0" vert="horz" wrap="square" lIns="0" tIns="0" rIns="0" bIns="0" numCol="1" spcCol="1270" anchor="t" anchorCtr="0">
-          <a:noAutofit/>
-        </a:bodyPr>
-        <a:lstStyle/>
-        <a:p>
-          <a:pPr marL="0" lvl="0" indent="0" algn="l" defTabSz="755650">
-            <a:lnSpc>
-              <a:spcPct val="90000"/>
-            </a:lnSpc>
-            <a:spcBef>
-              <a:spcPct val="0"/>
-            </a:spcBef>
-            <a:spcAft>
-              <a:spcPct val="35000"/>
-            </a:spcAft>
-            <a:buNone/>
-          </a:pPr>
-          <a:r>
-            <a:rPr lang="nl-NL" sz="1700" kern="1200" dirty="0"/>
-            <a:t>Extract</a:t>
-          </a:r>
-          <a:endParaRPr lang="en-GB" sz="1700" kern="1200" dirty="0"/>
-        </a:p>
-        <a:p>
-          <a:pPr marL="114300" lvl="1" indent="-114300" algn="l" defTabSz="577850">
-            <a:lnSpc>
-              <a:spcPct val="90000"/>
-            </a:lnSpc>
-            <a:spcBef>
-              <a:spcPct val="0"/>
-            </a:spcBef>
-            <a:spcAft>
-              <a:spcPct val="15000"/>
-            </a:spcAft>
-            <a:buChar char="•"/>
-          </a:pPr>
-          <a:r>
-            <a:rPr lang="nl-NL" sz="1300" kern="1200" dirty="0"/>
-            <a:t>Safe motion parameters</a:t>
-          </a:r>
-          <a:endParaRPr lang="en-GB" sz="1300" kern="1200" dirty="0"/>
-        </a:p>
-        <a:p>
-          <a:pPr marL="114300" lvl="1" indent="-114300" algn="l" defTabSz="577850">
-            <a:lnSpc>
-              <a:spcPct val="90000"/>
-            </a:lnSpc>
-            <a:spcBef>
-              <a:spcPct val="0"/>
-            </a:spcBef>
-            <a:spcAft>
-              <a:spcPct val="15000"/>
-            </a:spcAft>
-            <a:buChar char="•"/>
-          </a:pPr>
-          <a:r>
-            <a:rPr lang="nl-NL" sz="1300" kern="1200" dirty="0"/>
-            <a:t>Filter </a:t>
-          </a:r>
-          <a:r>
-            <a:rPr lang="nl-NL" sz="1300" kern="1200" dirty="0" err="1"/>
-            <a:t>situation</a:t>
-          </a:r>
-          <a:endParaRPr lang="en-GB" sz="1300" kern="1200" dirty="0"/>
-        </a:p>
-        <a:p>
-          <a:pPr marL="0" lvl="0" indent="0" algn="l" defTabSz="755650">
-            <a:lnSpc>
-              <a:spcPct val="90000"/>
-            </a:lnSpc>
-            <a:spcBef>
-              <a:spcPct val="0"/>
-            </a:spcBef>
-            <a:spcAft>
-              <a:spcPct val="35000"/>
-            </a:spcAft>
-            <a:buNone/>
-          </a:pPr>
-          <a:r>
-            <a:rPr lang="nl-NL" sz="1700" kern="1200" dirty="0" err="1"/>
-            <a:t>Evaluate</a:t>
-          </a:r>
-          <a:endParaRPr lang="en-GB" sz="1700" kern="1200" dirty="0"/>
-        </a:p>
-        <a:p>
-          <a:pPr marL="114300" lvl="1" indent="-114300" algn="l" defTabSz="577850">
-            <a:lnSpc>
-              <a:spcPct val="90000"/>
-            </a:lnSpc>
-            <a:spcBef>
-              <a:spcPct val="0"/>
-            </a:spcBef>
-            <a:spcAft>
-              <a:spcPct val="15000"/>
-            </a:spcAft>
-            <a:buChar char="•"/>
-          </a:pPr>
-          <a:r>
-            <a:rPr lang="nl-NL" sz="1300" kern="1200" dirty="0"/>
-            <a:t>Hazard criteria</a:t>
-          </a:r>
-          <a:endParaRPr lang="en-GB" sz="1300" kern="1200" dirty="0"/>
-        </a:p>
-        <a:p>
-          <a:pPr marL="114300" lvl="1" indent="-114300" algn="l" defTabSz="577850">
-            <a:lnSpc>
-              <a:spcPct val="90000"/>
-            </a:lnSpc>
-            <a:spcBef>
-              <a:spcPct val="0"/>
-            </a:spcBef>
-            <a:spcAft>
-              <a:spcPct val="15000"/>
-            </a:spcAft>
-            <a:buChar char="•"/>
-          </a:pPr>
-          <a:r>
-            <a:rPr lang="nl-NL" sz="1300" kern="1200" dirty="0"/>
-            <a:t>Routeplanning criteria</a:t>
-          </a:r>
-          <a:endParaRPr lang="en-GB" sz="1300" kern="1200" dirty="0"/>
-        </a:p>
-        <a:p>
-          <a:pPr marL="0" lvl="0" indent="0" algn="l" defTabSz="755650">
-            <a:lnSpc>
-              <a:spcPct val="90000"/>
-            </a:lnSpc>
-            <a:spcBef>
-              <a:spcPct val="0"/>
-            </a:spcBef>
-            <a:spcAft>
-              <a:spcPct val="35000"/>
-            </a:spcAft>
-            <a:buNone/>
-          </a:pPr>
-          <a:r>
-            <a:rPr lang="nl-NL" sz="1700" kern="1200" dirty="0" err="1"/>
-            <a:t>Decide</a:t>
-          </a:r>
-          <a:endParaRPr lang="en-GB" sz="1700" kern="1200" dirty="0"/>
-        </a:p>
-      </dsp:txBody>
-      <dsp:txXfrm>
-        <a:off x="6343101" y="1961623"/>
-        <a:ext cx="1328634" cy="2657268"/>
-      </dsp:txXfrm>
-    </dsp:sp>
-    <dsp:sp modelId="{BC5F3FB8-3B5A-42CE-8461-7C136CBF500D}">
-      <dsp:nvSpPr>
-        <dsp:cNvPr id="0" name=""/>
-        <dsp:cNvSpPr/>
-      </dsp:nvSpPr>
-      <dsp:spPr>
-        <a:xfrm>
-          <a:off x="7837037" y="1961623"/>
-          <a:ext cx="664317" cy="664317"/>
-        </a:xfrm>
-        <a:prstGeom prst="chord">
-          <a:avLst>
-            <a:gd name="adj1" fmla="val 4800000"/>
-            <a:gd name="adj2" fmla="val 16800000"/>
-          </a:avLst>
-        </a:prstGeom>
         <a:solidFill>
-          <a:schemeClr val="accent1">
-            <a:tint val="40000"/>
-            <a:hueOff val="0"/>
-            <a:satOff val="0"/>
-            <a:lumOff val="0"/>
-            <a:alphaOff val="0"/>
-          </a:schemeClr>
-        </a:solidFill>
-        <a:ln>
-          <a:noFill/>
-        </a:ln>
-        <a:effectLst/>
-      </dsp:spPr>
-      <dsp:style>
-        <a:lnRef idx="0">
-          <a:scrgbClr r="0" g="0" b="0"/>
-        </a:lnRef>
-        <a:fillRef idx="1">
-          <a:scrgbClr r="0" g="0" b="0"/>
-        </a:fillRef>
-        <a:effectRef idx="0">
-          <a:scrgbClr r="0" g="0" b="0"/>
-        </a:effectRef>
-        <a:fontRef idx="minor"/>
-      </dsp:style>
-    </dsp:sp>
-    <dsp:sp modelId="{62E997E4-4E8A-45C6-9EED-AD1F6AB1A3E5}">
-      <dsp:nvSpPr>
-        <dsp:cNvPr id="0" name=""/>
-        <dsp:cNvSpPr/>
-      </dsp:nvSpPr>
-      <dsp:spPr>
-        <a:xfrm>
-          <a:off x="7903468" y="2028054"/>
-          <a:ext cx="531453" cy="531453"/>
-        </a:xfrm>
-        <a:prstGeom prst="pie">
-          <a:avLst>
-            <a:gd name="adj1" fmla="val 5400000"/>
-            <a:gd name="adj2" fmla="val 16200000"/>
-          </a:avLst>
-        </a:prstGeom>
-        <a:solidFill>
-          <a:schemeClr val="accent1">
+          <a:schemeClr val="lt1">
+            <a:alpha val="90000"/>
             <a:hueOff val="0"/>
             <a:satOff val="0"/>
             <a:lumOff val="0"/>
@@ -3482,49 +3057,167 @@
         <a:effectRef idx="0">
           <a:scrgbClr r="0" g="0" b="0"/>
         </a:effectRef>
-        <a:fontRef idx="minor">
-          <a:schemeClr val="lt1"/>
-        </a:fontRef>
+        <a:fontRef idx="minor"/>
       </dsp:style>
+      <dsp:txBody>
+        <a:bodyPr spcFirstLastPara="0" vert="horz" wrap="square" lIns="206955" tIns="249936" rIns="206955" bIns="85344" numCol="1" spcCol="1270" anchor="t" anchorCtr="0">
+          <a:noAutofit/>
+        </a:bodyPr>
+        <a:lstStyle/>
+        <a:p>
+          <a:pPr marL="114300" lvl="1" indent="-114300" algn="l" defTabSz="533400">
+            <a:lnSpc>
+              <a:spcPct val="90000"/>
+            </a:lnSpc>
+            <a:spcBef>
+              <a:spcPct val="0"/>
+            </a:spcBef>
+            <a:spcAft>
+              <a:spcPct val="15000"/>
+            </a:spcAft>
+            <a:buChar char="•"/>
+          </a:pPr>
+          <a:r>
+            <a:rPr lang="nl-NL" sz="1200" kern="1200" dirty="0" err="1"/>
+            <a:t>Execute</a:t>
+          </a:r>
+          <a:endParaRPr lang="en-GB" sz="1200" kern="1200" dirty="0"/>
+        </a:p>
+        <a:p>
+          <a:pPr marL="228600" lvl="2" indent="-114300" algn="l" defTabSz="533400">
+            <a:lnSpc>
+              <a:spcPct val="90000"/>
+            </a:lnSpc>
+            <a:spcBef>
+              <a:spcPct val="0"/>
+            </a:spcBef>
+            <a:spcAft>
+              <a:spcPct val="15000"/>
+            </a:spcAft>
+            <a:buChar char="•"/>
+          </a:pPr>
+          <a:r>
+            <a:rPr lang="nl-NL" sz="1200" kern="1200" dirty="0" err="1"/>
+            <a:t>Mitigate</a:t>
+          </a:r>
+          <a:r>
+            <a:rPr lang="nl-NL" sz="1200" kern="1200" dirty="0"/>
+            <a:t> risk via </a:t>
+          </a:r>
+          <a:r>
+            <a:rPr lang="nl-NL" sz="1200" kern="1200" dirty="0" err="1"/>
+            <a:t>communication</a:t>
+          </a:r>
+          <a:endParaRPr lang="en-GB" sz="1200" kern="1200" dirty="0"/>
+        </a:p>
+        <a:p>
+          <a:pPr marL="114300" lvl="1" indent="-114300" algn="l" defTabSz="533400">
+            <a:lnSpc>
+              <a:spcPct val="90000"/>
+            </a:lnSpc>
+            <a:spcBef>
+              <a:spcPct val="0"/>
+            </a:spcBef>
+            <a:spcAft>
+              <a:spcPct val="15000"/>
+            </a:spcAft>
+            <a:buChar char="•"/>
+          </a:pPr>
+          <a:r>
+            <a:rPr lang="nl-NL" sz="1200" kern="1200" dirty="0" err="1"/>
+            <a:t>Evaluate</a:t>
+          </a:r>
+          <a:endParaRPr lang="en-GB" sz="1200" kern="1200" dirty="0"/>
+        </a:p>
+        <a:p>
+          <a:pPr marL="228600" lvl="2" indent="-114300" algn="l" defTabSz="533400">
+            <a:lnSpc>
+              <a:spcPct val="90000"/>
+            </a:lnSpc>
+            <a:spcBef>
+              <a:spcPct val="0"/>
+            </a:spcBef>
+            <a:spcAft>
+              <a:spcPct val="15000"/>
+            </a:spcAft>
+            <a:buChar char="•"/>
+          </a:pPr>
+          <a:r>
+            <a:rPr lang="nl-NL" sz="1200" kern="1200" dirty="0"/>
+            <a:t>Update </a:t>
+          </a:r>
+          <a:r>
+            <a:rPr lang="nl-NL" sz="1200" kern="1200" dirty="0" err="1"/>
+            <a:t>mental</a:t>
+          </a:r>
+          <a:r>
+            <a:rPr lang="nl-NL" sz="1200" kern="1200" dirty="0"/>
+            <a:t> model</a:t>
+          </a:r>
+          <a:endParaRPr lang="en-GB" sz="1200" kern="1200" dirty="0"/>
+        </a:p>
+      </dsp:txBody>
+      <dsp:txXfrm>
+        <a:off x="0" y="5317957"/>
+        <a:ext cx="2666558" cy="1096200"/>
+      </dsp:txXfrm>
     </dsp:sp>
-    <dsp:sp modelId="{D38D2675-464E-4488-B695-984A9A9AB692}">
+    <dsp:sp modelId="{677A82DF-9EC6-48C3-886F-ABD6798103A4}">
       <dsp:nvSpPr>
         <dsp:cNvPr id="0" name=""/>
         <dsp:cNvSpPr/>
       </dsp:nvSpPr>
       <dsp:spPr>
-        <a:xfrm rot="16200000">
-          <a:off x="7073072" y="3456336"/>
-          <a:ext cx="1926519" cy="398590"/>
+        <a:xfrm>
+          <a:off x="133327" y="5140837"/>
+          <a:ext cx="1866590" cy="354240"/>
         </a:xfrm>
-        <a:prstGeom prst="rect">
+        <a:prstGeom prst="roundRect">
           <a:avLst/>
         </a:prstGeom>
-        <a:noFill/>
-        <a:ln>
-          <a:noFill/>
+        <a:solidFill>
+          <a:schemeClr val="accent1">
+            <a:hueOff val="0"/>
+            <a:satOff val="0"/>
+            <a:lumOff val="0"/>
+            <a:alphaOff val="0"/>
+          </a:schemeClr>
+        </a:solidFill>
+        <a:ln w="12700" cap="flat" cmpd="sng" algn="ctr">
+          <a:solidFill>
+            <a:schemeClr val="lt1">
+              <a:hueOff val="0"/>
+              <a:satOff val="0"/>
+              <a:lumOff val="0"/>
+              <a:alphaOff val="0"/>
+            </a:schemeClr>
+          </a:solidFill>
+          <a:prstDash val="solid"/>
+          <a:miter lim="800000"/>
         </a:ln>
         <a:effectLst/>
       </dsp:spPr>
       <dsp:style>
-        <a:lnRef idx="0">
+        <a:lnRef idx="2">
           <a:scrgbClr r="0" g="0" b="0"/>
         </a:lnRef>
-        <a:fillRef idx="0">
+        <a:fillRef idx="1">
           <a:scrgbClr r="0" g="0" b="0"/>
         </a:fillRef>
         <a:effectRef idx="0">
           <a:scrgbClr r="0" g="0" b="0"/>
         </a:effectRef>
-        <a:fontRef idx="minor"/>
+        <a:fontRef idx="minor">
+          <a:schemeClr val="lt1"/>
+        </a:fontRef>
       </dsp:style>
       <dsp:txBody>
-        <a:bodyPr spcFirstLastPara="0" vert="horz" wrap="square" lIns="0" tIns="0" rIns="0" bIns="0" numCol="1" spcCol="1270" anchor="b" anchorCtr="0">
+        <a:bodyPr spcFirstLastPara="0" vert="horz" wrap="square" lIns="70553" tIns="0" rIns="70553" bIns="0" numCol="1" spcCol="1270" anchor="ctr" anchorCtr="0">
           <a:noAutofit/>
         </a:bodyPr>
         <a:lstStyle/>
         <a:p>
-          <a:pPr marL="0" lvl="0" indent="0" algn="r" defTabSz="800100">
+          <a:pPr marL="0" lvl="0" indent="0" algn="l" defTabSz="533400">
             <a:lnSpc>
               <a:spcPct val="90000"/>
             </a:lnSpc>
@@ -3537,149 +3230,15 @@
             <a:buNone/>
           </a:pPr>
           <a:r>
-            <a:rPr lang="nl-NL" sz="1800" kern="1200" dirty="0"/>
+            <a:rPr lang="nl-NL" sz="1200" kern="1200" dirty="0"/>
             <a:t>Action</a:t>
           </a:r>
-          <a:endParaRPr lang="en-GB" sz="1800" kern="1200" dirty="0"/>
+          <a:endParaRPr lang="en-GB" sz="1200" kern="1200" dirty="0"/>
         </a:p>
       </dsp:txBody>
       <dsp:txXfrm>
-        <a:off x="7073072" y="3456336"/>
-        <a:ext cx="1926519" cy="398590"/>
-      </dsp:txXfrm>
-    </dsp:sp>
-    <dsp:sp modelId="{447FE049-B941-49A1-93CE-93EF92A5ECD8}">
-      <dsp:nvSpPr>
-        <dsp:cNvPr id="0" name=""/>
-        <dsp:cNvSpPr/>
-      </dsp:nvSpPr>
-      <dsp:spPr>
-        <a:xfrm>
-          <a:off x="8302059" y="1961623"/>
-          <a:ext cx="1328634" cy="2657268"/>
-        </a:xfrm>
-        <a:prstGeom prst="rect">
-          <a:avLst/>
-        </a:prstGeom>
-        <a:noFill/>
-        <a:ln>
-          <a:noFill/>
-        </a:ln>
-        <a:effectLst/>
-      </dsp:spPr>
-      <dsp:style>
-        <a:lnRef idx="0">
-          <a:scrgbClr r="0" g="0" b="0"/>
-        </a:lnRef>
-        <a:fillRef idx="0">
-          <a:scrgbClr r="0" g="0" b="0"/>
-        </a:fillRef>
-        <a:effectRef idx="0">
-          <a:scrgbClr r="0" g="0" b="0"/>
-        </a:effectRef>
-        <a:fontRef idx="minor"/>
-      </dsp:style>
-      <dsp:txBody>
-        <a:bodyPr spcFirstLastPara="0" vert="horz" wrap="square" lIns="0" tIns="0" rIns="0" bIns="0" numCol="1" spcCol="1270" anchor="t" anchorCtr="0">
-          <a:noAutofit/>
-        </a:bodyPr>
-        <a:lstStyle/>
-        <a:p>
-          <a:pPr marL="0" lvl="0" indent="0" algn="l" defTabSz="755650">
-            <a:lnSpc>
-              <a:spcPct val="90000"/>
-            </a:lnSpc>
-            <a:spcBef>
-              <a:spcPct val="0"/>
-            </a:spcBef>
-            <a:spcAft>
-              <a:spcPct val="35000"/>
-            </a:spcAft>
-            <a:buNone/>
-          </a:pPr>
-          <a:r>
-            <a:rPr lang="nl-NL" sz="1700" kern="1200" dirty="0" err="1"/>
-            <a:t>Execute</a:t>
-          </a:r>
-          <a:endParaRPr lang="en-GB" sz="1700" kern="1200" dirty="0"/>
-        </a:p>
-        <a:p>
-          <a:pPr marL="114300" lvl="1" indent="-114300" algn="l" defTabSz="577850">
-            <a:lnSpc>
-              <a:spcPct val="90000"/>
-            </a:lnSpc>
-            <a:spcBef>
-              <a:spcPct val="0"/>
-            </a:spcBef>
-            <a:spcAft>
-              <a:spcPct val="15000"/>
-            </a:spcAft>
-            <a:buChar char="•"/>
-          </a:pPr>
-          <a:r>
-            <a:rPr lang="nl-NL" sz="1300" kern="1200" dirty="0" err="1"/>
-            <a:t>Mitigate</a:t>
-          </a:r>
-          <a:r>
-            <a:rPr lang="nl-NL" sz="1300" kern="1200" dirty="0"/>
-            <a:t> risk via </a:t>
-          </a:r>
-          <a:r>
-            <a:rPr lang="nl-NL" sz="1300" kern="1200" dirty="0" err="1"/>
-            <a:t>communication</a:t>
-          </a:r>
-          <a:endParaRPr lang="en-GB" sz="1300" kern="1200" dirty="0"/>
-        </a:p>
-        <a:p>
-          <a:pPr marL="0" lvl="0" indent="0" algn="l" defTabSz="755650">
-            <a:lnSpc>
-              <a:spcPct val="90000"/>
-            </a:lnSpc>
-            <a:spcBef>
-              <a:spcPct val="0"/>
-            </a:spcBef>
-            <a:spcAft>
-              <a:spcPct val="35000"/>
-            </a:spcAft>
-            <a:buNone/>
-          </a:pPr>
-          <a:r>
-            <a:rPr lang="nl-NL" sz="1700" kern="1200" dirty="0" err="1"/>
-            <a:t>Evaluate</a:t>
-          </a:r>
-          <a:endParaRPr lang="en-GB" sz="1700" kern="1200" dirty="0"/>
-        </a:p>
-        <a:p>
-          <a:pPr marL="114300" lvl="1" indent="-114300" algn="l" defTabSz="577850">
-            <a:lnSpc>
-              <a:spcPct val="90000"/>
-            </a:lnSpc>
-            <a:spcBef>
-              <a:spcPct val="0"/>
-            </a:spcBef>
-            <a:spcAft>
-              <a:spcPct val="15000"/>
-            </a:spcAft>
-            <a:buChar char="•"/>
-          </a:pPr>
-          <a:r>
-            <a:rPr lang="nl-NL" sz="1300" kern="1200" dirty="0"/>
-            <a:t>Update </a:t>
-          </a:r>
-          <a:r>
-            <a:rPr lang="nl-NL" sz="1300" kern="1200" dirty="0" err="1"/>
-            <a:t>mental</a:t>
-          </a:r>
-          <a:r>
-            <a:rPr lang="nl-NL" sz="1300" kern="1200" dirty="0"/>
-            <a:t> model</a:t>
-          </a:r>
-          <a:endParaRPr lang="en-GB" sz="1300" kern="1200" dirty="0"/>
-        </a:p>
-      </dsp:txBody>
-      <dsp:txXfrm>
-        <a:off x="8302059" y="1961623"/>
-        <a:ext cx="1328634" cy="2657268"/>
+        <a:off x="150620" y="5158130"/>
+        <a:ext cx="1832004" cy="319654"/>
       </dsp:txXfrm>
     </dsp:sp>
   </dsp:spTree>
@@ -3687,43 +3246,30 @@
 </file>
 
 <file path=ppt/diagrams/layout1.xml><?xml version="1.0" encoding="utf-8"?>
-<dgm:layoutDef xmlns:dgm="http://schemas.openxmlformats.org/drawingml/2006/diagram" xmlns:a="http://schemas.openxmlformats.org/drawingml/2006/main" uniqueId="urn:microsoft.com/office/officeart/2009/3/layout/PieProcess">
+<dgm:layoutDef xmlns:dgm="http://schemas.openxmlformats.org/drawingml/2006/diagram" xmlns:a="http://schemas.openxmlformats.org/drawingml/2006/main" uniqueId="urn:microsoft.com/office/officeart/2005/8/layout/list1">
   <dgm:title val=""/>
   <dgm:desc val=""/>
   <dgm:catLst>
-    <dgm:cat type="list" pri="8600"/>
-    <dgm:cat type="process" pri="4600"/>
+    <dgm:cat type="list" pri="4000"/>
   </dgm:catLst>
   <dgm:sampData>
     <dgm:dataModel>
       <dgm:ptLst>
         <dgm:pt modelId="0" type="doc"/>
-        <dgm:pt modelId="10">
+        <dgm:pt modelId="1">
           <dgm:prSet phldr="1"/>
         </dgm:pt>
-        <dgm:pt modelId="11">
+        <dgm:pt modelId="2">
           <dgm:prSet phldr="1"/>
         </dgm:pt>
-        <dgm:pt modelId="20">
-          <dgm:prSet phldr="1"/>
-        </dgm:pt>
-        <dgm:pt modelId="21">
-          <dgm:prSet phldr="1"/>
-        </dgm:pt>
-        <dgm:pt modelId="30">
-          <dgm:prSet phldr="1"/>
-        </dgm:pt>
-        <dgm:pt modelId="31">
+        <dgm:pt modelId="3">
           <dgm:prSet phldr="1"/>
         </dgm:pt>
       </dgm:ptLst>
       <dgm:cxnLst>
-        <dgm:cxn modelId="40" srcId="0" destId="10" srcOrd="0" destOrd="0"/>
-        <dgm:cxn modelId="12" srcId="10" destId="11" srcOrd="0" destOrd="0"/>
-        <dgm:cxn modelId="50" srcId="0" destId="20" srcOrd="1" destOrd="0"/>
-        <dgm:cxn modelId="22" srcId="20" destId="21" srcOrd="0" destOrd="0"/>
-        <dgm:cxn modelId="60" srcId="0" destId="30" srcOrd="2" destOrd="0"/>
-        <dgm:cxn modelId="32" srcId="30" destId="31" srcOrd="0" destOrd="0"/>
+        <dgm:cxn modelId="4" srcId="0" destId="1" srcOrd="0" destOrd="0"/>
+        <dgm:cxn modelId="5" srcId="0" destId="2" srcOrd="1" destOrd="0"/>
+        <dgm:cxn modelId="6" srcId="0" destId="3" srcOrd="2" destOrd="0"/>
       </dgm:cxnLst>
       <dgm:bg/>
       <dgm:whole/>
@@ -3733,24 +3279,12 @@
     <dgm:dataModel>
       <dgm:ptLst>
         <dgm:pt modelId="0" type="doc"/>
-        <dgm:pt modelId="10">
-          <dgm:prSet phldr="1"/>
-        </dgm:pt>
-        <dgm:pt modelId="20">
-          <dgm:prSet phldr="1"/>
-        </dgm:pt>
-        <dgm:pt modelId="30">
-          <dgm:prSet phldr="1"/>
-        </dgm:pt>
-        <dgm:pt modelId="40">
-          <dgm:prSet phldr="1"/>
-        </dgm:pt>
+        <dgm:pt modelId="1"/>
+        <dgm:pt modelId="2"/>
       </dgm:ptLst>
       <dgm:cxnLst>
-        <dgm:cxn modelId="50" srcId="0" destId="10" srcOrd="0" destOrd="0"/>
-        <dgm:cxn modelId="60" srcId="0" destId="20" srcOrd="1" destOrd="0"/>
-        <dgm:cxn modelId="70" srcId="0" destId="30" srcOrd="2" destOrd="0"/>
-        <dgm:cxn modelId="80" srcId="0" destId="40" srcOrd="3" destOrd="0"/>
+        <dgm:cxn modelId="4" srcId="0" destId="1" srcOrd="0" destOrd="0"/>
+        <dgm:cxn modelId="5" srcId="0" destId="2" srcOrd="1" destOrd="0"/>
       </dgm:cxnLst>
       <dgm:bg/>
       <dgm:whole/>
@@ -3760,772 +3294,177 @@
     <dgm:dataModel>
       <dgm:ptLst>
         <dgm:pt modelId="0" type="doc"/>
-        <dgm:pt modelId="10">
-          <dgm:prSet phldr="1"/>
-        </dgm:pt>
-        <dgm:pt modelId="20">
-          <dgm:prSet phldr="1"/>
-        </dgm:pt>
-        <dgm:pt modelId="30">
-          <dgm:prSet phldr="1"/>
-        </dgm:pt>
-        <dgm:pt modelId="40">
-          <dgm:prSet phldr="1"/>
-        </dgm:pt>
+        <dgm:pt modelId="1"/>
+        <dgm:pt modelId="2"/>
+        <dgm:pt modelId="3"/>
+        <dgm:pt modelId="4"/>
       </dgm:ptLst>
       <dgm:cxnLst>
-        <dgm:cxn modelId="50" srcId="0" destId="10" srcOrd="0" destOrd="0"/>
-        <dgm:cxn modelId="60" srcId="0" destId="20" srcOrd="1" destOrd="0"/>
-        <dgm:cxn modelId="70" srcId="0" destId="30" srcOrd="2" destOrd="0"/>
-        <dgm:cxn modelId="80" srcId="0" destId="40" srcOrd="3" destOrd="0"/>
+        <dgm:cxn modelId="5" srcId="0" destId="1" srcOrd="0" destOrd="0"/>
+        <dgm:cxn modelId="6" srcId="0" destId="2" srcOrd="1" destOrd="0"/>
+        <dgm:cxn modelId="7" srcId="0" destId="3" srcOrd="2" destOrd="0"/>
+        <dgm:cxn modelId="8" srcId="0" destId="4" srcOrd="3" destOrd="0"/>
       </dgm:cxnLst>
       <dgm:bg/>
       <dgm:whole/>
     </dgm:dataModel>
   </dgm:clrData>
-  <dgm:layoutNode name="Name0">
+  <dgm:layoutNode name="linear">
     <dgm:varLst>
-      <dgm:chMax val="7"/>
-      <dgm:chPref val="7"/>
       <dgm:dir/>
-      <dgm:animOne val="branch"/>
       <dgm:animLvl val="lvl"/>
+      <dgm:resizeHandles val="exact"/>
     </dgm:varLst>
-    <dgm:choose name="Name1">
-      <dgm:if name="Name2" func="var" arg="dir" op="equ" val="norm">
+    <dgm:choose name="Name0">
+      <dgm:if name="Name1" func="var" arg="dir" op="equ" val="norm">
         <dgm:alg type="lin">
-          <dgm:param type="linDir" val="fromL"/>
+          <dgm:param type="linDir" val="fromT"/>
+          <dgm:param type="vertAlign" val="mid"/>
+          <dgm:param type="horzAlign" val="l"/>
+          <dgm:param type="nodeHorzAlign" val="l"/>
         </dgm:alg>
       </dgm:if>
-      <dgm:else name="Name3">
+      <dgm:else name="Name2">
         <dgm:alg type="lin">
-          <dgm:param type="linDir" val="fromR"/>
+          <dgm:param type="linDir" val="fromT"/>
+          <dgm:param type="vertAlign" val="mid"/>
+          <dgm:param type="horzAlign" val="r"/>
+          <dgm:param type="nodeHorzAlign" val="r"/>
         </dgm:alg>
       </dgm:else>
     </dgm:choose>
     <dgm:shape xmlns:r="http://schemas.openxmlformats.org/officeDocument/2006/relationships" r:blip="">
       <dgm:adjLst/>
     </dgm:shape>
+    <dgm:presOf/>
     <dgm:constrLst>
-      <dgm:constr type="primFontSz" for="des" forName="Parent" val="65"/>
-      <dgm:constr type="primFontSz" for="des" forName="Child" refType="primFontSz" refFor="des" refForName="Parent" op="lte"/>
-      <dgm:constr type="w" for="ch" forName="composite" refType="w"/>
-      <dgm:constr type="h" for="ch" forName="composite" refType="h"/>
-      <dgm:constr type="w" for="ch" forName="ParentComposite" refType="w" fact="0.5"/>
-      <dgm:constr type="h" for="ch" forName="ParentComposite" refType="h"/>
-      <dgm:constr type="w" for="ch" forName="negSibTrans" refType="h" refFor="ch" refForName="composite" fact="-0.075"/>
-      <dgm:constr type="w" for="ch" forName="sibTrans" refType="w" refFor="ch" refForName="composite" fact="0.0425"/>
+      <dgm:constr type="w" for="ch" forName="parentLin" refType="w"/>
+      <dgm:constr type="h" for="ch" forName="parentLin" val="INF"/>
+      <dgm:constr type="w" for="des" forName="parentLeftMargin" refType="w" fact="0.05"/>
+      <dgm:constr type="w" for="des" forName="parentText" refType="w" fact="0.7"/>
+      <dgm:constr type="h" for="des" forName="parentText" refType="primFontSz" refFor="des" refForName="parentText" fact="0.82"/>
+      <dgm:constr type="h" for="ch" forName="negativeSpace" refType="primFontSz" refFor="des" refForName="parentText" fact="-0.41"/>
+      <dgm:constr type="h" for="ch" forName="negativeSpace" refType="h" refFor="des" refForName="parentText" op="lte" fact="-0.82"/>
+      <dgm:constr type="h" for="ch" forName="negativeSpace" refType="h" refFor="des" refForName="parentText" op="gte" fact="-0.82"/>
+      <dgm:constr type="w" for="ch" forName="childText" refType="w"/>
+      <dgm:constr type="h" for="ch" forName="childText" refType="primFontSz" refFor="des" refForName="parentText" fact="0.7"/>
+      <dgm:constr type="primFontSz" for="des" forName="parentText" val="65"/>
+      <dgm:constr type="primFontSz" for="ch" forName="childText" refType="primFontSz" refFor="des" refForName="parentText"/>
+      <dgm:constr type="tMarg" for="ch" forName="childText" refType="primFontSz" refFor="des" refForName="parentText" fact="1.64"/>
+      <dgm:constr type="tMarg" for="ch" forName="childText" refType="h" refFor="des" refForName="parentText" op="lte" fact="3.28"/>
+      <dgm:constr type="tMarg" for="ch" forName="childText" refType="h" refFor="des" refForName="parentText" op="gte" fact="3.28"/>
+      <dgm:constr type="lMarg" for="ch" forName="childText" refType="w" fact="0.22"/>
+      <dgm:constr type="rMarg" for="ch" forName="childText" refType="lMarg" refFor="ch" refForName="childText"/>
+      <dgm:constr type="lMarg" for="des" forName="parentText" refType="w" fact="0.075"/>
+      <dgm:constr type="rMarg" for="des" forName="parentText" refType="lMarg" refFor="des" refForName="parentText"/>
+      <dgm:constr type="h" for="ch" forName="spaceBetweenRectangles" refType="primFontSz" refFor="des" refForName="parentText" fact="0.15"/>
     </dgm:constrLst>
-    <dgm:forEach name="nodesForEach" axis="ch" ptType="node" cnt="7">
-      <dgm:layoutNode name="ParentComposite">
-        <dgm:alg type="composite">
-          <dgm:param type="ar" val="0.25"/>
-        </dgm:alg>
+    <dgm:ruleLst>
+      <dgm:rule type="primFontSz" for="des" forName="parentText" val="5" fact="NaN" max="NaN"/>
+    </dgm:ruleLst>
+    <dgm:forEach name="Name3" axis="ch" ptType="node">
+      <dgm:layoutNode name="parentLin">
+        <dgm:choose name="Name4">
+          <dgm:if name="Name5" func="var" arg="dir" op="equ" val="norm">
+            <dgm:alg type="lin">
+              <dgm:param type="linDir" val="fromL"/>
+              <dgm:param type="horzAlign" val="l"/>
+              <dgm:param type="nodeHorzAlign" val="l"/>
+            </dgm:alg>
+          </dgm:if>
+          <dgm:else name="Name6">
+            <dgm:alg type="lin">
+              <dgm:param type="linDir" val="fromR"/>
+              <dgm:param type="horzAlign" val="r"/>
+              <dgm:param type="nodeHorzAlign" val="r"/>
+            </dgm:alg>
+          </dgm:else>
+        </dgm:choose>
         <dgm:shape xmlns:r="http://schemas.openxmlformats.org/officeDocument/2006/relationships" r:blip="">
           <dgm:adjLst/>
         </dgm:shape>
-        <dgm:choose name="Name4">
-          <dgm:if name="Name5" func="var" arg="dir" op="equ" val="norm">
-            <dgm:constrLst>
-              <dgm:constr type="l" for="ch" forName="Parent" refType="w" fact="0"/>
-              <dgm:constr type="t" for="ch" forName="Parent" refType="h" fact="0.275"/>
-              <dgm:constr type="w" for="ch" forName="Parent" refType="w" fact="0.6"/>
-              <dgm:constr type="h" for="ch" forName="Parent" refType="h" fact="0.725"/>
-              <dgm:constr type="l" for="ch" forName="Chord" refType="w" fact="0"/>
-              <dgm:constr type="t" for="ch" forName="Chord" refType="h" fact="0"/>
-              <dgm:constr type="w" for="ch" forName="Chord" refType="w"/>
-              <dgm:constr type="h" for="ch" forName="Chord" refType="h" fact="0.25"/>
-              <dgm:constr type="l" for="ch" forName="Pie" refType="w" fact="0.1"/>
-              <dgm:constr type="t" for="ch" forName="Pie" refType="h" fact="0.025"/>
-              <dgm:constr type="w" for="ch" forName="Pie" refType="w" fact="0.8"/>
-              <dgm:constr type="h" for="ch" forName="Pie" refType="h" fact="0.2"/>
-            </dgm:constrLst>
-          </dgm:if>
-          <dgm:else name="Name6">
-            <dgm:constrLst>
-              <dgm:constr type="r" for="ch" forName="Parent" refType="w"/>
-              <dgm:constr type="t" for="ch" forName="Parent" refType="h" fact="0.275"/>
-              <dgm:constr type="w" for="ch" forName="Parent" refType="w" fact="0.6"/>
-              <dgm:constr type="h" for="ch" forName="Parent" refType="h" fact="0.725"/>
-              <dgm:constr type="r" for="ch" forName="Chord" refType="w"/>
-              <dgm:constr type="t" for="ch" forName="Chord" refType="h" fact="0"/>
-              <dgm:constr type="w" for="ch" forName="Chord" refType="w"/>
-              <dgm:constr type="h" for="ch" forName="Chord" refType="h" fact="0.25"/>
-              <dgm:constr type="r" for="ch" forName="Pie" refType="w" fact="0.9"/>
-              <dgm:constr type="t" for="ch" forName="Pie" refType="h" fact="0.025"/>
-              <dgm:constr type="w" for="ch" forName="Pie" refType="w" fact="0.8"/>
-              <dgm:constr type="h" for="ch" forName="Pie" refType="h" fact="0.2"/>
-            </dgm:constrLst>
-          </dgm:else>
-        </dgm:choose>
-        <dgm:layoutNode name="Chord" styleLbl="bgShp">
+        <dgm:presOf/>
+        <dgm:constrLst/>
+        <dgm:ruleLst/>
+        <dgm:layoutNode name="parentLeftMargin">
           <dgm:alg type="sp"/>
+          <dgm:shape xmlns:r="http://schemas.openxmlformats.org/officeDocument/2006/relationships" type="rect" r:blip="" hideGeom="1">
+            <dgm:adjLst/>
+          </dgm:shape>
+          <dgm:presOf axis="self"/>
+          <dgm:constrLst>
+            <dgm:constr type="h"/>
+          </dgm:constrLst>
+          <dgm:ruleLst/>
+        </dgm:layoutNode>
+        <dgm:layoutNode name="parentText" styleLbl="node1">
+          <dgm:varLst>
+            <dgm:chMax val="0"/>
+            <dgm:bulletEnabled val="1"/>
+          </dgm:varLst>
           <dgm:choose name="Name7">
             <dgm:if name="Name8" func="var" arg="dir" op="equ" val="norm">
-              <dgm:shape xmlns:r="http://schemas.openxmlformats.org/officeDocument/2006/relationships" type="chord" r:blip="">
-                <dgm:adjLst>
-                  <dgm:adj idx="1" val="80"/>
-                  <dgm:adj idx="2" val="-80"/>
-                </dgm:adjLst>
-              </dgm:shape>
+              <dgm:alg type="tx">
+                <dgm:param type="parTxLTRAlign" val="l"/>
+                <dgm:param type="parTxRTLAlign" val="l"/>
+              </dgm:alg>
             </dgm:if>
             <dgm:else name="Name9">
-              <dgm:shape xmlns:r="http://schemas.openxmlformats.org/officeDocument/2006/relationships" rot="180" type="chord" r:blip="">
-                <dgm:adjLst>
-                  <dgm:adj idx="1" val="80"/>
-                  <dgm:adj idx="2" val="-80"/>
-                </dgm:adjLst>
-              </dgm:shape>
-            </dgm:else>
-          </dgm:choose>
-          <dgm:presOf/>
-        </dgm:layoutNode>
-        <dgm:layoutNode name="Pie" styleLbl="alignNode1">
-          <dgm:alg type="sp"/>
-          <dgm:choose name="Name10">
-            <dgm:if name="Name11" func="var" arg="dir" op="equ" val="norm">
-              <dgm:choose name="Name12">
-                <dgm:if name="Name13" axis="precedSib" ptType="node" func="cnt" op="equ" val="0">
-                  <dgm:choose name="Name14">
-                    <dgm:if name="Name15" axis="followSib" ptType="node" func="cnt" op="equ" val="0">
-                      <dgm:shape xmlns:r="http://schemas.openxmlformats.org/officeDocument/2006/relationships" type="pie" r:blip="">
-                        <dgm:adjLst>
-                          <dgm:adj idx="1" val="90"/>
-                          <dgm:adj idx="2" val="-90"/>
-                        </dgm:adjLst>
-                      </dgm:shape>
-                    </dgm:if>
-                    <dgm:if name="Name16" axis="followSib" ptType="node" func="cnt" op="equ" val="1">
-                      <dgm:shape xmlns:r="http://schemas.openxmlformats.org/officeDocument/2006/relationships" type="pie" r:blip="">
-                        <dgm:adjLst>
-                          <dgm:adj idx="1" val="180"/>
-                          <dgm:adj idx="2" val="-90"/>
-                        </dgm:adjLst>
-                      </dgm:shape>
-                    </dgm:if>
-                    <dgm:if name="Name17" axis="followSib" ptType="node" func="cnt" op="equ" val="2">
-                      <dgm:shape xmlns:r="http://schemas.openxmlformats.org/officeDocument/2006/relationships" type="pie" r:blip="">
-                        <dgm:adjLst>
-                          <dgm:adj idx="1" val="-150"/>
-                          <dgm:adj idx="2" val="-90"/>
-                        </dgm:adjLst>
-                      </dgm:shape>
-                    </dgm:if>
-                    <dgm:if name="Name18" axis="followSib" ptType="node" func="cnt" op="equ" val="3">
-                      <dgm:shape xmlns:r="http://schemas.openxmlformats.org/officeDocument/2006/relationships" type="pie" r:blip="">
-                        <dgm:adjLst>
-                          <dgm:adj idx="1" val="-135"/>
-                          <dgm:adj idx="2" val="-90"/>
-                        </dgm:adjLst>
-                      </dgm:shape>
-                    </dgm:if>
-                    <dgm:if name="Name19" axis="followSib" ptType="node" func="cnt" op="equ" val="4">
-                      <dgm:shape xmlns:r="http://schemas.openxmlformats.org/officeDocument/2006/relationships" type="pie" r:blip="">
-                        <dgm:adjLst>
-                          <dgm:adj idx="1" val="-126"/>
-                          <dgm:adj idx="2" val="-90"/>
-                        </dgm:adjLst>
-                      </dgm:shape>
-                    </dgm:if>
-                    <dgm:if name="Name20" axis="followSib" ptType="node" func="cnt" op="equ" val="5">
-                      <dgm:shape xmlns:r="http://schemas.openxmlformats.org/officeDocument/2006/relationships" type="pie" r:blip="">
-                        <dgm:adjLst>
-                          <dgm:adj idx="1" val="-120"/>
-                          <dgm:adj idx="2" val="-90"/>
-                        </dgm:adjLst>
-                      </dgm:shape>
-                    </dgm:if>
-                    <dgm:else name="Name21">
-                      <dgm:shape xmlns:r="http://schemas.openxmlformats.org/officeDocument/2006/relationships" type="pie" r:blip="">
-                        <dgm:adjLst>
-                          <dgm:adj idx="1" val="-115.7143"/>
-                          <dgm:adj idx="2" val="-90"/>
-                        </dgm:adjLst>
-                      </dgm:shape>
-                    </dgm:else>
-                  </dgm:choose>
-                </dgm:if>
-                <dgm:if name="Name22" axis="precedSib" ptType="node" func="cnt" op="equ" val="1">
-                  <dgm:choose name="Name23">
-                    <dgm:if name="Name24" axis="followSib" ptType="node" func="cnt" op="equ" val="0">
-                      <dgm:shape xmlns:r="http://schemas.openxmlformats.org/officeDocument/2006/relationships" type="pie" r:blip="">
-                        <dgm:adjLst>
-                          <dgm:adj idx="1" val="90"/>
-                          <dgm:adj idx="2" val="-90"/>
-                        </dgm:adjLst>
-                      </dgm:shape>
-                    </dgm:if>
-                    <dgm:if name="Name25" axis="followSib" ptType="node" func="cnt" op="equ" val="1">
-                      <dgm:shape xmlns:r="http://schemas.openxmlformats.org/officeDocument/2006/relationships" type="pie" r:blip="">
-                        <dgm:adjLst>
-                          <dgm:adj idx="1" val="150"/>
-                          <dgm:adj idx="2" val="-90"/>
-                        </dgm:adjLst>
-                      </dgm:shape>
-                    </dgm:if>
-                    <dgm:if name="Name26" axis="followSib" ptType="node" func="cnt" op="equ" val="2">
-                      <dgm:shape xmlns:r="http://schemas.openxmlformats.org/officeDocument/2006/relationships" type="pie" r:blip="">
-                        <dgm:adjLst>
-                          <dgm:adj idx="1" val="180"/>
-                          <dgm:adj idx="2" val="-90"/>
-                        </dgm:adjLst>
-                      </dgm:shape>
-                    </dgm:if>
-                    <dgm:if name="Name27" axis="followSib" ptType="node" func="cnt" op="equ" val="3">
-                      <dgm:shape xmlns:r="http://schemas.openxmlformats.org/officeDocument/2006/relationships" type="pie" r:blip="">
-                        <dgm:adjLst>
-                          <dgm:adj idx="1" val="-162"/>
-                          <dgm:adj idx="2" val="-90"/>
-                        </dgm:adjLst>
-                      </dgm:shape>
-                    </dgm:if>
-                    <dgm:if name="Name28" axis="followSib" ptType="node" func="cnt" op="equ" val="4">
-                      <dgm:shape xmlns:r="http://schemas.openxmlformats.org/officeDocument/2006/relationships" type="pie" r:blip="">
-                        <dgm:adjLst>
-                          <dgm:adj idx="1" val="-150"/>
-                          <dgm:adj idx="2" val="-90"/>
-                        </dgm:adjLst>
-                      </dgm:shape>
-                    </dgm:if>
-                    <dgm:else name="Name29">
-                      <dgm:shape xmlns:r="http://schemas.openxmlformats.org/officeDocument/2006/relationships" type="pie" r:blip="">
-                        <dgm:adjLst>
-                          <dgm:adj idx="1" val="-141.4286"/>
-                          <dgm:adj idx="2" val="-90"/>
-                        </dgm:adjLst>
-                      </dgm:shape>
-                    </dgm:else>
-                  </dgm:choose>
-                </dgm:if>
-                <dgm:if name="Name30" axis="precedSib" ptType="node" func="cnt" op="equ" val="2">
-                  <dgm:choose name="Name31">
-                    <dgm:if name="Name32" axis="followSib" ptType="node" func="cnt" op="equ" val="0">
-                      <dgm:shape xmlns:r="http://schemas.openxmlformats.org/officeDocument/2006/relationships" type="pie" r:blip="">
-                        <dgm:adjLst>
-                          <dgm:adj idx="1" val="90"/>
-                          <dgm:adj idx="2" val="-90"/>
-                        </dgm:adjLst>
-                      </dgm:shape>
-                    </dgm:if>
-                    <dgm:if name="Name33" axis="followSib" ptType="node" func="cnt" op="equ" val="1">
-                      <dgm:shape xmlns:r="http://schemas.openxmlformats.org/officeDocument/2006/relationships" type="pie" r:blip="">
-                        <dgm:adjLst>
-                          <dgm:adj idx="1" val="135"/>
-                          <dgm:adj idx="2" val="-90"/>
-                        </dgm:adjLst>
-                      </dgm:shape>
-                    </dgm:if>
-                    <dgm:if name="Name34" axis="followSib" ptType="node" func="cnt" op="equ" val="2">
-                      <dgm:shape xmlns:r="http://schemas.openxmlformats.org/officeDocument/2006/relationships" type="pie" r:blip="">
-                        <dgm:adjLst>
-                          <dgm:adj idx="1" val="162"/>
-                          <dgm:adj idx="2" val="-90"/>
-                        </dgm:adjLst>
-                      </dgm:shape>
-                    </dgm:if>
-                    <dgm:if name="Name35" axis="followSib" ptType="node" func="cnt" op="equ" val="3">
-                      <dgm:shape xmlns:r="http://schemas.openxmlformats.org/officeDocument/2006/relationships" type="pie" r:blip="">
-                        <dgm:adjLst>
-                          <dgm:adj idx="1" val="180"/>
-                          <dgm:adj idx="2" val="-90"/>
-                        </dgm:adjLst>
-                      </dgm:shape>
-                    </dgm:if>
-                    <dgm:else name="Name36">
-                      <dgm:shape xmlns:r="http://schemas.openxmlformats.org/officeDocument/2006/relationships" type="pie" r:blip="">
-                        <dgm:adjLst>
-                          <dgm:adj idx="1" val="-167.1429"/>
-                          <dgm:adj idx="2" val="-90"/>
-                        </dgm:adjLst>
-                      </dgm:shape>
-                    </dgm:else>
-                  </dgm:choose>
-                </dgm:if>
-                <dgm:if name="Name37" axis="precedSib" ptType="node" func="cnt" op="equ" val="3">
-                  <dgm:choose name="Name38">
-                    <dgm:if name="Name39" axis="followSib" ptType="node" func="cnt" op="equ" val="0">
-                      <dgm:shape xmlns:r="http://schemas.openxmlformats.org/officeDocument/2006/relationships" type="pie" r:blip="">
-                        <dgm:adjLst>
-                          <dgm:adj idx="1" val="90"/>
-                          <dgm:adj idx="2" val="-90"/>
-                        </dgm:adjLst>
-                      </dgm:shape>
-                    </dgm:if>
-                    <dgm:if name="Name40" axis="followSib" ptType="node" func="cnt" op="equ" val="1">
-                      <dgm:shape xmlns:r="http://schemas.openxmlformats.org/officeDocument/2006/relationships" type="pie" r:blip="">
-                        <dgm:adjLst>
-                          <dgm:adj idx="1" val="126"/>
-                          <dgm:adj idx="2" val="-90"/>
-                        </dgm:adjLst>
-                      </dgm:shape>
-                    </dgm:if>
-                    <dgm:if name="Name41" axis="followSib" ptType="node" func="cnt" op="equ" val="2">
-                      <dgm:shape xmlns:r="http://schemas.openxmlformats.org/officeDocument/2006/relationships" type="pie" r:blip="">
-                        <dgm:adjLst>
-                          <dgm:adj idx="1" val="150"/>
-                          <dgm:adj idx="2" val="-90"/>
-                        </dgm:adjLst>
-                      </dgm:shape>
-                    </dgm:if>
-                    <dgm:else name="Name42">
-                      <dgm:shape xmlns:r="http://schemas.openxmlformats.org/officeDocument/2006/relationships" type="pie" r:blip="">
-                        <dgm:adjLst>
-                          <dgm:adj idx="1" val="167.1429"/>
-                          <dgm:adj idx="2" val="-90"/>
-                        </dgm:adjLst>
-                      </dgm:shape>
-                    </dgm:else>
-                  </dgm:choose>
-                </dgm:if>
-                <dgm:if name="Name43" axis="precedSib" ptType="node" func="cnt" op="equ" val="4">
-                  <dgm:choose name="Name44">
-                    <dgm:if name="Name45" axis="followSib" ptType="node" func="cnt" op="equ" val="0">
-                      <dgm:shape xmlns:r="http://schemas.openxmlformats.org/officeDocument/2006/relationships" type="pie" r:blip="">
-                        <dgm:adjLst>
-                          <dgm:adj idx="1" val="90"/>
-                          <dgm:adj idx="2" val="-90"/>
-                        </dgm:adjLst>
-                      </dgm:shape>
-                    </dgm:if>
-                    <dgm:if name="Name46" axis="followSib" ptType="node" func="cnt" op="equ" val="1">
-                      <dgm:shape xmlns:r="http://schemas.openxmlformats.org/officeDocument/2006/relationships" type="pie" r:blip="">
-                        <dgm:adjLst>
-                          <dgm:adj idx="1" val="120"/>
-                          <dgm:adj idx="2" val="-90"/>
-                        </dgm:adjLst>
-                      </dgm:shape>
-                    </dgm:if>
-                    <dgm:else name="Name47">
-                      <dgm:shape xmlns:r="http://schemas.openxmlformats.org/officeDocument/2006/relationships" type="pie" r:blip="">
-                        <dgm:adjLst>
-                          <dgm:adj idx="1" val="141.4286"/>
-                          <dgm:adj idx="2" val="-90"/>
-                        </dgm:adjLst>
-                      </dgm:shape>
-                    </dgm:else>
-                  </dgm:choose>
-                </dgm:if>
-                <dgm:if name="Name48" axis="precedSib" ptType="node" func="cnt" op="equ" val="5">
-                  <dgm:choose name="Name49">
-                    <dgm:if name="Name50" axis="followSib" ptType="node" func="cnt" op="equ" val="0">
-                      <dgm:shape xmlns:r="http://schemas.openxmlformats.org/officeDocument/2006/relationships" type="pie" r:blip="">
-                        <dgm:adjLst>
-                          <dgm:adj idx="1" val="90"/>
-                          <dgm:adj idx="2" val="-90"/>
-                        </dgm:adjLst>
-                      </dgm:shape>
-                    </dgm:if>
-                    <dgm:else name="Name51">
-                      <dgm:shape xmlns:r="http://schemas.openxmlformats.org/officeDocument/2006/relationships" type="pie" r:blip="">
-                        <dgm:adjLst>
-                          <dgm:adj idx="1" val="115.7143"/>
-                          <dgm:adj idx="2" val="-90"/>
-                        </dgm:adjLst>
-                      </dgm:shape>
-                    </dgm:else>
-                  </dgm:choose>
-                </dgm:if>
-                <dgm:else name="Name52">
-                  <dgm:shape xmlns:r="http://schemas.openxmlformats.org/officeDocument/2006/relationships" type="pie" r:blip="">
-                    <dgm:adjLst>
-                      <dgm:adj idx="1" val="90"/>
-                      <dgm:adj idx="2" val="-90"/>
-                    </dgm:adjLst>
-                  </dgm:shape>
-                </dgm:else>
-              </dgm:choose>
-            </dgm:if>
-            <dgm:else name="Name53">
-              <dgm:choose name="Name54">
-                <dgm:if name="Name55" axis="precedSib" ptType="node" func="cnt" op="equ" val="0">
-                  <dgm:choose name="Name56">
-                    <dgm:if name="Name57" axis="followSib" ptType="node" func="cnt" op="equ" val="0">
-                      <dgm:shape xmlns:r="http://schemas.openxmlformats.org/officeDocument/2006/relationships" rot="180" type="pie" r:blip="">
-                        <dgm:adjLst>
-                          <dgm:adj idx="1" val="90"/>
-                          <dgm:adj idx="2" val="-90"/>
-                        </dgm:adjLst>
-                      </dgm:shape>
-                    </dgm:if>
-                    <dgm:if name="Name58" axis="followSib" ptType="node" func="cnt" op="equ" val="1">
-                      <dgm:shape xmlns:r="http://schemas.openxmlformats.org/officeDocument/2006/relationships" rot="180" type="pie" r:blip="">
-                        <dgm:adjLst>
-                          <dgm:adj idx="1" val="90"/>
-                          <dgm:adj idx="2" val="180"/>
-                        </dgm:adjLst>
-                      </dgm:shape>
-                    </dgm:if>
-                    <dgm:if name="Name59" axis="followSib" ptType="node" func="cnt" op="equ" val="2">
-                      <dgm:shape xmlns:r="http://schemas.openxmlformats.org/officeDocument/2006/relationships" rot="180" type="pie" r:blip="">
-                        <dgm:adjLst>
-                          <dgm:adj idx="1" val="90"/>
-                          <dgm:adj idx="2" val="150"/>
-                        </dgm:adjLst>
-                      </dgm:shape>
-                    </dgm:if>
-                    <dgm:if name="Name60" axis="followSib" ptType="node" func="cnt" op="equ" val="3">
-                      <dgm:shape xmlns:r="http://schemas.openxmlformats.org/officeDocument/2006/relationships" rot="180" type="pie" r:blip="">
-                        <dgm:adjLst>
-                          <dgm:adj idx="1" val="90"/>
-                          <dgm:adj idx="2" val="135"/>
-                        </dgm:adjLst>
-                      </dgm:shape>
-                    </dgm:if>
-                    <dgm:if name="Name61" axis="followSib" ptType="node" func="cnt" op="equ" val="4">
-                      <dgm:shape xmlns:r="http://schemas.openxmlformats.org/officeDocument/2006/relationships" rot="180" type="pie" r:blip="">
-                        <dgm:adjLst>
-                          <dgm:adj idx="1" val="90"/>
-                          <dgm:adj idx="2" val="126"/>
-                        </dgm:adjLst>
-                      </dgm:shape>
-                    </dgm:if>
-                    <dgm:if name="Name62" axis="followSib" ptType="node" func="cnt" op="equ" val="5">
-                      <dgm:shape xmlns:r="http://schemas.openxmlformats.org/officeDocument/2006/relationships" rot="180" type="pie" r:blip="">
-                        <dgm:adjLst>
-                          <dgm:adj idx="1" val="90"/>
-                          <dgm:adj idx="2" val="120"/>
-                        </dgm:adjLst>
-                      </dgm:shape>
-                    </dgm:if>
-                    <dgm:else name="Name63">
-                      <dgm:shape xmlns:r="http://schemas.openxmlformats.org/officeDocument/2006/relationships" rot="180" type="pie" r:blip="">
-                        <dgm:adjLst>
-                          <dgm:adj idx="1" val="90"/>
-                          <dgm:adj idx="2" val="115.7143"/>
-                        </dgm:adjLst>
-                      </dgm:shape>
-                    </dgm:else>
-                  </dgm:choose>
-                </dgm:if>
-                <dgm:if name="Name64" axis="precedSib" ptType="node" func="cnt" op="equ" val="1">
-                  <dgm:choose name="Name65">
-                    <dgm:if name="Name66" axis="followSib" ptType="node" func="cnt" op="equ" val="0">
-                      <dgm:shape xmlns:r="http://schemas.openxmlformats.org/officeDocument/2006/relationships" rot="180" type="pie" r:blip="">
-                        <dgm:adjLst>
-                          <dgm:adj idx="1" val="90"/>
-                          <dgm:adj idx="2" val="-90"/>
-                        </dgm:adjLst>
-                      </dgm:shape>
-                    </dgm:if>
-                    <dgm:if name="Name67" axis="followSib" ptType="node" func="cnt" op="equ" val="1">
-                      <dgm:shape xmlns:r="http://schemas.openxmlformats.org/officeDocument/2006/relationships" rot="180" type="pie" r:blip="">
-                        <dgm:adjLst>
-                          <dgm:adj idx="1" val="90"/>
-                          <dgm:adj idx="2" val="-150"/>
-                        </dgm:adjLst>
-                      </dgm:shape>
-                    </dgm:if>
-                    <dgm:if name="Name68" axis="followSib" ptType="node" func="cnt" op="equ" val="2">
-                      <dgm:shape xmlns:r="http://schemas.openxmlformats.org/officeDocument/2006/relationships" rot="180" type="pie" r:blip="">
-                        <dgm:adjLst>
-                          <dgm:adj idx="1" val="90"/>
-                          <dgm:adj idx="2" val="180"/>
-                        </dgm:adjLst>
-                      </dgm:shape>
-                    </dgm:if>
-                    <dgm:if name="Name69" axis="followSib" ptType="node" func="cnt" op="equ" val="3">
-                      <dgm:shape xmlns:r="http://schemas.openxmlformats.org/officeDocument/2006/relationships" rot="180" type="pie" r:blip="">
-                        <dgm:adjLst>
-                          <dgm:adj idx="1" val="90"/>
-                          <dgm:adj idx="2" val="162"/>
-                        </dgm:adjLst>
-                      </dgm:shape>
-                    </dgm:if>
-                    <dgm:if name="Name70" axis="followSib" ptType="node" func="cnt" op="equ" val="4">
-                      <dgm:shape xmlns:r="http://schemas.openxmlformats.org/officeDocument/2006/relationships" rot="180" type="pie" r:blip="">
-                        <dgm:adjLst>
-                          <dgm:adj idx="1" val="90"/>
-                          <dgm:adj idx="2" val="150"/>
-                        </dgm:adjLst>
-                      </dgm:shape>
-                    </dgm:if>
-                    <dgm:else name="Name71">
-                      <dgm:shape xmlns:r="http://schemas.openxmlformats.org/officeDocument/2006/relationships" rot="180" type="pie" r:blip="">
-                        <dgm:adjLst>
-                          <dgm:adj idx="1" val="90"/>
-                          <dgm:adj idx="2" val="141.4286"/>
-                        </dgm:adjLst>
-                      </dgm:shape>
-                    </dgm:else>
-                  </dgm:choose>
-                </dgm:if>
-                <dgm:if name="Name72" axis="precedSib" ptType="node" func="cnt" op="equ" val="2">
-                  <dgm:choose name="Name73">
-                    <dgm:if name="Name74" axis="followSib" ptType="node" func="cnt" op="equ" val="0">
-                      <dgm:shape xmlns:r="http://schemas.openxmlformats.org/officeDocument/2006/relationships" rot="180" type="pie" r:blip="">
-                        <dgm:adjLst>
-                          <dgm:adj idx="1" val="90"/>
-                          <dgm:adj idx="2" val="-90"/>
-                        </dgm:adjLst>
-                      </dgm:shape>
-                    </dgm:if>
-                    <dgm:if name="Name75" axis="followSib" ptType="node" func="cnt" op="equ" val="1">
-                      <dgm:shape xmlns:r="http://schemas.openxmlformats.org/officeDocument/2006/relationships" rot="180" type="pie" r:blip="">
-                        <dgm:adjLst>
-                          <dgm:adj idx="1" val="90"/>
-                          <dgm:adj idx="2" val="-135"/>
-                        </dgm:adjLst>
-                      </dgm:shape>
-                    </dgm:if>
-                    <dgm:if name="Name76" axis="followSib" ptType="node" func="cnt" op="equ" val="2">
-                      <dgm:shape xmlns:r="http://schemas.openxmlformats.org/officeDocument/2006/relationships" rot="180" type="pie" r:blip="">
-                        <dgm:adjLst>
-                          <dgm:adj idx="1" val="90"/>
-                          <dgm:adj idx="2" val="-162"/>
-                        </dgm:adjLst>
-                      </dgm:shape>
-                    </dgm:if>
-                    <dgm:if name="Name77" axis="followSib" ptType="node" func="cnt" op="equ" val="3">
-                      <dgm:shape xmlns:r="http://schemas.openxmlformats.org/officeDocument/2006/relationships" rot="180" type="pie" r:blip="">
-                        <dgm:adjLst>
-                          <dgm:adj idx="1" val="90"/>
-                          <dgm:adj idx="2" val="180"/>
-                        </dgm:adjLst>
-                      </dgm:shape>
-                    </dgm:if>
-                    <dgm:else name="Name78">
-                      <dgm:shape xmlns:r="http://schemas.openxmlformats.org/officeDocument/2006/relationships" rot="180" type="pie" r:blip="">
-                        <dgm:adjLst>
-                          <dgm:adj idx="1" val="90"/>
-                          <dgm:adj idx="2" val="167.1429"/>
-                        </dgm:adjLst>
-                      </dgm:shape>
-                    </dgm:else>
-                  </dgm:choose>
-                </dgm:if>
-                <dgm:if name="Name79" axis="precedSib" ptType="node" func="cnt" op="equ" val="3">
-                  <dgm:choose name="Name80">
-                    <dgm:if name="Name81" axis="followSib" ptType="node" func="cnt" op="equ" val="0">
-                      <dgm:shape xmlns:r="http://schemas.openxmlformats.org/officeDocument/2006/relationships" rot="180" type="pie" r:blip="">
-                        <dgm:adjLst>
-                          <dgm:adj idx="1" val="90"/>
-                          <dgm:adj idx="2" val="-90"/>
-                        </dgm:adjLst>
-                      </dgm:shape>
-                    </dgm:if>
-                    <dgm:if name="Name82" axis="followSib" ptType="node" func="cnt" op="equ" val="1">
-                      <dgm:shape xmlns:r="http://schemas.openxmlformats.org/officeDocument/2006/relationships" rot="180" type="pie" r:blip="">
-                        <dgm:adjLst>
-                          <dgm:adj idx="1" val="90"/>
-                          <dgm:adj idx="2" val="-126"/>
-                        </dgm:adjLst>
-                      </dgm:shape>
-                    </dgm:if>
-                    <dgm:if name="Name83" axis="followSib" ptType="node" func="cnt" op="equ" val="2">
-                      <dgm:shape xmlns:r="http://schemas.openxmlformats.org/officeDocument/2006/relationships" rot="180" type="pie" r:blip="">
-                        <dgm:adjLst>
-                          <dgm:adj idx="1" val="90"/>
-                          <dgm:adj idx="2" val="-150"/>
-                        </dgm:adjLst>
-                      </dgm:shape>
-                    </dgm:if>
-                    <dgm:else name="Name84">
-                      <dgm:shape xmlns:r="http://schemas.openxmlformats.org/officeDocument/2006/relationships" rot="180" type="pie" r:blip="">
-                        <dgm:adjLst>
-                          <dgm:adj idx="1" val="90"/>
-                          <dgm:adj idx="2" val="-167.1429"/>
-                        </dgm:adjLst>
-                      </dgm:shape>
-                    </dgm:else>
-                  </dgm:choose>
-                </dgm:if>
-                <dgm:if name="Name85" axis="precedSib" ptType="node" func="cnt" op="equ" val="4">
-                  <dgm:choose name="Name86">
-                    <dgm:if name="Name87" axis="followSib" ptType="node" func="cnt" op="equ" val="0">
-                      <dgm:shape xmlns:r="http://schemas.openxmlformats.org/officeDocument/2006/relationships" rot="180" type="pie" r:blip="">
-                        <dgm:adjLst>
-                          <dgm:adj idx="1" val="90"/>
-                          <dgm:adj idx="2" val="-90"/>
-                        </dgm:adjLst>
-                      </dgm:shape>
-                    </dgm:if>
-                    <dgm:if name="Name88" axis="followSib" ptType="node" func="cnt" op="equ" val="1">
-                      <dgm:shape xmlns:r="http://schemas.openxmlformats.org/officeDocument/2006/relationships" rot="180" type="pie" r:blip="">
-                        <dgm:adjLst>
-                          <dgm:adj idx="1" val="90"/>
-                          <dgm:adj idx="2" val="-120"/>
-                        </dgm:adjLst>
-                      </dgm:shape>
-                    </dgm:if>
-                    <dgm:else name="Name89">
-                      <dgm:shape xmlns:r="http://schemas.openxmlformats.org/officeDocument/2006/relationships" rot="180" type="pie" r:blip="">
-                        <dgm:adjLst>
-                          <dgm:adj idx="1" val="90"/>
-                          <dgm:adj idx="2" val="-141.4286"/>
-                        </dgm:adjLst>
-                      </dgm:shape>
-                    </dgm:else>
-                  </dgm:choose>
-                </dgm:if>
-                <dgm:if name="Name90" axis="precedSib" ptType="node" func="cnt" op="equ" val="5">
-                  <dgm:choose name="Name91">
-                    <dgm:if name="Name92" axis="followSib" ptType="node" func="cnt" op="equ" val="0">
-                      <dgm:shape xmlns:r="http://schemas.openxmlformats.org/officeDocument/2006/relationships" rot="180" type="pie" r:blip="">
-                        <dgm:adjLst>
-                          <dgm:adj idx="1" val="90"/>
-                          <dgm:adj idx="2" val="-90"/>
-                        </dgm:adjLst>
-                      </dgm:shape>
-                    </dgm:if>
-                    <dgm:else name="Name93">
-                      <dgm:shape xmlns:r="http://schemas.openxmlformats.org/officeDocument/2006/relationships" rot="180" type="pie" r:blip="">
-                        <dgm:adjLst>
-                          <dgm:adj idx="1" val="90"/>
-                          <dgm:adj idx="2" val="-115.7143"/>
-                        </dgm:adjLst>
-                      </dgm:shape>
-                    </dgm:else>
-                  </dgm:choose>
-                </dgm:if>
-                <dgm:else name="Name94">
-                  <dgm:shape xmlns:r="http://schemas.openxmlformats.org/officeDocument/2006/relationships" rot="180" type="pie" r:blip="">
-                    <dgm:adjLst>
-                      <dgm:adj idx="1" val="90"/>
-                      <dgm:adj idx="2" val="-90"/>
-                    </dgm:adjLst>
-                  </dgm:shape>
-                </dgm:else>
-              </dgm:choose>
-            </dgm:else>
-          </dgm:choose>
-          <dgm:presOf/>
-        </dgm:layoutNode>
-        <dgm:layoutNode name="Parent" styleLbl="revTx">
-          <dgm:varLst>
-            <dgm:chMax val="1"/>
-            <dgm:chPref val="1"/>
-            <dgm:bulletEnabled val="1"/>
-          </dgm:varLst>
-          <dgm:choose name="Name95">
-            <dgm:if name="Name96" func="var" arg="dir" op="equ" val="norm">
               <dgm:alg type="tx">
                 <dgm:param type="parTxLTRAlign" val="r"/>
                 <dgm:param type="parTxRTLAlign" val="r"/>
-                <dgm:param type="shpTxLTRAlignCh" val="r"/>
-                <dgm:param type="shpTxRTLAlignCh" val="r"/>
-                <dgm:param type="txAnchorVert" val="b"/>
-                <dgm:param type="autoTxRot" val="grav"/>
-              </dgm:alg>
-            </dgm:if>
-            <dgm:else name="Name97">
-              <dgm:alg type="tx">
-                <dgm:param type="parTxLTRAlign" val="l"/>
-                <dgm:param type="parTxRTLAlign" val="l"/>
-                <dgm:param type="shpTxLTRAlignCh" val="l"/>
-                <dgm:param type="shpTxRTLAlignCh" val="l"/>
-                <dgm:param type="txAnchorVert" val="b"/>
-                <dgm:param type="autoTxRot" val="grav"/>
               </dgm:alg>
             </dgm:else>
           </dgm:choose>
-          <dgm:choose name="Name98">
-            <dgm:if name="Name99" func="var" arg="dir" op="equ" val="norm">
-              <dgm:shape xmlns:r="http://schemas.openxmlformats.org/officeDocument/2006/relationships" rot="-90" type="rect" r:blip="">
-                <dgm:adjLst/>
-              </dgm:shape>
-            </dgm:if>
-            <dgm:else name="Name100">
-              <dgm:shape xmlns:r="http://schemas.openxmlformats.org/officeDocument/2006/relationships" rot="90" type="rect" r:blip="">
-                <dgm:adjLst/>
-              </dgm:shape>
-            </dgm:else>
-          </dgm:choose>
+          <dgm:shape xmlns:r="http://schemas.openxmlformats.org/officeDocument/2006/relationships" type="roundRect" r:blip="">
+            <dgm:adjLst/>
+          </dgm:shape>
           <dgm:presOf axis="self" ptType="node"/>
           <dgm:constrLst>
-            <dgm:constr type="lMarg" refType="primFontSz" fact="0"/>
-            <dgm:constr type="rMarg" refType="primFontSz" fact="0"/>
-            <dgm:constr type="tMarg" refType="primFontSz" fact="0"/>
-            <dgm:constr type="bMarg" refType="primFontSz" fact="0"/>
+            <dgm:constr type="tMarg"/>
+            <dgm:constr type="bMarg"/>
           </dgm:constrLst>
-          <dgm:ruleLst>
-            <dgm:rule type="primFontSz" val="5" fact="NaN" max="NaN"/>
-          </dgm:ruleLst>
+          <dgm:ruleLst/>
         </dgm:layoutNode>
       </dgm:layoutNode>
-      <dgm:choose name="Name101">
-        <dgm:if name="Name102" axis="ch" ptType="node" func="cnt" op="gte" val="1">
-          <dgm:forEach name="negSibTransForEach" axis="ch" ptType="sibTrans" hideLastTrans="0" cnt="1">
-            <dgm:layoutNode name="negSibTrans">
-              <dgm:alg type="sp"/>
-              <dgm:shape xmlns:r="http://schemas.openxmlformats.org/officeDocument/2006/relationships" r:blip="">
-                <dgm:adjLst/>
-              </dgm:shape>
-            </dgm:layoutNode>
-          </dgm:forEach>
-          <dgm:layoutNode name="composite">
-            <dgm:alg type="composite">
-              <dgm:param type="ar" val="0.5"/>
-            </dgm:alg>
-            <dgm:shape xmlns:r="http://schemas.openxmlformats.org/officeDocument/2006/relationships" r:blip="">
-              <dgm:adjLst/>
-            </dgm:shape>
-            <dgm:choose name="Name103">
-              <dgm:if name="Name104" func="var" arg="dir" op="equ" val="norm">
-                <dgm:constrLst>
-                  <dgm:constr type="l" for="ch" forName="Child" refType="w" fact="0"/>
-                  <dgm:constr type="t" for="ch" forName="Child" refType="h" fact="0"/>
-                  <dgm:constr type="w" for="ch" forName="Child" refType="w"/>
-                  <dgm:constr type="h" for="ch" forName="Child" refType="h"/>
-                </dgm:constrLst>
-              </dgm:if>
-              <dgm:else name="Name105">
-                <dgm:constrLst>
-                  <dgm:constr type="r" for="ch" forName="Child" refType="w"/>
-                  <dgm:constr type="t" for="ch" forName="Child" refType="h" fact="0"/>
-                  <dgm:constr type="w" for="ch" forName="Child" refType="w"/>
-                  <dgm:constr type="h" for="ch" forName="Child" refType="h"/>
-                </dgm:constrLst>
-              </dgm:else>
-            </dgm:choose>
-            <dgm:ruleLst/>
-            <dgm:layoutNode name="Child" styleLbl="revTx">
-              <dgm:varLst>
-                <dgm:chMax val="0"/>
-                <dgm:chPref val="0"/>
-                <dgm:bulletEnabled val="1"/>
-              </dgm:varLst>
-              <dgm:choose name="Name106">
-                <dgm:if name="Name107" func="var" arg="dir" op="equ" val="norm">
-                  <dgm:alg type="tx">
-                    <dgm:param type="parTxLTRAlign" val="l"/>
-                    <dgm:param type="parTxRTLAlign" val="r"/>
-                    <dgm:param type="txAnchorVert" val="t"/>
-                  </dgm:alg>
-                </dgm:if>
-                <dgm:else name="Name108">
-                  <dgm:alg type="tx">
-                    <dgm:param type="parTxLTRAlign" val="r"/>
-                    <dgm:param type="parTxRTLAlign" val="l"/>
-                    <dgm:param type="txAnchorVert" val="t"/>
-                  </dgm:alg>
-                </dgm:else>
-              </dgm:choose>
-              <dgm:shape xmlns:r="http://schemas.openxmlformats.org/officeDocument/2006/relationships" type="rect" r:blip="">
-                <dgm:adjLst/>
-              </dgm:shape>
-              <dgm:presOf axis="des" ptType="node"/>
-              <dgm:constrLst>
-                <dgm:constr type="lMarg" refType="primFontSz" fact="0"/>
-                <dgm:constr type="rMarg" refType="primFontSz" fact="0"/>
-                <dgm:constr type="tMarg" refType="primFontSz" fact="0"/>
-                <dgm:constr type="bMarg" refType="primFontSz" fact="0"/>
-              </dgm:constrLst>
-              <dgm:ruleLst>
-                <dgm:rule type="primFontSz" val="5" fact="NaN" max="NaN"/>
-              </dgm:ruleLst>
-            </dgm:layoutNode>
-          </dgm:layoutNode>
-          <dgm:forEach name="sibTransForEach" axis="followSib" ptType="sibTrans" cnt="1">
-            <dgm:layoutNode name="sibTrans">
-              <dgm:alg type="sp"/>
-              <dgm:shape xmlns:r="http://schemas.openxmlformats.org/officeDocument/2006/relationships" r:blip="">
-                <dgm:adjLst/>
-              </dgm:shape>
-            </dgm:layoutNode>
-          </dgm:forEach>
-        </dgm:if>
-        <dgm:else name="Name109"/>
-      </dgm:choose>
+      <dgm:layoutNode name="negativeSpace">
+        <dgm:alg type="sp"/>
+        <dgm:shape xmlns:r="http://schemas.openxmlformats.org/officeDocument/2006/relationships" r:blip="">
+          <dgm:adjLst/>
+        </dgm:shape>
+        <dgm:presOf/>
+        <dgm:constrLst/>
+        <dgm:ruleLst/>
+      </dgm:layoutNode>
+      <dgm:layoutNode name="childText" styleLbl="conFgAcc1">
+        <dgm:varLst>
+          <dgm:bulletEnabled val="1"/>
+        </dgm:varLst>
+        <dgm:alg type="tx">
+          <dgm:param type="stBulletLvl" val="1"/>
+        </dgm:alg>
+        <dgm:shape xmlns:r="http://schemas.openxmlformats.org/officeDocument/2006/relationships" type="rect" r:blip="" zOrderOff="-2">
+          <dgm:adjLst/>
+        </dgm:shape>
+        <dgm:presOf axis="des" ptType="node"/>
+        <dgm:constrLst>
+          <dgm:constr type="secFontSz" refType="primFontSz"/>
+        </dgm:constrLst>
+        <dgm:ruleLst>
+          <dgm:rule type="h" val="INF" fact="NaN" max="NaN"/>
+        </dgm:ruleLst>
+      </dgm:layoutNode>
+      <dgm:forEach name="Name10" axis="followSib" ptType="sibTrans" cnt="1">
+        <dgm:layoutNode name="spaceBetweenRectangles">
+          <dgm:alg type="sp"/>
+          <dgm:shape xmlns:r="http://schemas.openxmlformats.org/officeDocument/2006/relationships" r:blip="">
+            <dgm:adjLst/>
+          </dgm:shape>
+          <dgm:presOf/>
+          <dgm:constrLst/>
+          <dgm:ruleLst/>
+        </dgm:layoutNode>
+      </dgm:forEach>
     </dgm:forEach>
   </dgm:layoutNode>
 </dgm:layoutDef>
@@ -5696,7 +4635,7 @@
           <a:p>
             <a:fld id="{D0C7DDE5-4966-4824-816B-2644FBD3EB3C}" type="datetimeFigureOut">
               <a:rPr lang="nl-NL" smtClean="0"/>
-              <a:t>31-7-2018</a:t>
+              <a:t>8-8-2018</a:t>
             </a:fld>
             <a:endParaRPr lang="nl-NL"/>
           </a:p>
@@ -5866,7 +4805,7 @@
           <a:p>
             <a:fld id="{D0C7DDE5-4966-4824-816B-2644FBD3EB3C}" type="datetimeFigureOut">
               <a:rPr lang="nl-NL" smtClean="0"/>
-              <a:t>31-7-2018</a:t>
+              <a:t>8-8-2018</a:t>
             </a:fld>
             <a:endParaRPr lang="nl-NL"/>
           </a:p>
@@ -6046,7 +4985,7 @@
           <a:p>
             <a:fld id="{D0C7DDE5-4966-4824-816B-2644FBD3EB3C}" type="datetimeFigureOut">
               <a:rPr lang="nl-NL" smtClean="0"/>
-              <a:t>31-7-2018</a:t>
+              <a:t>8-8-2018</a:t>
             </a:fld>
             <a:endParaRPr lang="nl-NL"/>
           </a:p>
@@ -6216,7 +5155,7 @@
           <a:p>
             <a:fld id="{D0C7DDE5-4966-4824-816B-2644FBD3EB3C}" type="datetimeFigureOut">
               <a:rPr lang="nl-NL" smtClean="0"/>
-              <a:t>31-7-2018</a:t>
+              <a:t>8-8-2018</a:t>
             </a:fld>
             <a:endParaRPr lang="nl-NL"/>
           </a:p>
@@ -6460,7 +5399,7 @@
           <a:p>
             <a:fld id="{D0C7DDE5-4966-4824-816B-2644FBD3EB3C}" type="datetimeFigureOut">
               <a:rPr lang="nl-NL" smtClean="0"/>
-              <a:t>31-7-2018</a:t>
+              <a:t>8-8-2018</a:t>
             </a:fld>
             <a:endParaRPr lang="nl-NL"/>
           </a:p>
@@ -6692,7 +5631,7 @@
           <a:p>
             <a:fld id="{D0C7DDE5-4966-4824-816B-2644FBD3EB3C}" type="datetimeFigureOut">
               <a:rPr lang="nl-NL" smtClean="0"/>
-              <a:t>31-7-2018</a:t>
+              <a:t>8-8-2018</a:t>
             </a:fld>
             <a:endParaRPr lang="nl-NL"/>
           </a:p>
@@ -7059,7 +5998,7 @@
           <a:p>
             <a:fld id="{D0C7DDE5-4966-4824-816B-2644FBD3EB3C}" type="datetimeFigureOut">
               <a:rPr lang="nl-NL" smtClean="0"/>
-              <a:t>31-7-2018</a:t>
+              <a:t>8-8-2018</a:t>
             </a:fld>
             <a:endParaRPr lang="nl-NL"/>
           </a:p>
@@ -7177,7 +6116,7 @@
           <a:p>
             <a:fld id="{D0C7DDE5-4966-4824-816B-2644FBD3EB3C}" type="datetimeFigureOut">
               <a:rPr lang="nl-NL" smtClean="0"/>
-              <a:t>31-7-2018</a:t>
+              <a:t>8-8-2018</a:t>
             </a:fld>
             <a:endParaRPr lang="nl-NL"/>
           </a:p>
@@ -7272,7 +6211,7 @@
           <a:p>
             <a:fld id="{D0C7DDE5-4966-4824-816B-2644FBD3EB3C}" type="datetimeFigureOut">
               <a:rPr lang="nl-NL" smtClean="0"/>
-              <a:t>31-7-2018</a:t>
+              <a:t>8-8-2018</a:t>
             </a:fld>
             <a:endParaRPr lang="nl-NL"/>
           </a:p>
@@ -7549,7 +6488,7 @@
           <a:p>
             <a:fld id="{D0C7DDE5-4966-4824-816B-2644FBD3EB3C}" type="datetimeFigureOut">
               <a:rPr lang="nl-NL" smtClean="0"/>
-              <a:t>31-7-2018</a:t>
+              <a:t>8-8-2018</a:t>
             </a:fld>
             <a:endParaRPr lang="nl-NL"/>
           </a:p>
@@ -7806,7 +6745,7 @@
           <a:p>
             <a:fld id="{D0C7DDE5-4966-4824-816B-2644FBD3EB3C}" type="datetimeFigureOut">
               <a:rPr lang="nl-NL" smtClean="0"/>
-              <a:t>31-7-2018</a:t>
+              <a:t>8-8-2018</a:t>
             </a:fld>
             <a:endParaRPr lang="nl-NL"/>
           </a:p>
@@ -8019,7 +6958,7 @@
           <a:p>
             <a:fld id="{D0C7DDE5-4966-4824-816B-2644FBD3EB3C}" type="datetimeFigureOut">
               <a:rPr lang="nl-NL" smtClean="0"/>
-              <a:t>31-7-2018</a:t>
+              <a:t>8-8-2018</a:t>
             </a:fld>
             <a:endParaRPr lang="nl-NL"/>
           </a:p>
@@ -8485,7 +7424,7 @@
           <a:lstStyle/>
           <a:p>
             <a:pPr algn="ctr"/>
-            <a:endParaRPr lang="nl-NL"/>
+            <a:endParaRPr lang="nl-NL" dirty="0"/>
           </a:p>
         </p:txBody>
       </p:sp>
@@ -9399,7 +8338,7 @@
           <a:lstStyle/>
           <a:p>
             <a:pPr algn="ctr"/>
-            <a:endParaRPr lang="nl-NL"/>
+            <a:endParaRPr lang="nl-NL" dirty="0"/>
           </a:p>
         </p:txBody>
       </p:sp>
@@ -11091,7 +10030,7 @@
           <a:p>
             <a:pPr algn="ctr"/>
             <a:r>
-              <a:rPr lang="nl-NL" sz="1400"/>
+              <a:rPr lang="nl-NL" sz="1400" dirty="0" err="1"/>
               <a:t>Capability</a:t>
             </a:r>
             <a:endParaRPr lang="nl-NL" sz="1400" dirty="0"/>
@@ -13036,14 +11975,14 @@
           <p:nvPr>
             <p:extLst>
               <p:ext uri="{D42A27DB-BD31-4B8C-83A1-F6EECF244321}">
-                <p14:modId xmlns:p14="http://schemas.microsoft.com/office/powerpoint/2010/main" val="948525974"/>
+                <p14:modId xmlns:p14="http://schemas.microsoft.com/office/powerpoint/2010/main" val="3522924334"/>
               </p:ext>
             </p:extLst>
           </p:nvPr>
         </p:nvGraphicFramePr>
         <p:xfrm>
           <a:off x="203863" y="154240"/>
-          <a:ext cx="9631900" cy="6580515"/>
+          <a:ext cx="2666558" cy="6580515"/>
         </p:xfrm>
         <a:graphic>
           <a:graphicData uri="http://schemas.openxmlformats.org/drawingml/2006/diagram">

</xml_diff>